<commit_message>
Removed cell outputs in jupyter notebook and compressed images in presentation slides, to save file size.
</commit_message>
<xml_diff>
--- a/freeform_presentation.pptx
+++ b/freeform_presentation.pptx
@@ -265,7 +265,7 @@
           <a:p>
             <a:fld id="{05EFF64A-EB50-4963-BEE8-EEA90A954A85}" type="datetimeFigureOut">
               <a:rPr lang="en-GB" smtClean="0"/>
-              <a:t>16/12/2025</a:t>
+              <a:t>17/12/2025</a:t>
             </a:fld>
             <a:endParaRPr lang="en-GB"/>
           </a:p>
@@ -465,7 +465,7 @@
           <a:p>
             <a:fld id="{05EFF64A-EB50-4963-BEE8-EEA90A954A85}" type="datetimeFigureOut">
               <a:rPr lang="en-GB" smtClean="0"/>
-              <a:t>16/12/2025</a:t>
+              <a:t>17/12/2025</a:t>
             </a:fld>
             <a:endParaRPr lang="en-GB"/>
           </a:p>
@@ -675,7 +675,7 @@
           <a:p>
             <a:fld id="{05EFF64A-EB50-4963-BEE8-EEA90A954A85}" type="datetimeFigureOut">
               <a:rPr lang="en-GB" smtClean="0"/>
-              <a:t>16/12/2025</a:t>
+              <a:t>17/12/2025</a:t>
             </a:fld>
             <a:endParaRPr lang="en-GB"/>
           </a:p>
@@ -875,7 +875,7 @@
           <a:p>
             <a:fld id="{05EFF64A-EB50-4963-BEE8-EEA90A954A85}" type="datetimeFigureOut">
               <a:rPr lang="en-GB" smtClean="0"/>
-              <a:t>16/12/2025</a:t>
+              <a:t>17/12/2025</a:t>
             </a:fld>
             <a:endParaRPr lang="en-GB"/>
           </a:p>
@@ -1151,7 +1151,7 @@
           <a:p>
             <a:fld id="{05EFF64A-EB50-4963-BEE8-EEA90A954A85}" type="datetimeFigureOut">
               <a:rPr lang="en-GB" smtClean="0"/>
-              <a:t>16/12/2025</a:t>
+              <a:t>17/12/2025</a:t>
             </a:fld>
             <a:endParaRPr lang="en-GB"/>
           </a:p>
@@ -1419,7 +1419,7 @@
           <a:p>
             <a:fld id="{05EFF64A-EB50-4963-BEE8-EEA90A954A85}" type="datetimeFigureOut">
               <a:rPr lang="en-GB" smtClean="0"/>
-              <a:t>16/12/2025</a:t>
+              <a:t>17/12/2025</a:t>
             </a:fld>
             <a:endParaRPr lang="en-GB"/>
           </a:p>
@@ -1834,7 +1834,7 @@
           <a:p>
             <a:fld id="{05EFF64A-EB50-4963-BEE8-EEA90A954A85}" type="datetimeFigureOut">
               <a:rPr lang="en-GB" smtClean="0"/>
-              <a:t>16/12/2025</a:t>
+              <a:t>17/12/2025</a:t>
             </a:fld>
             <a:endParaRPr lang="en-GB"/>
           </a:p>
@@ -1976,7 +1976,7 @@
           <a:p>
             <a:fld id="{05EFF64A-EB50-4963-BEE8-EEA90A954A85}" type="datetimeFigureOut">
               <a:rPr lang="en-GB" smtClean="0"/>
-              <a:t>16/12/2025</a:t>
+              <a:t>17/12/2025</a:t>
             </a:fld>
             <a:endParaRPr lang="en-GB"/>
           </a:p>
@@ -2089,7 +2089,7 @@
           <a:p>
             <a:fld id="{05EFF64A-EB50-4963-BEE8-EEA90A954A85}" type="datetimeFigureOut">
               <a:rPr lang="en-GB" smtClean="0"/>
-              <a:t>16/12/2025</a:t>
+              <a:t>17/12/2025</a:t>
             </a:fld>
             <a:endParaRPr lang="en-GB"/>
           </a:p>
@@ -2402,7 +2402,7 @@
           <a:p>
             <a:fld id="{05EFF64A-EB50-4963-BEE8-EEA90A954A85}" type="datetimeFigureOut">
               <a:rPr lang="en-GB" smtClean="0"/>
-              <a:t>16/12/2025</a:t>
+              <a:t>17/12/2025</a:t>
             </a:fld>
             <a:endParaRPr lang="en-GB"/>
           </a:p>
@@ -2691,7 +2691,7 @@
           <a:p>
             <a:fld id="{05EFF64A-EB50-4963-BEE8-EEA90A954A85}" type="datetimeFigureOut">
               <a:rPr lang="en-GB" smtClean="0"/>
-              <a:t>16/12/2025</a:t>
+              <a:t>17/12/2025</a:t>
             </a:fld>
             <a:endParaRPr lang="en-GB"/>
           </a:p>
@@ -2934,7 +2934,7 @@
           <a:p>
             <a:fld id="{05EFF64A-EB50-4963-BEE8-EEA90A954A85}" type="datetimeFigureOut">
               <a:rPr lang="en-GB" smtClean="0"/>
-              <a:t>16/12/2025</a:t>
+              <a:t>17/12/2025</a:t>
             </a:fld>
             <a:endParaRPr lang="en-GB"/>
           </a:p>
@@ -3382,7 +3382,7 @@
               </a:ext>
             </a:extLst>
           </a:blip>
-          <a:srcRect t="-1" b="55122"/>
+          <a:srcRect t="-2"/>
           <a:stretch>
             <a:fillRect/>
           </a:stretch>
@@ -3812,7 +3812,13 @@
           <p:nvPr/>
         </p:nvPicPr>
         <p:blipFill>
-          <a:blip r:embed="rId2"/>
+          <a:blip r:embed="rId2">
+            <a:extLst>
+              <a:ext uri="{28A0092B-C50C-407E-A947-70E740481C1C}">
+                <a14:useLocalDpi xmlns:a14="http://schemas.microsoft.com/office/drawing/2010/main" val="0"/>
+              </a:ext>
+            </a:extLst>
+          </a:blip>
           <a:stretch>
             <a:fillRect/>
           </a:stretch>
@@ -3953,7 +3959,13 @@
           <p:nvPr/>
         </p:nvPicPr>
         <p:blipFill>
-          <a:blip r:embed="rId2"/>
+          <a:blip r:embed="rId2">
+            <a:extLst>
+              <a:ext uri="{28A0092B-C50C-407E-A947-70E740481C1C}">
+                <a14:useLocalDpi xmlns:a14="http://schemas.microsoft.com/office/drawing/2010/main" val="0"/>
+              </a:ext>
+            </a:extLst>
+          </a:blip>
           <a:stretch>
             <a:fillRect/>
           </a:stretch>
@@ -4094,7 +4106,13 @@
           <p:nvPr/>
         </p:nvPicPr>
         <p:blipFill>
-          <a:blip r:embed="rId2"/>
+          <a:blip r:embed="rId2">
+            <a:extLst>
+              <a:ext uri="{28A0092B-C50C-407E-A947-70E740481C1C}">
+                <a14:useLocalDpi xmlns:a14="http://schemas.microsoft.com/office/drawing/2010/main" val="0"/>
+              </a:ext>
+            </a:extLst>
+          </a:blip>
           <a:stretch>
             <a:fillRect/>
           </a:stretch>

</xml_diff>

<commit_message>
Added summary statistic to dataset with negative values removed. Formatted presentation slides and speaker notes.
</commit_message>
<xml_diff>
--- a/freeform_presentation.pptx
+++ b/freeform_presentation.pptx
@@ -2,14 +2,23 @@
 <file path=ppt/presentation.xml><?xml version="1.0" encoding="utf-8"?>
 <p:presentation xmlns:a="http://schemas.openxmlformats.org/drawingml/2006/main" xmlns:r="http://schemas.openxmlformats.org/officeDocument/2006/relationships" xmlns:p="http://schemas.openxmlformats.org/presentationml/2006/main" saveSubsetFonts="1">
   <p:sldMasterIdLst>
-    <p:sldMasterId id="2147483648" r:id="rId1"/>
+    <p:sldMasterId id="2147483678" r:id="rId1"/>
   </p:sldMasterIdLst>
+  <p:notesMasterIdLst>
+    <p:notesMasterId r:id="rId13"/>
+  </p:notesMasterIdLst>
   <p:sldIdLst>
     <p:sldId id="256" r:id="rId2"/>
-    <p:sldId id="258" r:id="rId3"/>
-    <p:sldId id="259" r:id="rId4"/>
-    <p:sldId id="260" r:id="rId5"/>
-    <p:sldId id="257" r:id="rId6"/>
+    <p:sldId id="265" r:id="rId3"/>
+    <p:sldId id="264" r:id="rId4"/>
+    <p:sldId id="258" r:id="rId5"/>
+    <p:sldId id="259" r:id="rId6"/>
+    <p:sldId id="261" r:id="rId7"/>
+    <p:sldId id="260" r:id="rId8"/>
+    <p:sldId id="262" r:id="rId9"/>
+    <p:sldId id="263" r:id="rId10"/>
+    <p:sldId id="257" r:id="rId11"/>
+    <p:sldId id="266" r:id="rId12"/>
   </p:sldIdLst>
   <p:sldSz cx="12192000" cy="6858000"/>
   <p:notesSz cx="6858000" cy="9144000"/>
@@ -116,6 +125,1374 @@
 </p:presentation>
 </file>
 
+<file path=ppt/notesMasters/notesMaster1.xml><?xml version="1.0" encoding="utf-8"?>
+<p:notesMaster xmlns:a="http://schemas.openxmlformats.org/drawingml/2006/main" xmlns:r="http://schemas.openxmlformats.org/officeDocument/2006/relationships" xmlns:p="http://schemas.openxmlformats.org/presentationml/2006/main">
+  <p:cSld>
+    <p:bg>
+      <p:bgRef idx="1001">
+        <a:schemeClr val="bg1"/>
+      </p:bgRef>
+    </p:bg>
+    <p:spTree>
+      <p:nvGrpSpPr>
+        <p:cNvPr id="1" name=""/>
+        <p:cNvGrpSpPr/>
+        <p:nvPr/>
+      </p:nvGrpSpPr>
+      <p:grpSpPr>
+        <a:xfrm>
+          <a:off x="0" y="0"/>
+          <a:ext cx="0" cy="0"/>
+          <a:chOff x="0" y="0"/>
+          <a:chExt cx="0" cy="0"/>
+        </a:xfrm>
+      </p:grpSpPr>
+      <p:sp>
+        <p:nvSpPr>
+          <p:cNvPr id="2" name="Header Placeholder 1"/>
+          <p:cNvSpPr>
+            <a:spLocks noGrp="1"/>
+          </p:cNvSpPr>
+          <p:nvPr>
+            <p:ph type="hdr" sz="quarter"/>
+          </p:nvPr>
+        </p:nvSpPr>
+        <p:spPr>
+          <a:xfrm>
+            <a:off x="0" y="0"/>
+            <a:ext cx="2971800" cy="458788"/>
+          </a:xfrm>
+          <a:prstGeom prst="rect">
+            <a:avLst/>
+          </a:prstGeom>
+        </p:spPr>
+        <p:txBody>
+          <a:bodyPr vert="horz" lIns="91440" tIns="45720" rIns="91440" bIns="45720" rtlCol="0"/>
+          <a:lstStyle>
+            <a:lvl1pPr algn="l">
+              <a:defRPr sz="1200"/>
+            </a:lvl1pPr>
+          </a:lstStyle>
+          <a:p>
+            <a:endParaRPr lang="en-GB"/>
+          </a:p>
+        </p:txBody>
+      </p:sp>
+      <p:sp>
+        <p:nvSpPr>
+          <p:cNvPr id="3" name="Date Placeholder 2"/>
+          <p:cNvSpPr>
+            <a:spLocks noGrp="1"/>
+          </p:cNvSpPr>
+          <p:nvPr>
+            <p:ph type="dt" idx="1"/>
+          </p:nvPr>
+        </p:nvSpPr>
+        <p:spPr>
+          <a:xfrm>
+            <a:off x="3884613" y="0"/>
+            <a:ext cx="2971800" cy="458788"/>
+          </a:xfrm>
+          <a:prstGeom prst="rect">
+            <a:avLst/>
+          </a:prstGeom>
+        </p:spPr>
+        <p:txBody>
+          <a:bodyPr vert="horz" lIns="91440" tIns="45720" rIns="91440" bIns="45720" rtlCol="0"/>
+          <a:lstStyle>
+            <a:lvl1pPr algn="r">
+              <a:defRPr sz="1200"/>
+            </a:lvl1pPr>
+          </a:lstStyle>
+          <a:p>
+            <a:fld id="{55114BF9-16F5-4039-88DC-630D0726E6A0}" type="datetimeFigureOut">
+              <a:rPr lang="en-GB" smtClean="0"/>
+              <a:t>21/12/2025</a:t>
+            </a:fld>
+            <a:endParaRPr lang="en-GB"/>
+          </a:p>
+        </p:txBody>
+      </p:sp>
+      <p:sp>
+        <p:nvSpPr>
+          <p:cNvPr id="4" name="Slide Image Placeholder 3"/>
+          <p:cNvSpPr>
+            <a:spLocks noGrp="1" noRot="1" noChangeAspect="1"/>
+          </p:cNvSpPr>
+          <p:nvPr>
+            <p:ph type="sldImg" idx="2"/>
+          </p:nvPr>
+        </p:nvSpPr>
+        <p:spPr>
+          <a:xfrm>
+            <a:off x="685800" y="1143000"/>
+            <a:ext cx="5486400" cy="3086100"/>
+          </a:xfrm>
+          <a:prstGeom prst="rect">
+            <a:avLst/>
+          </a:prstGeom>
+          <a:noFill/>
+          <a:ln w="12700">
+            <a:solidFill>
+              <a:prstClr val="black"/>
+            </a:solidFill>
+          </a:ln>
+        </p:spPr>
+        <p:txBody>
+          <a:bodyPr vert="horz" lIns="91440" tIns="45720" rIns="91440" bIns="45720" rtlCol="0" anchor="ctr"/>
+          <a:lstStyle/>
+          <a:p>
+            <a:endParaRPr lang="en-GB"/>
+          </a:p>
+        </p:txBody>
+      </p:sp>
+      <p:sp>
+        <p:nvSpPr>
+          <p:cNvPr id="5" name="Notes Placeholder 4"/>
+          <p:cNvSpPr>
+            <a:spLocks noGrp="1"/>
+          </p:cNvSpPr>
+          <p:nvPr>
+            <p:ph type="body" sz="quarter" idx="3"/>
+          </p:nvPr>
+        </p:nvSpPr>
+        <p:spPr>
+          <a:xfrm>
+            <a:off x="685800" y="4400550"/>
+            <a:ext cx="5486400" cy="3600450"/>
+          </a:xfrm>
+          <a:prstGeom prst="rect">
+            <a:avLst/>
+          </a:prstGeom>
+        </p:spPr>
+        <p:txBody>
+          <a:bodyPr vert="horz" lIns="91440" tIns="45720" rIns="91440" bIns="45720" rtlCol="0"/>
+          <a:lstStyle/>
+          <a:p>
+            <a:pPr lvl="0"/>
+            <a:r>
+              <a:rPr lang="en-US"/>
+              <a:t>Click to edit Master text styles</a:t>
+            </a:r>
+          </a:p>
+          <a:p>
+            <a:pPr lvl="1"/>
+            <a:r>
+              <a:rPr lang="en-US"/>
+              <a:t>Second level</a:t>
+            </a:r>
+          </a:p>
+          <a:p>
+            <a:pPr lvl="2"/>
+            <a:r>
+              <a:rPr lang="en-US"/>
+              <a:t>Third level</a:t>
+            </a:r>
+          </a:p>
+          <a:p>
+            <a:pPr lvl="3"/>
+            <a:r>
+              <a:rPr lang="en-US"/>
+              <a:t>Fourth level</a:t>
+            </a:r>
+          </a:p>
+          <a:p>
+            <a:pPr lvl="4"/>
+            <a:r>
+              <a:rPr lang="en-US"/>
+              <a:t>Fifth level</a:t>
+            </a:r>
+            <a:endParaRPr lang="en-GB"/>
+          </a:p>
+        </p:txBody>
+      </p:sp>
+      <p:sp>
+        <p:nvSpPr>
+          <p:cNvPr id="6" name="Footer Placeholder 5"/>
+          <p:cNvSpPr>
+            <a:spLocks noGrp="1"/>
+          </p:cNvSpPr>
+          <p:nvPr>
+            <p:ph type="ftr" sz="quarter" idx="4"/>
+          </p:nvPr>
+        </p:nvSpPr>
+        <p:spPr>
+          <a:xfrm>
+            <a:off x="0" y="8685213"/>
+            <a:ext cx="2971800" cy="458787"/>
+          </a:xfrm>
+          <a:prstGeom prst="rect">
+            <a:avLst/>
+          </a:prstGeom>
+        </p:spPr>
+        <p:txBody>
+          <a:bodyPr vert="horz" lIns="91440" tIns="45720" rIns="91440" bIns="45720" rtlCol="0" anchor="b"/>
+          <a:lstStyle>
+            <a:lvl1pPr algn="l">
+              <a:defRPr sz="1200"/>
+            </a:lvl1pPr>
+          </a:lstStyle>
+          <a:p>
+            <a:endParaRPr lang="en-GB"/>
+          </a:p>
+        </p:txBody>
+      </p:sp>
+      <p:sp>
+        <p:nvSpPr>
+          <p:cNvPr id="7" name="Slide Number Placeholder 6"/>
+          <p:cNvSpPr>
+            <a:spLocks noGrp="1"/>
+          </p:cNvSpPr>
+          <p:nvPr>
+            <p:ph type="sldNum" sz="quarter" idx="5"/>
+          </p:nvPr>
+        </p:nvSpPr>
+        <p:spPr>
+          <a:xfrm>
+            <a:off x="3884613" y="8685213"/>
+            <a:ext cx="2971800" cy="458787"/>
+          </a:xfrm>
+          <a:prstGeom prst="rect">
+            <a:avLst/>
+          </a:prstGeom>
+        </p:spPr>
+        <p:txBody>
+          <a:bodyPr vert="horz" lIns="91440" tIns="45720" rIns="91440" bIns="45720" rtlCol="0" anchor="b"/>
+          <a:lstStyle>
+            <a:lvl1pPr algn="r">
+              <a:defRPr sz="1200"/>
+            </a:lvl1pPr>
+          </a:lstStyle>
+          <a:p>
+            <a:fld id="{6055915B-9BBD-4B02-A487-D4CE5E44E4C4}" type="slidenum">
+              <a:rPr lang="en-GB" smtClean="0"/>
+              <a:t>‹#›</a:t>
+            </a:fld>
+            <a:endParaRPr lang="en-GB"/>
+          </a:p>
+        </p:txBody>
+      </p:sp>
+    </p:spTree>
+    <p:extLst>
+      <p:ext uri="{BB962C8B-B14F-4D97-AF65-F5344CB8AC3E}">
+        <p14:creationId xmlns:p14="http://schemas.microsoft.com/office/powerpoint/2010/main" val="2573194248"/>
+      </p:ext>
+    </p:extLst>
+  </p:cSld>
+  <p:clrMap bg1="lt1" tx1="dk1" bg2="lt2" tx2="dk2" accent1="accent1" accent2="accent2" accent3="accent3" accent4="accent4" accent5="accent5" accent6="accent6" hlink="hlink" folHlink="folHlink"/>
+  <p:notesStyle>
+    <a:lvl1pPr marL="0" algn="l" defTabSz="914400" rtl="0" eaLnBrk="1" latinLnBrk="0" hangingPunct="1">
+      <a:defRPr sz="1200" kern="1200">
+        <a:solidFill>
+          <a:schemeClr val="tx1"/>
+        </a:solidFill>
+        <a:latin typeface="+mn-lt"/>
+        <a:ea typeface="+mn-ea"/>
+        <a:cs typeface="+mn-cs"/>
+      </a:defRPr>
+    </a:lvl1pPr>
+    <a:lvl2pPr marL="457200" algn="l" defTabSz="914400" rtl="0" eaLnBrk="1" latinLnBrk="0" hangingPunct="1">
+      <a:defRPr sz="1200" kern="1200">
+        <a:solidFill>
+          <a:schemeClr val="tx1"/>
+        </a:solidFill>
+        <a:latin typeface="+mn-lt"/>
+        <a:ea typeface="+mn-ea"/>
+        <a:cs typeface="+mn-cs"/>
+      </a:defRPr>
+    </a:lvl2pPr>
+    <a:lvl3pPr marL="914400" algn="l" defTabSz="914400" rtl="0" eaLnBrk="1" latinLnBrk="0" hangingPunct="1">
+      <a:defRPr sz="1200" kern="1200">
+        <a:solidFill>
+          <a:schemeClr val="tx1"/>
+        </a:solidFill>
+        <a:latin typeface="+mn-lt"/>
+        <a:ea typeface="+mn-ea"/>
+        <a:cs typeface="+mn-cs"/>
+      </a:defRPr>
+    </a:lvl3pPr>
+    <a:lvl4pPr marL="1371600" algn="l" defTabSz="914400" rtl="0" eaLnBrk="1" latinLnBrk="0" hangingPunct="1">
+      <a:defRPr sz="1200" kern="1200">
+        <a:solidFill>
+          <a:schemeClr val="tx1"/>
+        </a:solidFill>
+        <a:latin typeface="+mn-lt"/>
+        <a:ea typeface="+mn-ea"/>
+        <a:cs typeface="+mn-cs"/>
+      </a:defRPr>
+    </a:lvl4pPr>
+    <a:lvl5pPr marL="1828800" algn="l" defTabSz="914400" rtl="0" eaLnBrk="1" latinLnBrk="0" hangingPunct="1">
+      <a:defRPr sz="1200" kern="1200">
+        <a:solidFill>
+          <a:schemeClr val="tx1"/>
+        </a:solidFill>
+        <a:latin typeface="+mn-lt"/>
+        <a:ea typeface="+mn-ea"/>
+        <a:cs typeface="+mn-cs"/>
+      </a:defRPr>
+    </a:lvl5pPr>
+    <a:lvl6pPr marL="2286000" algn="l" defTabSz="914400" rtl="0" eaLnBrk="1" latinLnBrk="0" hangingPunct="1">
+      <a:defRPr sz="1200" kern="1200">
+        <a:solidFill>
+          <a:schemeClr val="tx1"/>
+        </a:solidFill>
+        <a:latin typeface="+mn-lt"/>
+        <a:ea typeface="+mn-ea"/>
+        <a:cs typeface="+mn-cs"/>
+      </a:defRPr>
+    </a:lvl6pPr>
+    <a:lvl7pPr marL="2743200" algn="l" defTabSz="914400" rtl="0" eaLnBrk="1" latinLnBrk="0" hangingPunct="1">
+      <a:defRPr sz="1200" kern="1200">
+        <a:solidFill>
+          <a:schemeClr val="tx1"/>
+        </a:solidFill>
+        <a:latin typeface="+mn-lt"/>
+        <a:ea typeface="+mn-ea"/>
+        <a:cs typeface="+mn-cs"/>
+      </a:defRPr>
+    </a:lvl7pPr>
+    <a:lvl8pPr marL="3200400" algn="l" defTabSz="914400" rtl="0" eaLnBrk="1" latinLnBrk="0" hangingPunct="1">
+      <a:defRPr sz="1200" kern="1200">
+        <a:solidFill>
+          <a:schemeClr val="tx1"/>
+        </a:solidFill>
+        <a:latin typeface="+mn-lt"/>
+        <a:ea typeface="+mn-ea"/>
+        <a:cs typeface="+mn-cs"/>
+      </a:defRPr>
+    </a:lvl8pPr>
+    <a:lvl9pPr marL="3657600" algn="l" defTabSz="914400" rtl="0" eaLnBrk="1" latinLnBrk="0" hangingPunct="1">
+      <a:defRPr sz="1200" kern="1200">
+        <a:solidFill>
+          <a:schemeClr val="tx1"/>
+        </a:solidFill>
+        <a:latin typeface="+mn-lt"/>
+        <a:ea typeface="+mn-ea"/>
+        <a:cs typeface="+mn-cs"/>
+      </a:defRPr>
+    </a:lvl9pPr>
+  </p:notesStyle>
+</p:notesMaster>
+</file>
+
+<file path=ppt/notesSlides/notesSlide1.xml><?xml version="1.0" encoding="utf-8"?>
+<p:notes xmlns:a="http://schemas.openxmlformats.org/drawingml/2006/main" xmlns:r="http://schemas.openxmlformats.org/officeDocument/2006/relationships" xmlns:p="http://schemas.openxmlformats.org/presentationml/2006/main">
+  <p:cSld>
+    <p:spTree>
+      <p:nvGrpSpPr>
+        <p:cNvPr id="1" name=""/>
+        <p:cNvGrpSpPr/>
+        <p:nvPr/>
+      </p:nvGrpSpPr>
+      <p:grpSpPr>
+        <a:xfrm>
+          <a:off x="0" y="0"/>
+          <a:ext cx="0" cy="0"/>
+          <a:chOff x="0" y="0"/>
+          <a:chExt cx="0" cy="0"/>
+        </a:xfrm>
+      </p:grpSpPr>
+      <p:sp>
+        <p:nvSpPr>
+          <p:cNvPr id="2" name="Slide Image Placeholder 1"/>
+          <p:cNvSpPr>
+            <a:spLocks noGrp="1" noRot="1" noChangeAspect="1"/>
+          </p:cNvSpPr>
+          <p:nvPr>
+            <p:ph type="sldImg"/>
+          </p:nvPr>
+        </p:nvSpPr>
+        <p:spPr/>
+      </p:sp>
+      <p:sp>
+        <p:nvSpPr>
+          <p:cNvPr id="3" name="Notes Placeholder 2"/>
+          <p:cNvSpPr>
+            <a:spLocks noGrp="1"/>
+          </p:cNvSpPr>
+          <p:nvPr>
+            <p:ph type="body" idx="1"/>
+          </p:nvPr>
+        </p:nvSpPr>
+        <p:spPr/>
+        <p:txBody>
+          <a:bodyPr/>
+          <a:lstStyle/>
+          <a:p>
+            <a:r>
+              <a:rPr lang="en-GB" dirty="0"/>
+              <a:t>Give an outline of the presentation</a:t>
+            </a:r>
+          </a:p>
+          <a:p>
+            <a:r>
+              <a:rPr lang="en-GB" dirty="0"/>
+              <a:t>Explain the origin of my data and why I wanted to analyse it</a:t>
+            </a:r>
+          </a:p>
+        </p:txBody>
+      </p:sp>
+      <p:sp>
+        <p:nvSpPr>
+          <p:cNvPr id="4" name="Slide Number Placeholder 3"/>
+          <p:cNvSpPr>
+            <a:spLocks noGrp="1"/>
+          </p:cNvSpPr>
+          <p:nvPr>
+            <p:ph type="sldNum" sz="quarter" idx="5"/>
+          </p:nvPr>
+        </p:nvSpPr>
+        <p:spPr/>
+        <p:txBody>
+          <a:bodyPr/>
+          <a:lstStyle/>
+          <a:p>
+            <a:fld id="{6055915B-9BBD-4B02-A487-D4CE5E44E4C4}" type="slidenum">
+              <a:rPr lang="en-GB" smtClean="0"/>
+              <a:t>2</a:t>
+            </a:fld>
+            <a:endParaRPr lang="en-GB"/>
+          </a:p>
+        </p:txBody>
+      </p:sp>
+    </p:spTree>
+    <p:extLst>
+      <p:ext uri="{BB962C8B-B14F-4D97-AF65-F5344CB8AC3E}">
+        <p14:creationId xmlns:p14="http://schemas.microsoft.com/office/powerpoint/2010/main" val="1437877141"/>
+      </p:ext>
+    </p:extLst>
+  </p:cSld>
+  <p:clrMapOvr>
+    <a:masterClrMapping/>
+  </p:clrMapOvr>
+</p:notes>
+</file>
+
+<file path=ppt/notesSlides/notesSlide10.xml><?xml version="1.0" encoding="utf-8"?>
+<p:notes xmlns:a="http://schemas.openxmlformats.org/drawingml/2006/main" xmlns:r="http://schemas.openxmlformats.org/officeDocument/2006/relationships" xmlns:p="http://schemas.openxmlformats.org/presentationml/2006/main">
+  <p:cSld>
+    <p:spTree>
+      <p:nvGrpSpPr>
+        <p:cNvPr id="1" name=""/>
+        <p:cNvGrpSpPr/>
+        <p:nvPr/>
+      </p:nvGrpSpPr>
+      <p:grpSpPr>
+        <a:xfrm>
+          <a:off x="0" y="0"/>
+          <a:ext cx="0" cy="0"/>
+          <a:chOff x="0" y="0"/>
+          <a:chExt cx="0" cy="0"/>
+        </a:xfrm>
+      </p:grpSpPr>
+      <p:sp>
+        <p:nvSpPr>
+          <p:cNvPr id="2" name="Slide Image Placeholder 1"/>
+          <p:cNvSpPr>
+            <a:spLocks noGrp="1" noRot="1" noChangeAspect="1"/>
+          </p:cNvSpPr>
+          <p:nvPr>
+            <p:ph type="sldImg"/>
+          </p:nvPr>
+        </p:nvSpPr>
+        <p:spPr/>
+      </p:sp>
+      <p:sp>
+        <p:nvSpPr>
+          <p:cNvPr id="3" name="Notes Placeholder 2"/>
+          <p:cNvSpPr>
+            <a:spLocks noGrp="1"/>
+          </p:cNvSpPr>
+          <p:nvPr>
+            <p:ph type="body" idx="1"/>
+          </p:nvPr>
+        </p:nvSpPr>
+        <p:spPr/>
+        <p:txBody>
+          <a:bodyPr/>
+          <a:lstStyle/>
+          <a:p>
+            <a:endParaRPr lang="en-GB" dirty="0"/>
+          </a:p>
+        </p:txBody>
+      </p:sp>
+      <p:sp>
+        <p:nvSpPr>
+          <p:cNvPr id="4" name="Slide Number Placeholder 3"/>
+          <p:cNvSpPr>
+            <a:spLocks noGrp="1"/>
+          </p:cNvSpPr>
+          <p:nvPr>
+            <p:ph type="sldNum" sz="quarter" idx="5"/>
+          </p:nvPr>
+        </p:nvSpPr>
+        <p:spPr/>
+        <p:txBody>
+          <a:bodyPr/>
+          <a:lstStyle/>
+          <a:p>
+            <a:fld id="{6055915B-9BBD-4B02-A487-D4CE5E44E4C4}" type="slidenum">
+              <a:rPr lang="en-GB" smtClean="0"/>
+              <a:t>11</a:t>
+            </a:fld>
+            <a:endParaRPr lang="en-GB"/>
+          </a:p>
+        </p:txBody>
+      </p:sp>
+    </p:spTree>
+    <p:extLst>
+      <p:ext uri="{BB962C8B-B14F-4D97-AF65-F5344CB8AC3E}">
+        <p14:creationId xmlns:p14="http://schemas.microsoft.com/office/powerpoint/2010/main" val="749638694"/>
+      </p:ext>
+    </p:extLst>
+  </p:cSld>
+  <p:clrMapOvr>
+    <a:masterClrMapping/>
+  </p:clrMapOvr>
+</p:notes>
+</file>
+
+<file path=ppt/notesSlides/notesSlide2.xml><?xml version="1.0" encoding="utf-8"?>
+<p:notes xmlns:a="http://schemas.openxmlformats.org/drawingml/2006/main" xmlns:r="http://schemas.openxmlformats.org/officeDocument/2006/relationships" xmlns:p="http://schemas.openxmlformats.org/presentationml/2006/main">
+  <p:cSld>
+    <p:spTree>
+      <p:nvGrpSpPr>
+        <p:cNvPr id="1" name=""/>
+        <p:cNvGrpSpPr/>
+        <p:nvPr/>
+      </p:nvGrpSpPr>
+      <p:grpSpPr>
+        <a:xfrm>
+          <a:off x="0" y="0"/>
+          <a:ext cx="0" cy="0"/>
+          <a:chOff x="0" y="0"/>
+          <a:chExt cx="0" cy="0"/>
+        </a:xfrm>
+      </p:grpSpPr>
+      <p:sp>
+        <p:nvSpPr>
+          <p:cNvPr id="2" name="Slide Image Placeholder 1"/>
+          <p:cNvSpPr>
+            <a:spLocks noGrp="1" noRot="1" noChangeAspect="1"/>
+          </p:cNvSpPr>
+          <p:nvPr>
+            <p:ph type="sldImg"/>
+          </p:nvPr>
+        </p:nvSpPr>
+        <p:spPr/>
+      </p:sp>
+      <p:sp>
+        <p:nvSpPr>
+          <p:cNvPr id="3" name="Notes Placeholder 2"/>
+          <p:cNvSpPr>
+            <a:spLocks noGrp="1"/>
+          </p:cNvSpPr>
+          <p:nvPr>
+            <p:ph type="body" idx="1"/>
+          </p:nvPr>
+        </p:nvSpPr>
+        <p:spPr/>
+        <p:txBody>
+          <a:bodyPr/>
+          <a:lstStyle/>
+          <a:p>
+            <a:pPr marL="171450" indent="-171450">
+              <a:buFontTx/>
+              <a:buChar char="-"/>
+            </a:pPr>
+            <a:r>
+              <a:rPr lang="en-GB" dirty="0"/>
+              <a:t>Explain the rules of powerlifting</a:t>
+            </a:r>
+          </a:p>
+          <a:p>
+            <a:pPr marL="171450" indent="-171450">
+              <a:buFontTx/>
+              <a:buChar char="-"/>
+            </a:pPr>
+            <a:r>
+              <a:rPr lang="en-GB" dirty="0"/>
+              <a:t>Explain subset of data used for analysis – men between 2005 and 2024</a:t>
+            </a:r>
+          </a:p>
+        </p:txBody>
+      </p:sp>
+      <p:sp>
+        <p:nvSpPr>
+          <p:cNvPr id="4" name="Slide Number Placeholder 3"/>
+          <p:cNvSpPr>
+            <a:spLocks noGrp="1"/>
+          </p:cNvSpPr>
+          <p:nvPr>
+            <p:ph type="sldNum" sz="quarter" idx="5"/>
+          </p:nvPr>
+        </p:nvSpPr>
+        <p:spPr/>
+        <p:txBody>
+          <a:bodyPr/>
+          <a:lstStyle/>
+          <a:p>
+            <a:fld id="{6055915B-9BBD-4B02-A487-D4CE5E44E4C4}" type="slidenum">
+              <a:rPr lang="en-GB" smtClean="0"/>
+              <a:t>3</a:t>
+            </a:fld>
+            <a:endParaRPr lang="en-GB"/>
+          </a:p>
+        </p:txBody>
+      </p:sp>
+    </p:spTree>
+    <p:extLst>
+      <p:ext uri="{BB962C8B-B14F-4D97-AF65-F5344CB8AC3E}">
+        <p14:creationId xmlns:p14="http://schemas.microsoft.com/office/powerpoint/2010/main" val="202360630"/>
+      </p:ext>
+    </p:extLst>
+  </p:cSld>
+  <p:clrMapOvr>
+    <a:masterClrMapping/>
+  </p:clrMapOvr>
+</p:notes>
+</file>
+
+<file path=ppt/notesSlides/notesSlide3.xml><?xml version="1.0" encoding="utf-8"?>
+<p:notes xmlns:a="http://schemas.openxmlformats.org/drawingml/2006/main" xmlns:r="http://schemas.openxmlformats.org/officeDocument/2006/relationships" xmlns:p="http://schemas.openxmlformats.org/presentationml/2006/main">
+  <p:cSld>
+    <p:spTree>
+      <p:nvGrpSpPr>
+        <p:cNvPr id="1" name=""/>
+        <p:cNvGrpSpPr/>
+        <p:nvPr/>
+      </p:nvGrpSpPr>
+      <p:grpSpPr>
+        <a:xfrm>
+          <a:off x="0" y="0"/>
+          <a:ext cx="0" cy="0"/>
+          <a:chOff x="0" y="0"/>
+          <a:chExt cx="0" cy="0"/>
+        </a:xfrm>
+      </p:grpSpPr>
+      <p:sp>
+        <p:nvSpPr>
+          <p:cNvPr id="2" name="Slide Image Placeholder 1"/>
+          <p:cNvSpPr>
+            <a:spLocks noGrp="1" noRot="1" noChangeAspect="1"/>
+          </p:cNvSpPr>
+          <p:nvPr>
+            <p:ph type="sldImg"/>
+          </p:nvPr>
+        </p:nvSpPr>
+        <p:spPr/>
+      </p:sp>
+      <p:sp>
+        <p:nvSpPr>
+          <p:cNvPr id="3" name="Notes Placeholder 2"/>
+          <p:cNvSpPr>
+            <a:spLocks noGrp="1"/>
+          </p:cNvSpPr>
+          <p:nvPr>
+            <p:ph type="body" idx="1"/>
+          </p:nvPr>
+        </p:nvSpPr>
+        <p:spPr/>
+        <p:txBody>
+          <a:bodyPr/>
+          <a:lstStyle/>
+          <a:p>
+            <a:pPr marL="171450" indent="-171450">
+              <a:buFontTx/>
+              <a:buChar char="-"/>
+            </a:pPr>
+            <a:r>
+              <a:rPr lang="en-GB" dirty="0"/>
+              <a:t>Explain reasons for jump from 2009 onwards – ‘raw’ equipment category, federations expanding, YouTube and Instagram taking off, etc.</a:t>
+            </a:r>
+          </a:p>
+          <a:p>
+            <a:pPr marL="171450" indent="-171450">
+              <a:buFontTx/>
+              <a:buChar char="-"/>
+            </a:pPr>
+            <a:r>
+              <a:rPr lang="en-GB" dirty="0"/>
+              <a:t>Explain why participation did not drop to 0 in 2020 </a:t>
+            </a:r>
+          </a:p>
+        </p:txBody>
+      </p:sp>
+      <p:sp>
+        <p:nvSpPr>
+          <p:cNvPr id="4" name="Slide Number Placeholder 3"/>
+          <p:cNvSpPr>
+            <a:spLocks noGrp="1"/>
+          </p:cNvSpPr>
+          <p:nvPr>
+            <p:ph type="sldNum" sz="quarter" idx="5"/>
+          </p:nvPr>
+        </p:nvSpPr>
+        <p:spPr/>
+        <p:txBody>
+          <a:bodyPr/>
+          <a:lstStyle/>
+          <a:p>
+            <a:fld id="{6055915B-9BBD-4B02-A487-D4CE5E44E4C4}" type="slidenum">
+              <a:rPr lang="en-GB" smtClean="0"/>
+              <a:t>4</a:t>
+            </a:fld>
+            <a:endParaRPr lang="en-GB"/>
+          </a:p>
+        </p:txBody>
+      </p:sp>
+    </p:spTree>
+    <p:extLst>
+      <p:ext uri="{BB962C8B-B14F-4D97-AF65-F5344CB8AC3E}">
+        <p14:creationId xmlns:p14="http://schemas.microsoft.com/office/powerpoint/2010/main" val="3930074765"/>
+      </p:ext>
+    </p:extLst>
+  </p:cSld>
+  <p:clrMapOvr>
+    <a:masterClrMapping/>
+  </p:clrMapOvr>
+</p:notes>
+</file>
+
+<file path=ppt/notesSlides/notesSlide4.xml><?xml version="1.0" encoding="utf-8"?>
+<p:notes xmlns:a="http://schemas.openxmlformats.org/drawingml/2006/main" xmlns:r="http://schemas.openxmlformats.org/officeDocument/2006/relationships" xmlns:p="http://schemas.openxmlformats.org/presentationml/2006/main">
+  <p:cSld>
+    <p:spTree>
+      <p:nvGrpSpPr>
+        <p:cNvPr id="1" name=""/>
+        <p:cNvGrpSpPr/>
+        <p:nvPr/>
+      </p:nvGrpSpPr>
+      <p:grpSpPr>
+        <a:xfrm>
+          <a:off x="0" y="0"/>
+          <a:ext cx="0" cy="0"/>
+          <a:chOff x="0" y="0"/>
+          <a:chExt cx="0" cy="0"/>
+        </a:xfrm>
+      </p:grpSpPr>
+      <p:sp>
+        <p:nvSpPr>
+          <p:cNvPr id="2" name="Slide Image Placeholder 1"/>
+          <p:cNvSpPr>
+            <a:spLocks noGrp="1" noRot="1" noChangeAspect="1"/>
+          </p:cNvSpPr>
+          <p:nvPr>
+            <p:ph type="sldImg"/>
+          </p:nvPr>
+        </p:nvSpPr>
+        <p:spPr/>
+      </p:sp>
+      <p:sp>
+        <p:nvSpPr>
+          <p:cNvPr id="3" name="Notes Placeholder 2"/>
+          <p:cNvSpPr>
+            <a:spLocks noGrp="1"/>
+          </p:cNvSpPr>
+          <p:nvPr>
+            <p:ph type="body" idx="1"/>
+          </p:nvPr>
+        </p:nvSpPr>
+        <p:spPr/>
+        <p:txBody>
+          <a:bodyPr/>
+          <a:lstStyle/>
+          <a:p>
+            <a:pPr marL="171450" indent="-171450">
+              <a:buFontTx/>
+              <a:buChar char="-"/>
+            </a:pPr>
+            <a:r>
+              <a:rPr lang="en-GB" dirty="0"/>
+              <a:t>Suggest reasons why USA is so dominant in the dataset</a:t>
+            </a:r>
+          </a:p>
+          <a:p>
+            <a:pPr marL="171450" indent="-171450">
+              <a:buFontTx/>
+              <a:buChar char="-"/>
+            </a:pPr>
+            <a:r>
+              <a:rPr lang="en-GB" dirty="0"/>
+              <a:t>Explain use of bar chart for top 10 most popular</a:t>
+            </a:r>
+          </a:p>
+        </p:txBody>
+      </p:sp>
+      <p:sp>
+        <p:nvSpPr>
+          <p:cNvPr id="4" name="Slide Number Placeholder 3"/>
+          <p:cNvSpPr>
+            <a:spLocks noGrp="1"/>
+          </p:cNvSpPr>
+          <p:nvPr>
+            <p:ph type="sldNum" sz="quarter" idx="5"/>
+          </p:nvPr>
+        </p:nvSpPr>
+        <p:spPr/>
+        <p:txBody>
+          <a:bodyPr/>
+          <a:lstStyle/>
+          <a:p>
+            <a:fld id="{6055915B-9BBD-4B02-A487-D4CE5E44E4C4}" type="slidenum">
+              <a:rPr lang="en-GB" smtClean="0"/>
+              <a:t>5</a:t>
+            </a:fld>
+            <a:endParaRPr lang="en-GB"/>
+          </a:p>
+        </p:txBody>
+      </p:sp>
+    </p:spTree>
+    <p:extLst>
+      <p:ext uri="{BB962C8B-B14F-4D97-AF65-F5344CB8AC3E}">
+        <p14:creationId xmlns:p14="http://schemas.microsoft.com/office/powerpoint/2010/main" val="3604389952"/>
+      </p:ext>
+    </p:extLst>
+  </p:cSld>
+  <p:clrMapOvr>
+    <a:masterClrMapping/>
+  </p:clrMapOvr>
+</p:notes>
+</file>
+
+<file path=ppt/notesSlides/notesSlide5.xml><?xml version="1.0" encoding="utf-8"?>
+<p:notes xmlns:a="http://schemas.openxmlformats.org/drawingml/2006/main" xmlns:r="http://schemas.openxmlformats.org/officeDocument/2006/relationships" xmlns:p="http://schemas.openxmlformats.org/presentationml/2006/main">
+  <p:cSld>
+    <p:spTree>
+      <p:nvGrpSpPr>
+        <p:cNvPr id="1" name=""/>
+        <p:cNvGrpSpPr/>
+        <p:nvPr/>
+      </p:nvGrpSpPr>
+      <p:grpSpPr>
+        <a:xfrm>
+          <a:off x="0" y="0"/>
+          <a:ext cx="0" cy="0"/>
+          <a:chOff x="0" y="0"/>
+          <a:chExt cx="0" cy="0"/>
+        </a:xfrm>
+      </p:grpSpPr>
+      <p:sp>
+        <p:nvSpPr>
+          <p:cNvPr id="2" name="Slide Image Placeholder 1"/>
+          <p:cNvSpPr>
+            <a:spLocks noGrp="1" noRot="1" noChangeAspect="1"/>
+          </p:cNvSpPr>
+          <p:nvPr>
+            <p:ph type="sldImg"/>
+          </p:nvPr>
+        </p:nvSpPr>
+        <p:spPr/>
+      </p:sp>
+      <p:sp>
+        <p:nvSpPr>
+          <p:cNvPr id="3" name="Notes Placeholder 2"/>
+          <p:cNvSpPr>
+            <a:spLocks noGrp="1"/>
+          </p:cNvSpPr>
+          <p:nvPr>
+            <p:ph type="body" idx="1"/>
+          </p:nvPr>
+        </p:nvSpPr>
+        <p:spPr/>
+        <p:txBody>
+          <a:bodyPr/>
+          <a:lstStyle/>
+          <a:p>
+            <a:pPr marL="171450" indent="-171450">
+              <a:buFontTx/>
+              <a:buChar char="-"/>
+            </a:pPr>
+            <a:r>
+              <a:rPr lang="en-GB" dirty="0"/>
+              <a:t>Explain why </a:t>
+            </a:r>
+            <a:r>
+              <a:rPr lang="en-GB" dirty="0" err="1"/>
+              <a:t>hexbin</a:t>
+            </a:r>
+            <a:r>
+              <a:rPr lang="en-GB" dirty="0"/>
+              <a:t> was chosen instead of a scatter plot or </a:t>
+            </a:r>
+            <a:r>
+              <a:rPr lang="en-GB" dirty="0" err="1"/>
+              <a:t>kde</a:t>
+            </a:r>
+            <a:r>
+              <a:rPr lang="en-GB" dirty="0"/>
+              <a:t> distribution plot</a:t>
+            </a:r>
+          </a:p>
+          <a:p>
+            <a:pPr marL="171450" indent="-171450">
+              <a:buFontTx/>
+              <a:buChar char="-"/>
+            </a:pPr>
+            <a:r>
+              <a:rPr lang="en-GB" dirty="0"/>
+              <a:t>Explain distribution and why ages below 14 were cut off – they had unrealistically high Totals, so were likely entered incorrectly</a:t>
+            </a:r>
+          </a:p>
+        </p:txBody>
+      </p:sp>
+      <p:sp>
+        <p:nvSpPr>
+          <p:cNvPr id="4" name="Slide Number Placeholder 3"/>
+          <p:cNvSpPr>
+            <a:spLocks noGrp="1"/>
+          </p:cNvSpPr>
+          <p:nvPr>
+            <p:ph type="sldNum" sz="quarter" idx="5"/>
+          </p:nvPr>
+        </p:nvSpPr>
+        <p:spPr/>
+        <p:txBody>
+          <a:bodyPr/>
+          <a:lstStyle/>
+          <a:p>
+            <a:fld id="{6055915B-9BBD-4B02-A487-D4CE5E44E4C4}" type="slidenum">
+              <a:rPr lang="en-GB" smtClean="0"/>
+              <a:t>6</a:t>
+            </a:fld>
+            <a:endParaRPr lang="en-GB"/>
+          </a:p>
+        </p:txBody>
+      </p:sp>
+    </p:spTree>
+    <p:extLst>
+      <p:ext uri="{BB962C8B-B14F-4D97-AF65-F5344CB8AC3E}">
+        <p14:creationId xmlns:p14="http://schemas.microsoft.com/office/powerpoint/2010/main" val="153918901"/>
+      </p:ext>
+    </p:extLst>
+  </p:cSld>
+  <p:clrMapOvr>
+    <a:masterClrMapping/>
+  </p:clrMapOvr>
+</p:notes>
+</file>
+
+<file path=ppt/notesSlides/notesSlide6.xml><?xml version="1.0" encoding="utf-8"?>
+<p:notes xmlns:a="http://schemas.openxmlformats.org/drawingml/2006/main" xmlns:r="http://schemas.openxmlformats.org/officeDocument/2006/relationships" xmlns:p="http://schemas.openxmlformats.org/presentationml/2006/main">
+  <p:cSld>
+    <p:spTree>
+      <p:nvGrpSpPr>
+        <p:cNvPr id="1" name=""/>
+        <p:cNvGrpSpPr/>
+        <p:nvPr/>
+      </p:nvGrpSpPr>
+      <p:grpSpPr>
+        <a:xfrm>
+          <a:off x="0" y="0"/>
+          <a:ext cx="0" cy="0"/>
+          <a:chOff x="0" y="0"/>
+          <a:chExt cx="0" cy="0"/>
+        </a:xfrm>
+      </p:grpSpPr>
+      <p:sp>
+        <p:nvSpPr>
+          <p:cNvPr id="2" name="Slide Image Placeholder 1"/>
+          <p:cNvSpPr>
+            <a:spLocks noGrp="1" noRot="1" noChangeAspect="1"/>
+          </p:cNvSpPr>
+          <p:nvPr>
+            <p:ph type="sldImg"/>
+          </p:nvPr>
+        </p:nvSpPr>
+        <p:spPr/>
+      </p:sp>
+      <p:sp>
+        <p:nvSpPr>
+          <p:cNvPr id="3" name="Notes Placeholder 2"/>
+          <p:cNvSpPr>
+            <a:spLocks noGrp="1"/>
+          </p:cNvSpPr>
+          <p:nvPr>
+            <p:ph type="body" idx="1"/>
+          </p:nvPr>
+        </p:nvSpPr>
+        <p:spPr/>
+        <p:txBody>
+          <a:bodyPr/>
+          <a:lstStyle/>
+          <a:p>
+            <a:pPr marL="171450" indent="-171450">
+              <a:buFontTx/>
+              <a:buChar char="-"/>
+            </a:pPr>
+            <a:r>
+              <a:rPr lang="en-GB" dirty="0"/>
+              <a:t>Explain why it could be expected for performance to change over time more than it apparently has (is the sport becoming more extreme?)</a:t>
+            </a:r>
+          </a:p>
+          <a:p>
+            <a:pPr marL="171450" indent="-171450">
+              <a:buFontTx/>
+              <a:buChar char="-"/>
+            </a:pPr>
+            <a:r>
+              <a:rPr lang="en-GB" dirty="0"/>
+              <a:t>Suggestions for slight decrease post-2010</a:t>
+            </a:r>
+          </a:p>
+        </p:txBody>
+      </p:sp>
+      <p:sp>
+        <p:nvSpPr>
+          <p:cNvPr id="4" name="Slide Number Placeholder 3"/>
+          <p:cNvSpPr>
+            <a:spLocks noGrp="1"/>
+          </p:cNvSpPr>
+          <p:nvPr>
+            <p:ph type="sldNum" sz="quarter" idx="5"/>
+          </p:nvPr>
+        </p:nvSpPr>
+        <p:spPr/>
+        <p:txBody>
+          <a:bodyPr/>
+          <a:lstStyle/>
+          <a:p>
+            <a:fld id="{6055915B-9BBD-4B02-A487-D4CE5E44E4C4}" type="slidenum">
+              <a:rPr lang="en-GB" smtClean="0"/>
+              <a:t>7</a:t>
+            </a:fld>
+            <a:endParaRPr lang="en-GB"/>
+          </a:p>
+        </p:txBody>
+      </p:sp>
+    </p:spTree>
+    <p:extLst>
+      <p:ext uri="{BB962C8B-B14F-4D97-AF65-F5344CB8AC3E}">
+        <p14:creationId xmlns:p14="http://schemas.microsoft.com/office/powerpoint/2010/main" val="3826620163"/>
+      </p:ext>
+    </p:extLst>
+  </p:cSld>
+  <p:clrMapOvr>
+    <a:masterClrMapping/>
+  </p:clrMapOvr>
+</p:notes>
+</file>
+
+<file path=ppt/notesSlides/notesSlide7.xml><?xml version="1.0" encoding="utf-8"?>
+<p:notes xmlns:a="http://schemas.openxmlformats.org/drawingml/2006/main" xmlns:r="http://schemas.openxmlformats.org/officeDocument/2006/relationships" xmlns:p="http://schemas.openxmlformats.org/presentationml/2006/main">
+  <p:cSld>
+    <p:spTree>
+      <p:nvGrpSpPr>
+        <p:cNvPr id="1" name=""/>
+        <p:cNvGrpSpPr/>
+        <p:nvPr/>
+      </p:nvGrpSpPr>
+      <p:grpSpPr>
+        <a:xfrm>
+          <a:off x="0" y="0"/>
+          <a:ext cx="0" cy="0"/>
+          <a:chOff x="0" y="0"/>
+          <a:chExt cx="0" cy="0"/>
+        </a:xfrm>
+      </p:grpSpPr>
+      <p:sp>
+        <p:nvSpPr>
+          <p:cNvPr id="2" name="Slide Image Placeholder 1"/>
+          <p:cNvSpPr>
+            <a:spLocks noGrp="1" noRot="1" noChangeAspect="1"/>
+          </p:cNvSpPr>
+          <p:nvPr>
+            <p:ph type="sldImg"/>
+          </p:nvPr>
+        </p:nvSpPr>
+        <p:spPr/>
+      </p:sp>
+      <p:sp>
+        <p:nvSpPr>
+          <p:cNvPr id="3" name="Notes Placeholder 2"/>
+          <p:cNvSpPr>
+            <a:spLocks noGrp="1"/>
+          </p:cNvSpPr>
+          <p:nvPr>
+            <p:ph type="body" idx="1"/>
+          </p:nvPr>
+        </p:nvSpPr>
+        <p:spPr/>
+        <p:txBody>
+          <a:bodyPr/>
+          <a:lstStyle/>
+          <a:p>
+            <a:pPr marL="171450" indent="-171450">
+              <a:buFontTx/>
+              <a:buChar char="-"/>
+            </a:pPr>
+            <a:r>
+              <a:rPr lang="en-GB" dirty="0"/>
+              <a:t>Provide suggestions for sigmoid and plateau such as training age (most strength increase is in first 3 years of training)</a:t>
+            </a:r>
+          </a:p>
+          <a:p>
+            <a:pPr marL="171450" indent="-171450">
+              <a:buFontTx/>
+              <a:buChar char="-"/>
+            </a:pPr>
+            <a:r>
+              <a:rPr lang="en-GB" dirty="0"/>
+              <a:t>Provide suggestions for increased spread of data at higher bodyweight</a:t>
+            </a:r>
+          </a:p>
+        </p:txBody>
+      </p:sp>
+      <p:sp>
+        <p:nvSpPr>
+          <p:cNvPr id="4" name="Slide Number Placeholder 3"/>
+          <p:cNvSpPr>
+            <a:spLocks noGrp="1"/>
+          </p:cNvSpPr>
+          <p:nvPr>
+            <p:ph type="sldNum" sz="quarter" idx="5"/>
+          </p:nvPr>
+        </p:nvSpPr>
+        <p:spPr/>
+        <p:txBody>
+          <a:bodyPr/>
+          <a:lstStyle/>
+          <a:p>
+            <a:fld id="{6055915B-9BBD-4B02-A487-D4CE5E44E4C4}" type="slidenum">
+              <a:rPr lang="en-GB" smtClean="0"/>
+              <a:t>8</a:t>
+            </a:fld>
+            <a:endParaRPr lang="en-GB"/>
+          </a:p>
+        </p:txBody>
+      </p:sp>
+    </p:spTree>
+    <p:extLst>
+      <p:ext uri="{BB962C8B-B14F-4D97-AF65-F5344CB8AC3E}">
+        <p14:creationId xmlns:p14="http://schemas.microsoft.com/office/powerpoint/2010/main" val="1761641225"/>
+      </p:ext>
+    </p:extLst>
+  </p:cSld>
+  <p:clrMapOvr>
+    <a:masterClrMapping/>
+  </p:clrMapOvr>
+</p:notes>
+</file>
+
+<file path=ppt/notesSlides/notesSlide8.xml><?xml version="1.0" encoding="utf-8"?>
+<p:notes xmlns:a="http://schemas.openxmlformats.org/drawingml/2006/main" xmlns:r="http://schemas.openxmlformats.org/officeDocument/2006/relationships" xmlns:p="http://schemas.openxmlformats.org/presentationml/2006/main">
+  <p:cSld>
+    <p:spTree>
+      <p:nvGrpSpPr>
+        <p:cNvPr id="1" name=""/>
+        <p:cNvGrpSpPr/>
+        <p:nvPr/>
+      </p:nvGrpSpPr>
+      <p:grpSpPr>
+        <a:xfrm>
+          <a:off x="0" y="0"/>
+          <a:ext cx="0" cy="0"/>
+          <a:chOff x="0" y="0"/>
+          <a:chExt cx="0" cy="0"/>
+        </a:xfrm>
+      </p:grpSpPr>
+      <p:sp>
+        <p:nvSpPr>
+          <p:cNvPr id="2" name="Slide Image Placeholder 1"/>
+          <p:cNvSpPr>
+            <a:spLocks noGrp="1" noRot="1" noChangeAspect="1"/>
+          </p:cNvSpPr>
+          <p:nvPr>
+            <p:ph type="sldImg"/>
+          </p:nvPr>
+        </p:nvSpPr>
+        <p:spPr/>
+      </p:sp>
+      <p:sp>
+        <p:nvSpPr>
+          <p:cNvPr id="3" name="Notes Placeholder 2"/>
+          <p:cNvSpPr>
+            <a:spLocks noGrp="1"/>
+          </p:cNvSpPr>
+          <p:nvPr>
+            <p:ph type="body" idx="1"/>
+          </p:nvPr>
+        </p:nvSpPr>
+        <p:spPr/>
+        <p:txBody>
+          <a:bodyPr/>
+          <a:lstStyle/>
+          <a:p>
+            <a:pPr marL="171450" indent="-171450">
+              <a:buFontTx/>
+              <a:buChar char="-"/>
+            </a:pPr>
+            <a:r>
+              <a:rPr lang="en-GB" dirty="0"/>
+              <a:t>Explanation of leverages and ROM</a:t>
+            </a:r>
+          </a:p>
+          <a:p>
+            <a:pPr marL="171450" indent="-171450">
+              <a:buFontTx/>
+              <a:buChar char="-"/>
+            </a:pPr>
+            <a:r>
+              <a:rPr lang="en-GB" dirty="0"/>
+              <a:t>Wrote function that plots this heatmap for any weight class</a:t>
+            </a:r>
+          </a:p>
+        </p:txBody>
+      </p:sp>
+      <p:sp>
+        <p:nvSpPr>
+          <p:cNvPr id="4" name="Slide Number Placeholder 3"/>
+          <p:cNvSpPr>
+            <a:spLocks noGrp="1"/>
+          </p:cNvSpPr>
+          <p:nvPr>
+            <p:ph type="sldNum" sz="quarter" idx="5"/>
+          </p:nvPr>
+        </p:nvSpPr>
+        <p:spPr/>
+        <p:txBody>
+          <a:bodyPr/>
+          <a:lstStyle/>
+          <a:p>
+            <a:fld id="{6055915B-9BBD-4B02-A487-D4CE5E44E4C4}" type="slidenum">
+              <a:rPr lang="en-GB" smtClean="0"/>
+              <a:t>9</a:t>
+            </a:fld>
+            <a:endParaRPr lang="en-GB"/>
+          </a:p>
+        </p:txBody>
+      </p:sp>
+    </p:spTree>
+    <p:extLst>
+      <p:ext uri="{BB962C8B-B14F-4D97-AF65-F5344CB8AC3E}">
+        <p14:creationId xmlns:p14="http://schemas.microsoft.com/office/powerpoint/2010/main" val="3269312552"/>
+      </p:ext>
+    </p:extLst>
+  </p:cSld>
+  <p:clrMapOvr>
+    <a:masterClrMapping/>
+  </p:clrMapOvr>
+</p:notes>
+</file>
+
+<file path=ppt/notesSlides/notesSlide9.xml><?xml version="1.0" encoding="utf-8"?>
+<p:notes xmlns:a="http://schemas.openxmlformats.org/drawingml/2006/main" xmlns:r="http://schemas.openxmlformats.org/officeDocument/2006/relationships" xmlns:p="http://schemas.openxmlformats.org/presentationml/2006/main">
+  <p:cSld>
+    <p:spTree>
+      <p:nvGrpSpPr>
+        <p:cNvPr id="1" name=""/>
+        <p:cNvGrpSpPr/>
+        <p:nvPr/>
+      </p:nvGrpSpPr>
+      <p:grpSpPr>
+        <a:xfrm>
+          <a:off x="0" y="0"/>
+          <a:ext cx="0" cy="0"/>
+          <a:chOff x="0" y="0"/>
+          <a:chExt cx="0" cy="0"/>
+        </a:xfrm>
+      </p:grpSpPr>
+      <p:sp>
+        <p:nvSpPr>
+          <p:cNvPr id="2" name="Slide Image Placeholder 1"/>
+          <p:cNvSpPr>
+            <a:spLocks noGrp="1" noRot="1" noChangeAspect="1"/>
+          </p:cNvSpPr>
+          <p:nvPr>
+            <p:ph type="sldImg"/>
+          </p:nvPr>
+        </p:nvSpPr>
+        <p:spPr/>
+      </p:sp>
+      <p:sp>
+        <p:nvSpPr>
+          <p:cNvPr id="3" name="Notes Placeholder 2"/>
+          <p:cNvSpPr>
+            <a:spLocks noGrp="1"/>
+          </p:cNvSpPr>
+          <p:nvPr>
+            <p:ph type="body" idx="1"/>
+          </p:nvPr>
+        </p:nvSpPr>
+        <p:spPr/>
+        <p:txBody>
+          <a:bodyPr/>
+          <a:lstStyle/>
+          <a:p>
+            <a:pPr marL="0" marR="0" lvl="0" indent="0" algn="l" defTabSz="914400" rtl="0" eaLnBrk="1" fontAlgn="auto" latinLnBrk="0" hangingPunct="1">
+              <a:lnSpc>
+                <a:spcPct val="100000"/>
+              </a:lnSpc>
+              <a:spcBef>
+                <a:spcPts val="0"/>
+              </a:spcBef>
+              <a:spcAft>
+                <a:spcPts val="0"/>
+              </a:spcAft>
+              <a:buClrTx/>
+              <a:buSzTx/>
+              <a:buFontTx/>
+              <a:buNone/>
+              <a:tabLst/>
+              <a:defRPr/>
+            </a:pPr>
+            <a:r>
+              <a:rPr lang="en-GB" dirty="0"/>
+              <a:t>- Explain inconsistent data entries using </a:t>
+            </a:r>
+            <a:r>
+              <a:rPr lang="en-GB" dirty="0" err="1"/>
+              <a:t>msno</a:t>
+            </a:r>
+            <a:r>
+              <a:rPr lang="en-GB" dirty="0"/>
+              <a:t>/barcode-style figure</a:t>
+            </a:r>
+          </a:p>
+          <a:p>
+            <a:r>
+              <a:rPr lang="en-GB" dirty="0"/>
+              <a:t>- Explain choropleth and why it wasn’t a good choice of visualisation</a:t>
+            </a:r>
+          </a:p>
+        </p:txBody>
+      </p:sp>
+      <p:sp>
+        <p:nvSpPr>
+          <p:cNvPr id="4" name="Slide Number Placeholder 3"/>
+          <p:cNvSpPr>
+            <a:spLocks noGrp="1"/>
+          </p:cNvSpPr>
+          <p:nvPr>
+            <p:ph type="sldNum" sz="quarter" idx="5"/>
+          </p:nvPr>
+        </p:nvSpPr>
+        <p:spPr/>
+        <p:txBody>
+          <a:bodyPr/>
+          <a:lstStyle/>
+          <a:p>
+            <a:fld id="{6055915B-9BBD-4B02-A487-D4CE5E44E4C4}" type="slidenum">
+              <a:rPr lang="en-GB" smtClean="0"/>
+              <a:t>10</a:t>
+            </a:fld>
+            <a:endParaRPr lang="en-GB"/>
+          </a:p>
+        </p:txBody>
+      </p:sp>
+    </p:spTree>
+    <p:extLst>
+      <p:ext uri="{BB962C8B-B14F-4D97-AF65-F5344CB8AC3E}">
+        <p14:creationId xmlns:p14="http://schemas.microsoft.com/office/powerpoint/2010/main" val="56402108"/>
+      </p:ext>
+    </p:extLst>
+  </p:cSld>
+  <p:clrMapOvr>
+    <a:masterClrMapping/>
+  </p:clrMapOvr>
+</p:notes>
+</file>
+
 <file path=ppt/slideLayouts/slideLayout1.xml><?xml version="1.0" encoding="utf-8"?>
 <p:sldLayout xmlns:a="http://schemas.openxmlformats.org/drawingml/2006/main" xmlns:r="http://schemas.openxmlformats.org/officeDocument/2006/relationships" xmlns:p="http://schemas.openxmlformats.org/presentationml/2006/main" type="title" preserve="1">
   <p:cSld name="Title Slide">
@@ -138,7 +1515,7 @@
           <p:cNvPr id="2" name="Title 1">
             <a:extLst>
               <a:ext uri="{FF2B5EF4-FFF2-40B4-BE49-F238E27FC236}">
-                <a16:creationId xmlns:a16="http://schemas.microsoft.com/office/drawing/2014/main" id="{D1CB8531-4972-BBA3-F216-457E555A54AF}"/>
+                <a16:creationId xmlns:a16="http://schemas.microsoft.com/office/drawing/2014/main" id="{659B282C-D80B-651B-39E1-07BCC1DC4D56}"/>
               </a:ext>
             </a:extLst>
           </p:cNvPr>
@@ -176,7 +1553,7 @@
           <p:cNvPr id="3" name="Subtitle 2">
             <a:extLst>
               <a:ext uri="{FF2B5EF4-FFF2-40B4-BE49-F238E27FC236}">
-                <a16:creationId xmlns:a16="http://schemas.microsoft.com/office/drawing/2014/main" id="{604FF359-21C1-ECE5-FDB4-304F27D47402}"/>
+                <a16:creationId xmlns:a16="http://schemas.microsoft.com/office/drawing/2014/main" id="{F88AB8D4-CCED-CAF7-5CA2-A94AA78BD211}"/>
               </a:ext>
             </a:extLst>
           </p:cNvPr>
@@ -247,7 +1624,7 @@
           <p:cNvPr id="4" name="Date Placeholder 3">
             <a:extLst>
               <a:ext uri="{FF2B5EF4-FFF2-40B4-BE49-F238E27FC236}">
-                <a16:creationId xmlns:a16="http://schemas.microsoft.com/office/drawing/2014/main" id="{EDAF60FD-D7B2-4E89-62F6-465D6D94BAC2}"/>
+                <a16:creationId xmlns:a16="http://schemas.microsoft.com/office/drawing/2014/main" id="{B0F9418A-F9D1-A8AF-093D-1D7D6CBC4251}"/>
               </a:ext>
             </a:extLst>
           </p:cNvPr>
@@ -265,7 +1642,7 @@
           <a:p>
             <a:fld id="{05EFF64A-EB50-4963-BEE8-EEA90A954A85}" type="datetimeFigureOut">
               <a:rPr lang="en-GB" smtClean="0"/>
-              <a:t>17/12/2025</a:t>
+              <a:t>21/12/2025</a:t>
             </a:fld>
             <a:endParaRPr lang="en-GB"/>
           </a:p>
@@ -276,7 +1653,7 @@
           <p:cNvPr id="5" name="Footer Placeholder 4">
             <a:extLst>
               <a:ext uri="{FF2B5EF4-FFF2-40B4-BE49-F238E27FC236}">
-                <a16:creationId xmlns:a16="http://schemas.microsoft.com/office/drawing/2014/main" id="{DA3E6D96-A9B6-DAD3-40D9-2FAFCE713069}"/>
+                <a16:creationId xmlns:a16="http://schemas.microsoft.com/office/drawing/2014/main" id="{E35AAAE5-7B26-4DD9-576B-20A05DD7E80C}"/>
               </a:ext>
             </a:extLst>
           </p:cNvPr>
@@ -301,7 +1678,7 @@
           <p:cNvPr id="6" name="Slide Number Placeholder 5">
             <a:extLst>
               <a:ext uri="{FF2B5EF4-FFF2-40B4-BE49-F238E27FC236}">
-                <a16:creationId xmlns:a16="http://schemas.microsoft.com/office/drawing/2014/main" id="{E1AC80EC-244B-13B7-9F4F-EF090759BDE4}"/>
+                <a16:creationId xmlns:a16="http://schemas.microsoft.com/office/drawing/2014/main" id="{7A895AFA-0F39-519E-16F1-F150F21EE279}"/>
               </a:ext>
             </a:extLst>
           </p:cNvPr>
@@ -328,7 +1705,7 @@
     </p:spTree>
     <p:extLst>
       <p:ext uri="{BB962C8B-B14F-4D97-AF65-F5344CB8AC3E}">
-        <p14:creationId xmlns:p14="http://schemas.microsoft.com/office/powerpoint/2010/main" val="1179077035"/>
+        <p14:creationId xmlns:p14="http://schemas.microsoft.com/office/powerpoint/2010/main" val="1955410178"/>
       </p:ext>
     </p:extLst>
   </p:cSld>
@@ -360,7 +1737,7 @@
           <p:cNvPr id="2" name="Title 1">
             <a:extLst>
               <a:ext uri="{FF2B5EF4-FFF2-40B4-BE49-F238E27FC236}">
-                <a16:creationId xmlns:a16="http://schemas.microsoft.com/office/drawing/2014/main" id="{B8BCDFB5-14F7-2676-08BF-22E2277F7C59}"/>
+                <a16:creationId xmlns:a16="http://schemas.microsoft.com/office/drawing/2014/main" id="{9DFFF69C-3493-A533-9899-3F97BB4F8A16}"/>
               </a:ext>
             </a:extLst>
           </p:cNvPr>
@@ -389,7 +1766,7 @@
           <p:cNvPr id="3" name="Vertical Text Placeholder 2">
             <a:extLst>
               <a:ext uri="{FF2B5EF4-FFF2-40B4-BE49-F238E27FC236}">
-                <a16:creationId xmlns:a16="http://schemas.microsoft.com/office/drawing/2014/main" id="{2EEF19DE-56FE-DB4D-7F69-5D6EAF4C2A8C}"/>
+                <a16:creationId xmlns:a16="http://schemas.microsoft.com/office/drawing/2014/main" id="{D1DC0B18-2048-A9C5-7FFF-5EBAC74075AE}"/>
               </a:ext>
             </a:extLst>
           </p:cNvPr>
@@ -447,7 +1824,7 @@
           <p:cNvPr id="4" name="Date Placeholder 3">
             <a:extLst>
               <a:ext uri="{FF2B5EF4-FFF2-40B4-BE49-F238E27FC236}">
-                <a16:creationId xmlns:a16="http://schemas.microsoft.com/office/drawing/2014/main" id="{C69B6317-EAEE-A7B6-B717-750FC9D292A1}"/>
+                <a16:creationId xmlns:a16="http://schemas.microsoft.com/office/drawing/2014/main" id="{239D1979-657A-ADE4-7DBB-9AEF9F5B6581}"/>
               </a:ext>
             </a:extLst>
           </p:cNvPr>
@@ -465,7 +1842,7 @@
           <a:p>
             <a:fld id="{05EFF64A-EB50-4963-BEE8-EEA90A954A85}" type="datetimeFigureOut">
               <a:rPr lang="en-GB" smtClean="0"/>
-              <a:t>17/12/2025</a:t>
+              <a:t>21/12/2025</a:t>
             </a:fld>
             <a:endParaRPr lang="en-GB"/>
           </a:p>
@@ -476,7 +1853,7 @@
           <p:cNvPr id="5" name="Footer Placeholder 4">
             <a:extLst>
               <a:ext uri="{FF2B5EF4-FFF2-40B4-BE49-F238E27FC236}">
-                <a16:creationId xmlns:a16="http://schemas.microsoft.com/office/drawing/2014/main" id="{4C01ADD7-0D08-7B71-D289-0E12C853FBE2}"/>
+                <a16:creationId xmlns:a16="http://schemas.microsoft.com/office/drawing/2014/main" id="{7AA02D24-B1BC-0655-E570-0B026C1A6706}"/>
               </a:ext>
             </a:extLst>
           </p:cNvPr>
@@ -501,7 +1878,7 @@
           <p:cNvPr id="6" name="Slide Number Placeholder 5">
             <a:extLst>
               <a:ext uri="{FF2B5EF4-FFF2-40B4-BE49-F238E27FC236}">
-                <a16:creationId xmlns:a16="http://schemas.microsoft.com/office/drawing/2014/main" id="{02111AB4-A8BA-49D7-67C3-4CCE857D5EFE}"/>
+                <a16:creationId xmlns:a16="http://schemas.microsoft.com/office/drawing/2014/main" id="{671FFB03-7BE7-4046-E2FF-1A903A6D4C64}"/>
               </a:ext>
             </a:extLst>
           </p:cNvPr>
@@ -528,7 +1905,7 @@
     </p:spTree>
     <p:extLst>
       <p:ext uri="{BB962C8B-B14F-4D97-AF65-F5344CB8AC3E}">
-        <p14:creationId xmlns:p14="http://schemas.microsoft.com/office/powerpoint/2010/main" val="4181246169"/>
+        <p14:creationId xmlns:p14="http://schemas.microsoft.com/office/powerpoint/2010/main" val="225221534"/>
       </p:ext>
     </p:extLst>
   </p:cSld>
@@ -560,7 +1937,7 @@
           <p:cNvPr id="2" name="Vertical Title 1">
             <a:extLst>
               <a:ext uri="{FF2B5EF4-FFF2-40B4-BE49-F238E27FC236}">
-                <a16:creationId xmlns:a16="http://schemas.microsoft.com/office/drawing/2014/main" id="{C32666EA-2AC2-41DF-262A-DA1A21C40FA2}"/>
+                <a16:creationId xmlns:a16="http://schemas.microsoft.com/office/drawing/2014/main" id="{A3120554-7EC4-DDEE-679A-F86E0408C17D}"/>
               </a:ext>
             </a:extLst>
           </p:cNvPr>
@@ -594,7 +1971,7 @@
           <p:cNvPr id="3" name="Vertical Text Placeholder 2">
             <a:extLst>
               <a:ext uri="{FF2B5EF4-FFF2-40B4-BE49-F238E27FC236}">
-                <a16:creationId xmlns:a16="http://schemas.microsoft.com/office/drawing/2014/main" id="{DDF2094E-509B-3A07-6E26-38505FF4EE63}"/>
+                <a16:creationId xmlns:a16="http://schemas.microsoft.com/office/drawing/2014/main" id="{D1DC5761-A2DC-C744-FAB7-327378DB2F3D}"/>
               </a:ext>
             </a:extLst>
           </p:cNvPr>
@@ -657,7 +2034,7 @@
           <p:cNvPr id="4" name="Date Placeholder 3">
             <a:extLst>
               <a:ext uri="{FF2B5EF4-FFF2-40B4-BE49-F238E27FC236}">
-                <a16:creationId xmlns:a16="http://schemas.microsoft.com/office/drawing/2014/main" id="{87365EF8-DD27-D71F-10E8-410622E970FF}"/>
+                <a16:creationId xmlns:a16="http://schemas.microsoft.com/office/drawing/2014/main" id="{37C2C476-7B74-DADA-5C69-9938E7623E9D}"/>
               </a:ext>
             </a:extLst>
           </p:cNvPr>
@@ -675,7 +2052,7 @@
           <a:p>
             <a:fld id="{05EFF64A-EB50-4963-BEE8-EEA90A954A85}" type="datetimeFigureOut">
               <a:rPr lang="en-GB" smtClean="0"/>
-              <a:t>17/12/2025</a:t>
+              <a:t>21/12/2025</a:t>
             </a:fld>
             <a:endParaRPr lang="en-GB"/>
           </a:p>
@@ -686,7 +2063,7 @@
           <p:cNvPr id="5" name="Footer Placeholder 4">
             <a:extLst>
               <a:ext uri="{FF2B5EF4-FFF2-40B4-BE49-F238E27FC236}">
-                <a16:creationId xmlns:a16="http://schemas.microsoft.com/office/drawing/2014/main" id="{2F70EEB4-4068-7CAC-5F7B-95A8C7567AAE}"/>
+                <a16:creationId xmlns:a16="http://schemas.microsoft.com/office/drawing/2014/main" id="{A8289E70-AA54-2D47-400C-7B16A9571C67}"/>
               </a:ext>
             </a:extLst>
           </p:cNvPr>
@@ -711,7 +2088,7 @@
           <p:cNvPr id="6" name="Slide Number Placeholder 5">
             <a:extLst>
               <a:ext uri="{FF2B5EF4-FFF2-40B4-BE49-F238E27FC236}">
-                <a16:creationId xmlns:a16="http://schemas.microsoft.com/office/drawing/2014/main" id="{6C15B59A-6DC6-8297-DABD-3F1A082AECBF}"/>
+                <a16:creationId xmlns:a16="http://schemas.microsoft.com/office/drawing/2014/main" id="{EBA45737-4960-F355-FEDC-D29D9CB8CEC7}"/>
               </a:ext>
             </a:extLst>
           </p:cNvPr>
@@ -738,7 +2115,7 @@
     </p:spTree>
     <p:extLst>
       <p:ext uri="{BB962C8B-B14F-4D97-AF65-F5344CB8AC3E}">
-        <p14:creationId xmlns:p14="http://schemas.microsoft.com/office/powerpoint/2010/main" val="3412364305"/>
+        <p14:creationId xmlns:p14="http://schemas.microsoft.com/office/powerpoint/2010/main" val="1015489771"/>
       </p:ext>
     </p:extLst>
   </p:cSld>
@@ -770,7 +2147,7 @@
           <p:cNvPr id="2" name="Title 1">
             <a:extLst>
               <a:ext uri="{FF2B5EF4-FFF2-40B4-BE49-F238E27FC236}">
-                <a16:creationId xmlns:a16="http://schemas.microsoft.com/office/drawing/2014/main" id="{AE8A259F-219F-FDDF-29C8-6E6E2FF9302F}"/>
+                <a16:creationId xmlns:a16="http://schemas.microsoft.com/office/drawing/2014/main" id="{D8346532-FB5F-06C9-BBC4-67CDC626BC3B}"/>
               </a:ext>
             </a:extLst>
           </p:cNvPr>
@@ -799,7 +2176,7 @@
           <p:cNvPr id="3" name="Content Placeholder 2">
             <a:extLst>
               <a:ext uri="{FF2B5EF4-FFF2-40B4-BE49-F238E27FC236}">
-                <a16:creationId xmlns:a16="http://schemas.microsoft.com/office/drawing/2014/main" id="{51AEEC5E-439B-C614-0A61-5BBD9ADD2172}"/>
+                <a16:creationId xmlns:a16="http://schemas.microsoft.com/office/drawing/2014/main" id="{280E13B6-ED14-2EE6-143A-5FB42C6848E0}"/>
               </a:ext>
             </a:extLst>
           </p:cNvPr>
@@ -857,7 +2234,7 @@
           <p:cNvPr id="4" name="Date Placeholder 3">
             <a:extLst>
               <a:ext uri="{FF2B5EF4-FFF2-40B4-BE49-F238E27FC236}">
-                <a16:creationId xmlns:a16="http://schemas.microsoft.com/office/drawing/2014/main" id="{986B10D0-9074-0D78-062F-0D2291544341}"/>
+                <a16:creationId xmlns:a16="http://schemas.microsoft.com/office/drawing/2014/main" id="{D304B4F9-005C-BF7A-A6E3-797E9A5DC2AD}"/>
               </a:ext>
             </a:extLst>
           </p:cNvPr>
@@ -875,7 +2252,7 @@
           <a:p>
             <a:fld id="{05EFF64A-EB50-4963-BEE8-EEA90A954A85}" type="datetimeFigureOut">
               <a:rPr lang="en-GB" smtClean="0"/>
-              <a:t>17/12/2025</a:t>
+              <a:t>21/12/2025</a:t>
             </a:fld>
             <a:endParaRPr lang="en-GB"/>
           </a:p>
@@ -886,7 +2263,7 @@
           <p:cNvPr id="5" name="Footer Placeholder 4">
             <a:extLst>
               <a:ext uri="{FF2B5EF4-FFF2-40B4-BE49-F238E27FC236}">
-                <a16:creationId xmlns:a16="http://schemas.microsoft.com/office/drawing/2014/main" id="{6EDA056B-DB0C-7FE5-37F8-8433F8929408}"/>
+                <a16:creationId xmlns:a16="http://schemas.microsoft.com/office/drawing/2014/main" id="{9C290EAA-0B24-1553-250F-0237C9FFC585}"/>
               </a:ext>
             </a:extLst>
           </p:cNvPr>
@@ -911,7 +2288,7 @@
           <p:cNvPr id="6" name="Slide Number Placeholder 5">
             <a:extLst>
               <a:ext uri="{FF2B5EF4-FFF2-40B4-BE49-F238E27FC236}">
-                <a16:creationId xmlns:a16="http://schemas.microsoft.com/office/drawing/2014/main" id="{2A68DA7E-78EC-19FC-C41B-1CFC3D1321B1}"/>
+                <a16:creationId xmlns:a16="http://schemas.microsoft.com/office/drawing/2014/main" id="{83594FFF-1CE0-6287-4224-CF2EC528E7AC}"/>
               </a:ext>
             </a:extLst>
           </p:cNvPr>
@@ -938,7 +2315,7 @@
     </p:spTree>
     <p:extLst>
       <p:ext uri="{BB962C8B-B14F-4D97-AF65-F5344CB8AC3E}">
-        <p14:creationId xmlns:p14="http://schemas.microsoft.com/office/powerpoint/2010/main" val="1796014979"/>
+        <p14:creationId xmlns:p14="http://schemas.microsoft.com/office/powerpoint/2010/main" val="2105041520"/>
       </p:ext>
     </p:extLst>
   </p:cSld>
@@ -970,7 +2347,7 @@
           <p:cNvPr id="2" name="Title 1">
             <a:extLst>
               <a:ext uri="{FF2B5EF4-FFF2-40B4-BE49-F238E27FC236}">
-                <a16:creationId xmlns:a16="http://schemas.microsoft.com/office/drawing/2014/main" id="{706F74D3-EBA4-568B-E266-11A394FB7E82}"/>
+                <a16:creationId xmlns:a16="http://schemas.microsoft.com/office/drawing/2014/main" id="{CA67512C-B40E-91A5-AF1A-2E1D19008346}"/>
               </a:ext>
             </a:extLst>
           </p:cNvPr>
@@ -1008,7 +2385,7 @@
           <p:cNvPr id="3" name="Text Placeholder 2">
             <a:extLst>
               <a:ext uri="{FF2B5EF4-FFF2-40B4-BE49-F238E27FC236}">
-                <a16:creationId xmlns:a16="http://schemas.microsoft.com/office/drawing/2014/main" id="{E255962D-482D-2C65-A7A2-03A284E5DC7F}"/>
+                <a16:creationId xmlns:a16="http://schemas.microsoft.com/office/drawing/2014/main" id="{525787F9-7DC2-8D5C-095D-DD08F2CE5986}"/>
               </a:ext>
             </a:extLst>
           </p:cNvPr>
@@ -1133,7 +2510,7 @@
           <p:cNvPr id="4" name="Date Placeholder 3">
             <a:extLst>
               <a:ext uri="{FF2B5EF4-FFF2-40B4-BE49-F238E27FC236}">
-                <a16:creationId xmlns:a16="http://schemas.microsoft.com/office/drawing/2014/main" id="{30B5955F-F851-DBF5-93A8-DA6E68A50364}"/>
+                <a16:creationId xmlns:a16="http://schemas.microsoft.com/office/drawing/2014/main" id="{F6913635-744F-5DA8-E252-0A6611631ECC}"/>
               </a:ext>
             </a:extLst>
           </p:cNvPr>
@@ -1151,7 +2528,7 @@
           <a:p>
             <a:fld id="{05EFF64A-EB50-4963-BEE8-EEA90A954A85}" type="datetimeFigureOut">
               <a:rPr lang="en-GB" smtClean="0"/>
-              <a:t>17/12/2025</a:t>
+              <a:t>21/12/2025</a:t>
             </a:fld>
             <a:endParaRPr lang="en-GB"/>
           </a:p>
@@ -1162,7 +2539,7 @@
           <p:cNvPr id="5" name="Footer Placeholder 4">
             <a:extLst>
               <a:ext uri="{FF2B5EF4-FFF2-40B4-BE49-F238E27FC236}">
-                <a16:creationId xmlns:a16="http://schemas.microsoft.com/office/drawing/2014/main" id="{F2B88513-A550-9D80-871E-0AEB0D942E18}"/>
+                <a16:creationId xmlns:a16="http://schemas.microsoft.com/office/drawing/2014/main" id="{95D5E2EF-E7CE-310B-15EB-A4C7BE245FF9}"/>
               </a:ext>
             </a:extLst>
           </p:cNvPr>
@@ -1187,7 +2564,7 @@
           <p:cNvPr id="6" name="Slide Number Placeholder 5">
             <a:extLst>
               <a:ext uri="{FF2B5EF4-FFF2-40B4-BE49-F238E27FC236}">
-                <a16:creationId xmlns:a16="http://schemas.microsoft.com/office/drawing/2014/main" id="{12340BA1-22F5-59CD-41C8-93D034DB0BE5}"/>
+                <a16:creationId xmlns:a16="http://schemas.microsoft.com/office/drawing/2014/main" id="{4DF746ED-8B05-9326-9573-9736C04EC36C}"/>
               </a:ext>
             </a:extLst>
           </p:cNvPr>
@@ -1214,7 +2591,7 @@
     </p:spTree>
     <p:extLst>
       <p:ext uri="{BB962C8B-B14F-4D97-AF65-F5344CB8AC3E}">
-        <p14:creationId xmlns:p14="http://schemas.microsoft.com/office/powerpoint/2010/main" val="3061278341"/>
+        <p14:creationId xmlns:p14="http://schemas.microsoft.com/office/powerpoint/2010/main" val="3535889958"/>
       </p:ext>
     </p:extLst>
   </p:cSld>
@@ -1246,7 +2623,7 @@
           <p:cNvPr id="2" name="Title 1">
             <a:extLst>
               <a:ext uri="{FF2B5EF4-FFF2-40B4-BE49-F238E27FC236}">
-                <a16:creationId xmlns:a16="http://schemas.microsoft.com/office/drawing/2014/main" id="{AA8D3F23-90B8-D521-7026-A3D56AD75951}"/>
+                <a16:creationId xmlns:a16="http://schemas.microsoft.com/office/drawing/2014/main" id="{3F17BF8C-B77F-D9EA-F3C8-66DC0AE7A7EA}"/>
               </a:ext>
             </a:extLst>
           </p:cNvPr>
@@ -1275,7 +2652,7 @@
           <p:cNvPr id="3" name="Content Placeholder 2">
             <a:extLst>
               <a:ext uri="{FF2B5EF4-FFF2-40B4-BE49-F238E27FC236}">
-                <a16:creationId xmlns:a16="http://schemas.microsoft.com/office/drawing/2014/main" id="{0655C797-325C-610A-B526-840B0E7E6F46}"/>
+                <a16:creationId xmlns:a16="http://schemas.microsoft.com/office/drawing/2014/main" id="{2EC94559-D3BA-64BF-47D8-DF82375E1BA8}"/>
               </a:ext>
             </a:extLst>
           </p:cNvPr>
@@ -1338,7 +2715,7 @@
           <p:cNvPr id="4" name="Content Placeholder 3">
             <a:extLst>
               <a:ext uri="{FF2B5EF4-FFF2-40B4-BE49-F238E27FC236}">
-                <a16:creationId xmlns:a16="http://schemas.microsoft.com/office/drawing/2014/main" id="{472D50B4-92A7-51A1-35CE-F8C83E2DFC4E}"/>
+                <a16:creationId xmlns:a16="http://schemas.microsoft.com/office/drawing/2014/main" id="{2BB1E8C5-42BB-9266-7F5F-5D6A8D70113E}"/>
               </a:ext>
             </a:extLst>
           </p:cNvPr>
@@ -1401,7 +2778,7 @@
           <p:cNvPr id="5" name="Date Placeholder 4">
             <a:extLst>
               <a:ext uri="{FF2B5EF4-FFF2-40B4-BE49-F238E27FC236}">
-                <a16:creationId xmlns:a16="http://schemas.microsoft.com/office/drawing/2014/main" id="{9B343576-B704-EAB2-E955-486A72B1D30C}"/>
+                <a16:creationId xmlns:a16="http://schemas.microsoft.com/office/drawing/2014/main" id="{888B41F8-D5DB-B9E6-987C-A1149CB50297}"/>
               </a:ext>
             </a:extLst>
           </p:cNvPr>
@@ -1419,7 +2796,7 @@
           <a:p>
             <a:fld id="{05EFF64A-EB50-4963-BEE8-EEA90A954A85}" type="datetimeFigureOut">
               <a:rPr lang="en-GB" smtClean="0"/>
-              <a:t>17/12/2025</a:t>
+              <a:t>21/12/2025</a:t>
             </a:fld>
             <a:endParaRPr lang="en-GB"/>
           </a:p>
@@ -1430,7 +2807,7 @@
           <p:cNvPr id="6" name="Footer Placeholder 5">
             <a:extLst>
               <a:ext uri="{FF2B5EF4-FFF2-40B4-BE49-F238E27FC236}">
-                <a16:creationId xmlns:a16="http://schemas.microsoft.com/office/drawing/2014/main" id="{29F267C6-C5B7-84CC-6A59-96BDE80C0CE4}"/>
+                <a16:creationId xmlns:a16="http://schemas.microsoft.com/office/drawing/2014/main" id="{41FE5FFA-C855-3421-C68E-02642B9F732A}"/>
               </a:ext>
             </a:extLst>
           </p:cNvPr>
@@ -1455,7 +2832,7 @@
           <p:cNvPr id="7" name="Slide Number Placeholder 6">
             <a:extLst>
               <a:ext uri="{FF2B5EF4-FFF2-40B4-BE49-F238E27FC236}">
-                <a16:creationId xmlns:a16="http://schemas.microsoft.com/office/drawing/2014/main" id="{71DC0B41-886D-8888-775D-20696F9E75FB}"/>
+                <a16:creationId xmlns:a16="http://schemas.microsoft.com/office/drawing/2014/main" id="{15A5BBD3-0DFA-2EDF-D935-818EFC1BAB08}"/>
               </a:ext>
             </a:extLst>
           </p:cNvPr>
@@ -1482,7 +2859,7 @@
     </p:spTree>
     <p:extLst>
       <p:ext uri="{BB962C8B-B14F-4D97-AF65-F5344CB8AC3E}">
-        <p14:creationId xmlns:p14="http://schemas.microsoft.com/office/powerpoint/2010/main" val="4027227337"/>
+        <p14:creationId xmlns:p14="http://schemas.microsoft.com/office/powerpoint/2010/main" val="3694493171"/>
       </p:ext>
     </p:extLst>
   </p:cSld>
@@ -1514,7 +2891,7 @@
           <p:cNvPr id="2" name="Title 1">
             <a:extLst>
               <a:ext uri="{FF2B5EF4-FFF2-40B4-BE49-F238E27FC236}">
-                <a16:creationId xmlns:a16="http://schemas.microsoft.com/office/drawing/2014/main" id="{335818CC-9B47-B530-6918-7CEF649DC587}"/>
+                <a16:creationId xmlns:a16="http://schemas.microsoft.com/office/drawing/2014/main" id="{CD4E5410-C777-0536-3B65-BED4CAD4620D}"/>
               </a:ext>
             </a:extLst>
           </p:cNvPr>
@@ -1548,7 +2925,7 @@
           <p:cNvPr id="3" name="Text Placeholder 2">
             <a:extLst>
               <a:ext uri="{FF2B5EF4-FFF2-40B4-BE49-F238E27FC236}">
-                <a16:creationId xmlns:a16="http://schemas.microsoft.com/office/drawing/2014/main" id="{E11E9272-BD59-7C0E-9265-FBF769AF3371}"/>
+                <a16:creationId xmlns:a16="http://schemas.microsoft.com/office/drawing/2014/main" id="{9EDE06B9-F018-A8FA-F455-8B39CD5D93BA}"/>
               </a:ext>
             </a:extLst>
           </p:cNvPr>
@@ -1619,7 +2996,7 @@
           <p:cNvPr id="4" name="Content Placeholder 3">
             <a:extLst>
               <a:ext uri="{FF2B5EF4-FFF2-40B4-BE49-F238E27FC236}">
-                <a16:creationId xmlns:a16="http://schemas.microsoft.com/office/drawing/2014/main" id="{8EEA3D60-6810-8061-1188-E7A93407E9AF}"/>
+                <a16:creationId xmlns:a16="http://schemas.microsoft.com/office/drawing/2014/main" id="{55CF5CCA-7E7B-EEDC-9280-DAE68B7F1528}"/>
               </a:ext>
             </a:extLst>
           </p:cNvPr>
@@ -1682,7 +3059,7 @@
           <p:cNvPr id="5" name="Text Placeholder 4">
             <a:extLst>
               <a:ext uri="{FF2B5EF4-FFF2-40B4-BE49-F238E27FC236}">
-                <a16:creationId xmlns:a16="http://schemas.microsoft.com/office/drawing/2014/main" id="{C0AFD181-A4B9-FF61-CE8C-071B3635CA7E}"/>
+                <a16:creationId xmlns:a16="http://schemas.microsoft.com/office/drawing/2014/main" id="{735EEA43-0BC4-A39B-1046-BD1A12FD2FE1}"/>
               </a:ext>
             </a:extLst>
           </p:cNvPr>
@@ -1753,7 +3130,7 @@
           <p:cNvPr id="6" name="Content Placeholder 5">
             <a:extLst>
               <a:ext uri="{FF2B5EF4-FFF2-40B4-BE49-F238E27FC236}">
-                <a16:creationId xmlns:a16="http://schemas.microsoft.com/office/drawing/2014/main" id="{06F51835-5F6C-8C6B-5EE5-AC5615A25B71}"/>
+                <a16:creationId xmlns:a16="http://schemas.microsoft.com/office/drawing/2014/main" id="{FD4C3500-0859-27DB-4018-ED1D01B25085}"/>
               </a:ext>
             </a:extLst>
           </p:cNvPr>
@@ -1816,7 +3193,7 @@
           <p:cNvPr id="7" name="Date Placeholder 6">
             <a:extLst>
               <a:ext uri="{FF2B5EF4-FFF2-40B4-BE49-F238E27FC236}">
-                <a16:creationId xmlns:a16="http://schemas.microsoft.com/office/drawing/2014/main" id="{7C186782-3590-9F32-8E8B-A28B7E40B2C7}"/>
+                <a16:creationId xmlns:a16="http://schemas.microsoft.com/office/drawing/2014/main" id="{0E2553E1-38F3-C0AD-4C8B-1F56478C387B}"/>
               </a:ext>
             </a:extLst>
           </p:cNvPr>
@@ -1834,7 +3211,7 @@
           <a:p>
             <a:fld id="{05EFF64A-EB50-4963-BEE8-EEA90A954A85}" type="datetimeFigureOut">
               <a:rPr lang="en-GB" smtClean="0"/>
-              <a:t>17/12/2025</a:t>
+              <a:t>21/12/2025</a:t>
             </a:fld>
             <a:endParaRPr lang="en-GB"/>
           </a:p>
@@ -1845,7 +3222,7 @@
           <p:cNvPr id="8" name="Footer Placeholder 7">
             <a:extLst>
               <a:ext uri="{FF2B5EF4-FFF2-40B4-BE49-F238E27FC236}">
-                <a16:creationId xmlns:a16="http://schemas.microsoft.com/office/drawing/2014/main" id="{50D5FDA0-B0A4-F670-5A2A-E1B57638932F}"/>
+                <a16:creationId xmlns:a16="http://schemas.microsoft.com/office/drawing/2014/main" id="{82977413-0218-C46B-8A89-6CE53D217E66}"/>
               </a:ext>
             </a:extLst>
           </p:cNvPr>
@@ -1870,7 +3247,7 @@
           <p:cNvPr id="9" name="Slide Number Placeholder 8">
             <a:extLst>
               <a:ext uri="{FF2B5EF4-FFF2-40B4-BE49-F238E27FC236}">
-                <a16:creationId xmlns:a16="http://schemas.microsoft.com/office/drawing/2014/main" id="{68371CF1-B233-DDD7-5AD1-CA46456D2AF7}"/>
+                <a16:creationId xmlns:a16="http://schemas.microsoft.com/office/drawing/2014/main" id="{726F955D-BDBB-2433-78D0-27D2468B8262}"/>
               </a:ext>
             </a:extLst>
           </p:cNvPr>
@@ -1897,7 +3274,7 @@
     </p:spTree>
     <p:extLst>
       <p:ext uri="{BB962C8B-B14F-4D97-AF65-F5344CB8AC3E}">
-        <p14:creationId xmlns:p14="http://schemas.microsoft.com/office/powerpoint/2010/main" val="1482011216"/>
+        <p14:creationId xmlns:p14="http://schemas.microsoft.com/office/powerpoint/2010/main" val="3696366632"/>
       </p:ext>
     </p:extLst>
   </p:cSld>
@@ -1929,7 +3306,7 @@
           <p:cNvPr id="2" name="Title 1">
             <a:extLst>
               <a:ext uri="{FF2B5EF4-FFF2-40B4-BE49-F238E27FC236}">
-                <a16:creationId xmlns:a16="http://schemas.microsoft.com/office/drawing/2014/main" id="{570DB084-46B5-D9B0-E623-FD12A7F9589D}"/>
+                <a16:creationId xmlns:a16="http://schemas.microsoft.com/office/drawing/2014/main" id="{DF91F8CB-5C59-5CCE-FC85-43A0CB0F67FD}"/>
               </a:ext>
             </a:extLst>
           </p:cNvPr>
@@ -1958,7 +3335,7 @@
           <p:cNvPr id="3" name="Date Placeholder 2">
             <a:extLst>
               <a:ext uri="{FF2B5EF4-FFF2-40B4-BE49-F238E27FC236}">
-                <a16:creationId xmlns:a16="http://schemas.microsoft.com/office/drawing/2014/main" id="{75F06BBB-F880-3F5E-BB04-640B6EC72D14}"/>
+                <a16:creationId xmlns:a16="http://schemas.microsoft.com/office/drawing/2014/main" id="{C708387F-1A49-14D5-9814-A40986F76AB6}"/>
               </a:ext>
             </a:extLst>
           </p:cNvPr>
@@ -1976,7 +3353,7 @@
           <a:p>
             <a:fld id="{05EFF64A-EB50-4963-BEE8-EEA90A954A85}" type="datetimeFigureOut">
               <a:rPr lang="en-GB" smtClean="0"/>
-              <a:t>17/12/2025</a:t>
+              <a:t>21/12/2025</a:t>
             </a:fld>
             <a:endParaRPr lang="en-GB"/>
           </a:p>
@@ -1987,7 +3364,7 @@
           <p:cNvPr id="4" name="Footer Placeholder 3">
             <a:extLst>
               <a:ext uri="{FF2B5EF4-FFF2-40B4-BE49-F238E27FC236}">
-                <a16:creationId xmlns:a16="http://schemas.microsoft.com/office/drawing/2014/main" id="{8521D9C8-E826-B90E-7F83-5AD44C668D19}"/>
+                <a16:creationId xmlns:a16="http://schemas.microsoft.com/office/drawing/2014/main" id="{B205AD9A-3E65-61F5-19BB-663DC397798E}"/>
               </a:ext>
             </a:extLst>
           </p:cNvPr>
@@ -2012,7 +3389,7 @@
           <p:cNvPr id="5" name="Slide Number Placeholder 4">
             <a:extLst>
               <a:ext uri="{FF2B5EF4-FFF2-40B4-BE49-F238E27FC236}">
-                <a16:creationId xmlns:a16="http://schemas.microsoft.com/office/drawing/2014/main" id="{38A6BFBA-08C4-664F-1749-771DCF6B4366}"/>
+                <a16:creationId xmlns:a16="http://schemas.microsoft.com/office/drawing/2014/main" id="{6359401C-D63C-F9D0-560F-49DFFBF6F2EE}"/>
               </a:ext>
             </a:extLst>
           </p:cNvPr>
@@ -2039,7 +3416,7 @@
     </p:spTree>
     <p:extLst>
       <p:ext uri="{BB962C8B-B14F-4D97-AF65-F5344CB8AC3E}">
-        <p14:creationId xmlns:p14="http://schemas.microsoft.com/office/powerpoint/2010/main" val="3658858778"/>
+        <p14:creationId xmlns:p14="http://schemas.microsoft.com/office/powerpoint/2010/main" val="1291276481"/>
       </p:ext>
     </p:extLst>
   </p:cSld>
@@ -2071,7 +3448,7 @@
           <p:cNvPr id="2" name="Date Placeholder 1">
             <a:extLst>
               <a:ext uri="{FF2B5EF4-FFF2-40B4-BE49-F238E27FC236}">
-                <a16:creationId xmlns:a16="http://schemas.microsoft.com/office/drawing/2014/main" id="{DDFA30F9-C092-6BE0-2EBB-4201F8D5F4E2}"/>
+                <a16:creationId xmlns:a16="http://schemas.microsoft.com/office/drawing/2014/main" id="{4310B152-3820-5B1D-D272-7105336708BD}"/>
               </a:ext>
             </a:extLst>
           </p:cNvPr>
@@ -2089,7 +3466,7 @@
           <a:p>
             <a:fld id="{05EFF64A-EB50-4963-BEE8-EEA90A954A85}" type="datetimeFigureOut">
               <a:rPr lang="en-GB" smtClean="0"/>
-              <a:t>17/12/2025</a:t>
+              <a:t>21/12/2025</a:t>
             </a:fld>
             <a:endParaRPr lang="en-GB"/>
           </a:p>
@@ -2100,7 +3477,7 @@
           <p:cNvPr id="3" name="Footer Placeholder 2">
             <a:extLst>
               <a:ext uri="{FF2B5EF4-FFF2-40B4-BE49-F238E27FC236}">
-                <a16:creationId xmlns:a16="http://schemas.microsoft.com/office/drawing/2014/main" id="{0F428812-58F1-F34D-4249-B78310319B74}"/>
+                <a16:creationId xmlns:a16="http://schemas.microsoft.com/office/drawing/2014/main" id="{4B4BDF9A-9481-2319-7E7F-6B34E5D6C573}"/>
               </a:ext>
             </a:extLst>
           </p:cNvPr>
@@ -2125,7 +3502,7 @@
           <p:cNvPr id="4" name="Slide Number Placeholder 3">
             <a:extLst>
               <a:ext uri="{FF2B5EF4-FFF2-40B4-BE49-F238E27FC236}">
-                <a16:creationId xmlns:a16="http://schemas.microsoft.com/office/drawing/2014/main" id="{8FC1020E-A962-1274-A39A-1B6666B90257}"/>
+                <a16:creationId xmlns:a16="http://schemas.microsoft.com/office/drawing/2014/main" id="{A8E12369-1910-781E-CC78-FDD5C3697F8E}"/>
               </a:ext>
             </a:extLst>
           </p:cNvPr>
@@ -2152,7 +3529,7 @@
     </p:spTree>
     <p:extLst>
       <p:ext uri="{BB962C8B-B14F-4D97-AF65-F5344CB8AC3E}">
-        <p14:creationId xmlns:p14="http://schemas.microsoft.com/office/powerpoint/2010/main" val="1950167132"/>
+        <p14:creationId xmlns:p14="http://schemas.microsoft.com/office/powerpoint/2010/main" val="1380322940"/>
       </p:ext>
     </p:extLst>
   </p:cSld>
@@ -2184,7 +3561,7 @@
           <p:cNvPr id="2" name="Title 1">
             <a:extLst>
               <a:ext uri="{FF2B5EF4-FFF2-40B4-BE49-F238E27FC236}">
-                <a16:creationId xmlns:a16="http://schemas.microsoft.com/office/drawing/2014/main" id="{B2FB1F31-346F-E76D-0AF2-A1595427A59D}"/>
+                <a16:creationId xmlns:a16="http://schemas.microsoft.com/office/drawing/2014/main" id="{1415CDA7-0C3A-1A62-07BF-EE8A599D21CA}"/>
               </a:ext>
             </a:extLst>
           </p:cNvPr>
@@ -2222,7 +3599,7 @@
           <p:cNvPr id="3" name="Content Placeholder 2">
             <a:extLst>
               <a:ext uri="{FF2B5EF4-FFF2-40B4-BE49-F238E27FC236}">
-                <a16:creationId xmlns:a16="http://schemas.microsoft.com/office/drawing/2014/main" id="{8124B6CE-F981-7846-04C1-2FDB48E30A31}"/>
+                <a16:creationId xmlns:a16="http://schemas.microsoft.com/office/drawing/2014/main" id="{4104BB2A-7611-2DD8-466C-2A5EC26D98F9}"/>
               </a:ext>
             </a:extLst>
           </p:cNvPr>
@@ -2313,7 +3690,7 @@
           <p:cNvPr id="4" name="Text Placeholder 3">
             <a:extLst>
               <a:ext uri="{FF2B5EF4-FFF2-40B4-BE49-F238E27FC236}">
-                <a16:creationId xmlns:a16="http://schemas.microsoft.com/office/drawing/2014/main" id="{F03F99CF-D1F6-65B2-2582-A4701C068A4E}"/>
+                <a16:creationId xmlns:a16="http://schemas.microsoft.com/office/drawing/2014/main" id="{BE5A729A-B820-81E4-DA6A-E80B1C51952E}"/>
               </a:ext>
             </a:extLst>
           </p:cNvPr>
@@ -2384,7 +3761,7 @@
           <p:cNvPr id="5" name="Date Placeholder 4">
             <a:extLst>
               <a:ext uri="{FF2B5EF4-FFF2-40B4-BE49-F238E27FC236}">
-                <a16:creationId xmlns:a16="http://schemas.microsoft.com/office/drawing/2014/main" id="{B756261F-8A32-894F-4C38-8BA98F4673E3}"/>
+                <a16:creationId xmlns:a16="http://schemas.microsoft.com/office/drawing/2014/main" id="{5282651E-48CC-27ED-8831-4E987FB403EC}"/>
               </a:ext>
             </a:extLst>
           </p:cNvPr>
@@ -2402,7 +3779,7 @@
           <a:p>
             <a:fld id="{05EFF64A-EB50-4963-BEE8-EEA90A954A85}" type="datetimeFigureOut">
               <a:rPr lang="en-GB" smtClean="0"/>
-              <a:t>17/12/2025</a:t>
+              <a:t>21/12/2025</a:t>
             </a:fld>
             <a:endParaRPr lang="en-GB"/>
           </a:p>
@@ -2413,7 +3790,7 @@
           <p:cNvPr id="6" name="Footer Placeholder 5">
             <a:extLst>
               <a:ext uri="{FF2B5EF4-FFF2-40B4-BE49-F238E27FC236}">
-                <a16:creationId xmlns:a16="http://schemas.microsoft.com/office/drawing/2014/main" id="{5A3F91D7-72F5-D233-0D55-C34627A6CFBE}"/>
+                <a16:creationId xmlns:a16="http://schemas.microsoft.com/office/drawing/2014/main" id="{1B3FABF7-47FF-3D15-702B-495F2F548229}"/>
               </a:ext>
             </a:extLst>
           </p:cNvPr>
@@ -2438,7 +3815,7 @@
           <p:cNvPr id="7" name="Slide Number Placeholder 6">
             <a:extLst>
               <a:ext uri="{FF2B5EF4-FFF2-40B4-BE49-F238E27FC236}">
-                <a16:creationId xmlns:a16="http://schemas.microsoft.com/office/drawing/2014/main" id="{FED59DF5-27F6-8EAC-CBF2-E3F841A154D7}"/>
+                <a16:creationId xmlns:a16="http://schemas.microsoft.com/office/drawing/2014/main" id="{9F7109E6-B44E-EB4D-6845-A8A885357B4B}"/>
               </a:ext>
             </a:extLst>
           </p:cNvPr>
@@ -2465,7 +3842,7 @@
     </p:spTree>
     <p:extLst>
       <p:ext uri="{BB962C8B-B14F-4D97-AF65-F5344CB8AC3E}">
-        <p14:creationId xmlns:p14="http://schemas.microsoft.com/office/powerpoint/2010/main" val="1990535213"/>
+        <p14:creationId xmlns:p14="http://schemas.microsoft.com/office/powerpoint/2010/main" val="3102236774"/>
       </p:ext>
     </p:extLst>
   </p:cSld>
@@ -2497,7 +3874,7 @@
           <p:cNvPr id="2" name="Title 1">
             <a:extLst>
               <a:ext uri="{FF2B5EF4-FFF2-40B4-BE49-F238E27FC236}">
-                <a16:creationId xmlns:a16="http://schemas.microsoft.com/office/drawing/2014/main" id="{40FB3F77-D897-D937-BA9C-7614200F285B}"/>
+                <a16:creationId xmlns:a16="http://schemas.microsoft.com/office/drawing/2014/main" id="{5E4DD6C2-DBD9-FD89-D11F-5D3DDDB4DEF5}"/>
               </a:ext>
             </a:extLst>
           </p:cNvPr>
@@ -2535,7 +3912,7 @@
           <p:cNvPr id="3" name="Picture Placeholder 2">
             <a:extLst>
               <a:ext uri="{FF2B5EF4-FFF2-40B4-BE49-F238E27FC236}">
-                <a16:creationId xmlns:a16="http://schemas.microsoft.com/office/drawing/2014/main" id="{AAF1C531-9B46-8BF5-DF6C-4222C6597AB4}"/>
+                <a16:creationId xmlns:a16="http://schemas.microsoft.com/office/drawing/2014/main" id="{7C87FB20-E5A5-E10C-9985-6F2E9E289E74}"/>
               </a:ext>
             </a:extLst>
           </p:cNvPr>
@@ -2602,7 +3979,7 @@
           <p:cNvPr id="4" name="Text Placeholder 3">
             <a:extLst>
               <a:ext uri="{FF2B5EF4-FFF2-40B4-BE49-F238E27FC236}">
-                <a16:creationId xmlns:a16="http://schemas.microsoft.com/office/drawing/2014/main" id="{EBCB5596-0D9A-B51F-54CB-226B5C5E9D0D}"/>
+                <a16:creationId xmlns:a16="http://schemas.microsoft.com/office/drawing/2014/main" id="{2EACAAB7-A0C7-67F5-F2EE-C2473FAB3459}"/>
               </a:ext>
             </a:extLst>
           </p:cNvPr>
@@ -2673,7 +4050,7 @@
           <p:cNvPr id="5" name="Date Placeholder 4">
             <a:extLst>
               <a:ext uri="{FF2B5EF4-FFF2-40B4-BE49-F238E27FC236}">
-                <a16:creationId xmlns:a16="http://schemas.microsoft.com/office/drawing/2014/main" id="{0F10122A-4953-82F3-02CF-58E4F5FE9F59}"/>
+                <a16:creationId xmlns:a16="http://schemas.microsoft.com/office/drawing/2014/main" id="{A8875C60-F850-A1E2-ED7D-8FFA8A906F80}"/>
               </a:ext>
             </a:extLst>
           </p:cNvPr>
@@ -2691,7 +4068,7 @@
           <a:p>
             <a:fld id="{05EFF64A-EB50-4963-BEE8-EEA90A954A85}" type="datetimeFigureOut">
               <a:rPr lang="en-GB" smtClean="0"/>
-              <a:t>17/12/2025</a:t>
+              <a:t>21/12/2025</a:t>
             </a:fld>
             <a:endParaRPr lang="en-GB"/>
           </a:p>
@@ -2702,7 +4079,7 @@
           <p:cNvPr id="6" name="Footer Placeholder 5">
             <a:extLst>
               <a:ext uri="{FF2B5EF4-FFF2-40B4-BE49-F238E27FC236}">
-                <a16:creationId xmlns:a16="http://schemas.microsoft.com/office/drawing/2014/main" id="{9F63B9DE-0D22-F415-8A46-173E19EDADC2}"/>
+                <a16:creationId xmlns:a16="http://schemas.microsoft.com/office/drawing/2014/main" id="{8A94848D-D895-F166-25C3-2B0E84A9AD6B}"/>
               </a:ext>
             </a:extLst>
           </p:cNvPr>
@@ -2727,7 +4104,7 @@
           <p:cNvPr id="7" name="Slide Number Placeholder 6">
             <a:extLst>
               <a:ext uri="{FF2B5EF4-FFF2-40B4-BE49-F238E27FC236}">
-                <a16:creationId xmlns:a16="http://schemas.microsoft.com/office/drawing/2014/main" id="{4191C3F1-23E5-7929-FCE8-5B0C9D7AB02A}"/>
+                <a16:creationId xmlns:a16="http://schemas.microsoft.com/office/drawing/2014/main" id="{026A3C64-D342-8E77-CF23-7C6B45AC52BB}"/>
               </a:ext>
             </a:extLst>
           </p:cNvPr>
@@ -2754,7 +4131,7 @@
     </p:spTree>
     <p:extLst>
       <p:ext uri="{BB962C8B-B14F-4D97-AF65-F5344CB8AC3E}">
-        <p14:creationId xmlns:p14="http://schemas.microsoft.com/office/powerpoint/2010/main" val="319885423"/>
+        <p14:creationId xmlns:p14="http://schemas.microsoft.com/office/powerpoint/2010/main" val="3069299212"/>
       </p:ext>
     </p:extLst>
   </p:cSld>
@@ -2791,7 +4168,7 @@
           <p:cNvPr id="2" name="Title Placeholder 1">
             <a:extLst>
               <a:ext uri="{FF2B5EF4-FFF2-40B4-BE49-F238E27FC236}">
-                <a16:creationId xmlns:a16="http://schemas.microsoft.com/office/drawing/2014/main" id="{DC6ED8E7-6BEA-F00E-71E0-CD5A00216B04}"/>
+                <a16:creationId xmlns:a16="http://schemas.microsoft.com/office/drawing/2014/main" id="{3045F98A-CDFF-21C6-25B1-65E1BF0A3883}"/>
               </a:ext>
             </a:extLst>
           </p:cNvPr>
@@ -2830,7 +4207,7 @@
           <p:cNvPr id="3" name="Text Placeholder 2">
             <a:extLst>
               <a:ext uri="{FF2B5EF4-FFF2-40B4-BE49-F238E27FC236}">
-                <a16:creationId xmlns:a16="http://schemas.microsoft.com/office/drawing/2014/main" id="{EF927375-9CA3-BF29-9943-E20F1DD7F916}"/>
+                <a16:creationId xmlns:a16="http://schemas.microsoft.com/office/drawing/2014/main" id="{663B6276-8DFF-B17C-A599-274DCE18BD58}"/>
               </a:ext>
             </a:extLst>
           </p:cNvPr>
@@ -2898,7 +4275,7 @@
           <p:cNvPr id="4" name="Date Placeholder 3">
             <a:extLst>
               <a:ext uri="{FF2B5EF4-FFF2-40B4-BE49-F238E27FC236}">
-                <a16:creationId xmlns:a16="http://schemas.microsoft.com/office/drawing/2014/main" id="{F2ED60FD-EDFD-616B-A8D6-E58F3E2A6D1E}"/>
+                <a16:creationId xmlns:a16="http://schemas.microsoft.com/office/drawing/2014/main" id="{68BB7FBB-9248-E4DE-5EB9-7A00087DA01E}"/>
               </a:ext>
             </a:extLst>
           </p:cNvPr>
@@ -2934,7 +4311,7 @@
           <a:p>
             <a:fld id="{05EFF64A-EB50-4963-BEE8-EEA90A954A85}" type="datetimeFigureOut">
               <a:rPr lang="en-GB" smtClean="0"/>
-              <a:t>17/12/2025</a:t>
+              <a:t>21/12/2025</a:t>
             </a:fld>
             <a:endParaRPr lang="en-GB"/>
           </a:p>
@@ -2945,7 +4322,7 @@
           <p:cNvPr id="5" name="Footer Placeholder 4">
             <a:extLst>
               <a:ext uri="{FF2B5EF4-FFF2-40B4-BE49-F238E27FC236}">
-                <a16:creationId xmlns:a16="http://schemas.microsoft.com/office/drawing/2014/main" id="{89D1FA62-76AB-61AF-57CC-95F4B2BC9128}"/>
+                <a16:creationId xmlns:a16="http://schemas.microsoft.com/office/drawing/2014/main" id="{9DE08C14-6C38-AFCC-5678-879014A36E01}"/>
               </a:ext>
             </a:extLst>
           </p:cNvPr>
@@ -2988,7 +4365,7 @@
           <p:cNvPr id="6" name="Slide Number Placeholder 5">
             <a:extLst>
               <a:ext uri="{FF2B5EF4-FFF2-40B4-BE49-F238E27FC236}">
-                <a16:creationId xmlns:a16="http://schemas.microsoft.com/office/drawing/2014/main" id="{B14D4D42-9F4D-99AB-A353-B843B4510CC8}"/>
+                <a16:creationId xmlns:a16="http://schemas.microsoft.com/office/drawing/2014/main" id="{594040BE-4BFB-8E62-BA17-C5B1468A5366}"/>
               </a:ext>
             </a:extLst>
           </p:cNvPr>
@@ -3033,23 +4410,23 @@
     </p:spTree>
     <p:extLst>
       <p:ext uri="{BB962C8B-B14F-4D97-AF65-F5344CB8AC3E}">
-        <p14:creationId xmlns:p14="http://schemas.microsoft.com/office/powerpoint/2010/main" val="3691626555"/>
+        <p14:creationId xmlns:p14="http://schemas.microsoft.com/office/powerpoint/2010/main" val="687893951"/>
       </p:ext>
     </p:extLst>
   </p:cSld>
   <p:clrMap bg1="lt1" tx1="dk1" bg2="lt2" tx2="dk2" accent1="accent1" accent2="accent2" accent3="accent3" accent4="accent4" accent5="accent5" accent6="accent6" hlink="hlink" folHlink="folHlink"/>
   <p:sldLayoutIdLst>
-    <p:sldLayoutId id="2147483649" r:id="rId1"/>
-    <p:sldLayoutId id="2147483650" r:id="rId2"/>
-    <p:sldLayoutId id="2147483651" r:id="rId3"/>
-    <p:sldLayoutId id="2147483652" r:id="rId4"/>
-    <p:sldLayoutId id="2147483653" r:id="rId5"/>
-    <p:sldLayoutId id="2147483654" r:id="rId6"/>
-    <p:sldLayoutId id="2147483655" r:id="rId7"/>
-    <p:sldLayoutId id="2147483656" r:id="rId8"/>
-    <p:sldLayoutId id="2147483657" r:id="rId9"/>
-    <p:sldLayoutId id="2147483658" r:id="rId10"/>
-    <p:sldLayoutId id="2147483659" r:id="rId11"/>
+    <p:sldLayoutId id="2147483679" r:id="rId1"/>
+    <p:sldLayoutId id="2147483680" r:id="rId2"/>
+    <p:sldLayoutId id="2147483681" r:id="rId3"/>
+    <p:sldLayoutId id="2147483682" r:id="rId4"/>
+    <p:sldLayoutId id="2147483683" r:id="rId5"/>
+    <p:sldLayoutId id="2147483684" r:id="rId6"/>
+    <p:sldLayoutId id="2147483685" r:id="rId7"/>
+    <p:sldLayoutId id="2147483686" r:id="rId8"/>
+    <p:sldLayoutId id="2147483687" r:id="rId9"/>
+    <p:sldLayoutId id="2147483688" r:id="rId10"/>
+    <p:sldLayoutId id="2147483689" r:id="rId11"/>
   </p:sldLayoutIdLst>
   <p:txStyles>
     <p:titleStyle>
@@ -3692,6 +5069,495 @@
 </p:sld>
 </file>
 
+<file path=ppt/slides/slide10.xml><?xml version="1.0" encoding="utf-8"?>
+<p:sld xmlns:a="http://schemas.openxmlformats.org/drawingml/2006/main" xmlns:r="http://schemas.openxmlformats.org/officeDocument/2006/relationships" xmlns:p="http://schemas.openxmlformats.org/presentationml/2006/main">
+  <p:cSld>
+    <p:spTree>
+      <p:nvGrpSpPr>
+        <p:cNvPr id="1" name=""/>
+        <p:cNvGrpSpPr/>
+        <p:nvPr/>
+      </p:nvGrpSpPr>
+      <p:grpSpPr>
+        <a:xfrm>
+          <a:off x="0" y="0"/>
+          <a:ext cx="0" cy="0"/>
+          <a:chOff x="0" y="0"/>
+          <a:chExt cx="0" cy="0"/>
+        </a:xfrm>
+      </p:grpSpPr>
+      <p:sp>
+        <p:nvSpPr>
+          <p:cNvPr id="2" name="Title 1">
+            <a:extLst>
+              <a:ext uri="{FF2B5EF4-FFF2-40B4-BE49-F238E27FC236}">
+                <a16:creationId xmlns:a16="http://schemas.microsoft.com/office/drawing/2014/main" id="{041151B9-0AF5-AE4D-AE49-B0D0612CC88A}"/>
+              </a:ext>
+            </a:extLst>
+          </p:cNvPr>
+          <p:cNvSpPr>
+            <a:spLocks noGrp="1"/>
+          </p:cNvSpPr>
+          <p:nvPr>
+            <p:ph type="title"/>
+          </p:nvPr>
+        </p:nvSpPr>
+        <p:spPr>
+          <a:xfrm>
+            <a:off x="342900" y="365125"/>
+            <a:ext cx="2838450" cy="1325563"/>
+          </a:xfrm>
+        </p:spPr>
+        <p:txBody>
+          <a:bodyPr/>
+          <a:lstStyle/>
+          <a:p>
+            <a:r>
+              <a:rPr lang="en-GB" dirty="0"/>
+              <a:t>Challenges</a:t>
+            </a:r>
+          </a:p>
+        </p:txBody>
+      </p:sp>
+      <p:sp>
+        <p:nvSpPr>
+          <p:cNvPr id="3" name="Content Placeholder 2">
+            <a:extLst>
+              <a:ext uri="{FF2B5EF4-FFF2-40B4-BE49-F238E27FC236}">
+                <a16:creationId xmlns:a16="http://schemas.microsoft.com/office/drawing/2014/main" id="{44BADFF8-53EF-F794-B22B-D4280C9DD842}"/>
+              </a:ext>
+            </a:extLst>
+          </p:cNvPr>
+          <p:cNvSpPr>
+            <a:spLocks noGrp="1"/>
+          </p:cNvSpPr>
+          <p:nvPr>
+            <p:ph idx="1"/>
+          </p:nvPr>
+        </p:nvSpPr>
+        <p:spPr>
+          <a:xfrm>
+            <a:off x="342900" y="1825625"/>
+            <a:ext cx="5257800" cy="4351338"/>
+          </a:xfrm>
+        </p:spPr>
+        <p:txBody>
+          <a:bodyPr>
+            <a:normAutofit fontScale="92500"/>
+          </a:bodyPr>
+          <a:lstStyle/>
+          <a:p>
+            <a:r>
+              <a:rPr lang="en-GB" dirty="0"/>
+              <a:t>Downloaded .csv file was 700MB – had to cut out some data before making my initial Git repository </a:t>
+            </a:r>
+          </a:p>
+          <a:p>
+            <a:endParaRPr lang="en-GB" dirty="0"/>
+          </a:p>
+          <a:p>
+            <a:r>
+              <a:rPr lang="en-GB" dirty="0"/>
+              <a:t>Large dataset with many missing, inconsistent, and erroneous entries</a:t>
+            </a:r>
+          </a:p>
+          <a:p>
+            <a:endParaRPr lang="en-GB" dirty="0"/>
+          </a:p>
+          <a:p>
+            <a:r>
+              <a:rPr lang="en-GB" dirty="0"/>
+              <a:t>Overrepresentation of the USA in the data meant that visualisations such as choropleths were unhelpful</a:t>
+            </a:r>
+          </a:p>
+          <a:p>
+            <a:endParaRPr lang="en-GB" dirty="0"/>
+          </a:p>
+        </p:txBody>
+      </p:sp>
+      <p:pic>
+        <p:nvPicPr>
+          <p:cNvPr id="5" name="Picture 4" descr="A map of the world&#10;&#10;AI-generated content may be incorrect.">
+            <a:extLst>
+              <a:ext uri="{FF2B5EF4-FFF2-40B4-BE49-F238E27FC236}">
+                <a16:creationId xmlns:a16="http://schemas.microsoft.com/office/drawing/2014/main" id="{8D3871D2-894F-F025-2173-248BB3CF7E31}"/>
+              </a:ext>
+            </a:extLst>
+          </p:cNvPr>
+          <p:cNvPicPr>
+            <a:picLocks noChangeAspect="1"/>
+          </p:cNvPicPr>
+          <p:nvPr/>
+        </p:nvPicPr>
+        <p:blipFill>
+          <a:blip r:embed="rId3"/>
+          <a:stretch>
+            <a:fillRect/>
+          </a:stretch>
+        </p:blipFill>
+        <p:spPr>
+          <a:xfrm>
+            <a:off x="5800726" y="4286250"/>
+            <a:ext cx="4478520" cy="2300288"/>
+          </a:xfrm>
+          <a:prstGeom prst="rect">
+            <a:avLst/>
+          </a:prstGeom>
+        </p:spPr>
+      </p:pic>
+      <p:pic>
+        <p:nvPicPr>
+          <p:cNvPr id="10" name="Picture 9" descr="A black and white bar code&#10;&#10;AI-generated content may be incorrect.">
+            <a:extLst>
+              <a:ext uri="{FF2B5EF4-FFF2-40B4-BE49-F238E27FC236}">
+                <a16:creationId xmlns:a16="http://schemas.microsoft.com/office/drawing/2014/main" id="{6065BB1D-A8E8-61D0-9328-CCD56FB4F8D2}"/>
+              </a:ext>
+            </a:extLst>
+          </p:cNvPr>
+          <p:cNvPicPr>
+            <a:picLocks noChangeAspect="1"/>
+          </p:cNvPicPr>
+          <p:nvPr/>
+        </p:nvPicPr>
+        <p:blipFill>
+          <a:blip r:embed="rId4" cstate="screen">
+            <a:extLst>
+              <a:ext uri="{28A0092B-C50C-407E-A947-70E740481C1C}">
+                <a14:useLocalDpi xmlns:a14="http://schemas.microsoft.com/office/drawing/2010/main"/>
+              </a:ext>
+            </a:extLst>
+          </a:blip>
+          <a:stretch>
+            <a:fillRect/>
+          </a:stretch>
+        </p:blipFill>
+        <p:spPr>
+          <a:xfrm>
+            <a:off x="5462986" y="681036"/>
+            <a:ext cx="6600426" cy="3014663"/>
+          </a:xfrm>
+          <a:prstGeom prst="rect">
+            <a:avLst/>
+          </a:prstGeom>
+        </p:spPr>
+      </p:pic>
+    </p:spTree>
+    <p:extLst>
+      <p:ext uri="{BB962C8B-B14F-4D97-AF65-F5344CB8AC3E}">
+        <p14:creationId xmlns:p14="http://schemas.microsoft.com/office/powerpoint/2010/main" val="1920541853"/>
+      </p:ext>
+    </p:extLst>
+  </p:cSld>
+  <p:clrMapOvr>
+    <a:masterClrMapping/>
+  </p:clrMapOvr>
+</p:sld>
+</file>
+
+<file path=ppt/slides/slide11.xml><?xml version="1.0" encoding="utf-8"?>
+<p:sld xmlns:a="http://schemas.openxmlformats.org/drawingml/2006/main" xmlns:r="http://schemas.openxmlformats.org/officeDocument/2006/relationships" xmlns:p="http://schemas.openxmlformats.org/presentationml/2006/main">
+  <p:cSld>
+    <p:spTree>
+      <p:nvGrpSpPr>
+        <p:cNvPr id="1" name=""/>
+        <p:cNvGrpSpPr/>
+        <p:nvPr/>
+      </p:nvGrpSpPr>
+      <p:grpSpPr>
+        <a:xfrm>
+          <a:off x="0" y="0"/>
+          <a:ext cx="0" cy="0"/>
+          <a:chOff x="0" y="0"/>
+          <a:chExt cx="0" cy="0"/>
+        </a:xfrm>
+      </p:grpSpPr>
+      <p:sp>
+        <p:nvSpPr>
+          <p:cNvPr id="5" name="Title 1">
+            <a:extLst>
+              <a:ext uri="{FF2B5EF4-FFF2-40B4-BE49-F238E27FC236}">
+                <a16:creationId xmlns:a16="http://schemas.microsoft.com/office/drawing/2014/main" id="{36112033-15C7-96B9-64E1-24F0A5E2C404}"/>
+              </a:ext>
+            </a:extLst>
+          </p:cNvPr>
+          <p:cNvSpPr txBox="1">
+            <a:spLocks/>
+          </p:cNvSpPr>
+          <p:nvPr/>
+        </p:nvSpPr>
+        <p:spPr>
+          <a:xfrm>
+            <a:off x="628651" y="447675"/>
+            <a:ext cx="4010023" cy="1325563"/>
+          </a:xfrm>
+          <a:prstGeom prst="rect">
+            <a:avLst/>
+          </a:prstGeom>
+        </p:spPr>
+        <p:txBody>
+          <a:bodyPr vert="horz" lIns="91440" tIns="45720" rIns="91440" bIns="45720" rtlCol="0" anchor="ctr">
+            <a:normAutofit/>
+          </a:bodyPr>
+          <a:lstStyle>
+            <a:lvl1pPr algn="l" defTabSz="914400" rtl="0" eaLnBrk="1" latinLnBrk="0" hangingPunct="1">
+              <a:lnSpc>
+                <a:spcPct val="90000"/>
+              </a:lnSpc>
+              <a:spcBef>
+                <a:spcPct val="0"/>
+              </a:spcBef>
+              <a:buNone/>
+              <a:defRPr sz="4400" kern="1200">
+                <a:solidFill>
+                  <a:schemeClr val="tx1"/>
+                </a:solidFill>
+                <a:latin typeface="+mj-lt"/>
+                <a:ea typeface="+mj-ea"/>
+                <a:cs typeface="+mj-cs"/>
+              </a:defRPr>
+            </a:lvl1pPr>
+          </a:lstStyle>
+          <a:p>
+            <a:r>
+              <a:rPr lang="en-GB" dirty="0"/>
+              <a:t>Future Work</a:t>
+            </a:r>
+          </a:p>
+        </p:txBody>
+      </p:sp>
+      <p:sp>
+        <p:nvSpPr>
+          <p:cNvPr id="6" name="Content Placeholder 2">
+            <a:extLst>
+              <a:ext uri="{FF2B5EF4-FFF2-40B4-BE49-F238E27FC236}">
+                <a16:creationId xmlns:a16="http://schemas.microsoft.com/office/drawing/2014/main" id="{E2E6CFA2-FAE5-F419-177C-0F34BA2A4C55}"/>
+              </a:ext>
+            </a:extLst>
+          </p:cNvPr>
+          <p:cNvSpPr txBox="1">
+            <a:spLocks/>
+          </p:cNvSpPr>
+          <p:nvPr/>
+        </p:nvSpPr>
+        <p:spPr>
+          <a:xfrm>
+            <a:off x="628649" y="1825625"/>
+            <a:ext cx="10172701" cy="4351338"/>
+          </a:xfrm>
+          <a:prstGeom prst="rect">
+            <a:avLst/>
+          </a:prstGeom>
+        </p:spPr>
+        <p:txBody>
+          <a:bodyPr vert="horz" lIns="91440" tIns="45720" rIns="91440" bIns="45720" rtlCol="0">
+            <a:normAutofit/>
+          </a:bodyPr>
+          <a:lstStyle>
+            <a:lvl1pPr marL="228600" indent="-228600" algn="l" defTabSz="914400" rtl="0" eaLnBrk="1" latinLnBrk="0" hangingPunct="1">
+              <a:lnSpc>
+                <a:spcPct val="90000"/>
+              </a:lnSpc>
+              <a:spcBef>
+                <a:spcPts val="1000"/>
+              </a:spcBef>
+              <a:buFont typeface="Arial" panose="020B0604020202020204" pitchFamily="34" charset="0"/>
+              <a:buChar char="•"/>
+              <a:defRPr sz="2800" kern="1200">
+                <a:solidFill>
+                  <a:schemeClr val="tx1"/>
+                </a:solidFill>
+                <a:latin typeface="+mn-lt"/>
+                <a:ea typeface="+mn-ea"/>
+                <a:cs typeface="+mn-cs"/>
+              </a:defRPr>
+            </a:lvl1pPr>
+            <a:lvl2pPr marL="685800" indent="-228600" algn="l" defTabSz="914400" rtl="0" eaLnBrk="1" latinLnBrk="0" hangingPunct="1">
+              <a:lnSpc>
+                <a:spcPct val="90000"/>
+              </a:lnSpc>
+              <a:spcBef>
+                <a:spcPts val="500"/>
+              </a:spcBef>
+              <a:buFont typeface="Arial" panose="020B0604020202020204" pitchFamily="34" charset="0"/>
+              <a:buChar char="•"/>
+              <a:defRPr sz="2400" kern="1200">
+                <a:solidFill>
+                  <a:schemeClr val="tx1"/>
+                </a:solidFill>
+                <a:latin typeface="+mn-lt"/>
+                <a:ea typeface="+mn-ea"/>
+                <a:cs typeface="+mn-cs"/>
+              </a:defRPr>
+            </a:lvl2pPr>
+            <a:lvl3pPr marL="1143000" indent="-228600" algn="l" defTabSz="914400" rtl="0" eaLnBrk="1" latinLnBrk="0" hangingPunct="1">
+              <a:lnSpc>
+                <a:spcPct val="90000"/>
+              </a:lnSpc>
+              <a:spcBef>
+                <a:spcPts val="500"/>
+              </a:spcBef>
+              <a:buFont typeface="Arial" panose="020B0604020202020204" pitchFamily="34" charset="0"/>
+              <a:buChar char="•"/>
+              <a:defRPr sz="2000" kern="1200">
+                <a:solidFill>
+                  <a:schemeClr val="tx1"/>
+                </a:solidFill>
+                <a:latin typeface="+mn-lt"/>
+                <a:ea typeface="+mn-ea"/>
+                <a:cs typeface="+mn-cs"/>
+              </a:defRPr>
+            </a:lvl3pPr>
+            <a:lvl4pPr marL="1600200" indent="-228600" algn="l" defTabSz="914400" rtl="0" eaLnBrk="1" latinLnBrk="0" hangingPunct="1">
+              <a:lnSpc>
+                <a:spcPct val="90000"/>
+              </a:lnSpc>
+              <a:spcBef>
+                <a:spcPts val="500"/>
+              </a:spcBef>
+              <a:buFont typeface="Arial" panose="020B0604020202020204" pitchFamily="34" charset="0"/>
+              <a:buChar char="•"/>
+              <a:defRPr sz="1800" kern="1200">
+                <a:solidFill>
+                  <a:schemeClr val="tx1"/>
+                </a:solidFill>
+                <a:latin typeface="+mn-lt"/>
+                <a:ea typeface="+mn-ea"/>
+                <a:cs typeface="+mn-cs"/>
+              </a:defRPr>
+            </a:lvl4pPr>
+            <a:lvl5pPr marL="2057400" indent="-228600" algn="l" defTabSz="914400" rtl="0" eaLnBrk="1" latinLnBrk="0" hangingPunct="1">
+              <a:lnSpc>
+                <a:spcPct val="90000"/>
+              </a:lnSpc>
+              <a:spcBef>
+                <a:spcPts val="500"/>
+              </a:spcBef>
+              <a:buFont typeface="Arial" panose="020B0604020202020204" pitchFamily="34" charset="0"/>
+              <a:buChar char="•"/>
+              <a:defRPr sz="1800" kern="1200">
+                <a:solidFill>
+                  <a:schemeClr val="tx1"/>
+                </a:solidFill>
+                <a:latin typeface="+mn-lt"/>
+                <a:ea typeface="+mn-ea"/>
+                <a:cs typeface="+mn-cs"/>
+              </a:defRPr>
+            </a:lvl5pPr>
+            <a:lvl6pPr marL="2514600" indent="-228600" algn="l" defTabSz="914400" rtl="0" eaLnBrk="1" latinLnBrk="0" hangingPunct="1">
+              <a:lnSpc>
+                <a:spcPct val="90000"/>
+              </a:lnSpc>
+              <a:spcBef>
+                <a:spcPts val="500"/>
+              </a:spcBef>
+              <a:buFont typeface="Arial" panose="020B0604020202020204" pitchFamily="34" charset="0"/>
+              <a:buChar char="•"/>
+              <a:defRPr sz="1800" kern="1200">
+                <a:solidFill>
+                  <a:schemeClr val="tx1"/>
+                </a:solidFill>
+                <a:latin typeface="+mn-lt"/>
+                <a:ea typeface="+mn-ea"/>
+                <a:cs typeface="+mn-cs"/>
+              </a:defRPr>
+            </a:lvl6pPr>
+            <a:lvl7pPr marL="2971800" indent="-228600" algn="l" defTabSz="914400" rtl="0" eaLnBrk="1" latinLnBrk="0" hangingPunct="1">
+              <a:lnSpc>
+                <a:spcPct val="90000"/>
+              </a:lnSpc>
+              <a:spcBef>
+                <a:spcPts val="500"/>
+              </a:spcBef>
+              <a:buFont typeface="Arial" panose="020B0604020202020204" pitchFamily="34" charset="0"/>
+              <a:buChar char="•"/>
+              <a:defRPr sz="1800" kern="1200">
+                <a:solidFill>
+                  <a:schemeClr val="tx1"/>
+                </a:solidFill>
+                <a:latin typeface="+mn-lt"/>
+                <a:ea typeface="+mn-ea"/>
+                <a:cs typeface="+mn-cs"/>
+              </a:defRPr>
+            </a:lvl7pPr>
+            <a:lvl8pPr marL="3429000" indent="-228600" algn="l" defTabSz="914400" rtl="0" eaLnBrk="1" latinLnBrk="0" hangingPunct="1">
+              <a:lnSpc>
+                <a:spcPct val="90000"/>
+              </a:lnSpc>
+              <a:spcBef>
+                <a:spcPts val="500"/>
+              </a:spcBef>
+              <a:buFont typeface="Arial" panose="020B0604020202020204" pitchFamily="34" charset="0"/>
+              <a:buChar char="•"/>
+              <a:defRPr sz="1800" kern="1200">
+                <a:solidFill>
+                  <a:schemeClr val="tx1"/>
+                </a:solidFill>
+                <a:latin typeface="+mn-lt"/>
+                <a:ea typeface="+mn-ea"/>
+                <a:cs typeface="+mn-cs"/>
+              </a:defRPr>
+            </a:lvl8pPr>
+            <a:lvl9pPr marL="3886200" indent="-228600" algn="l" defTabSz="914400" rtl="0" eaLnBrk="1" latinLnBrk="0" hangingPunct="1">
+              <a:lnSpc>
+                <a:spcPct val="90000"/>
+              </a:lnSpc>
+              <a:spcBef>
+                <a:spcPts val="500"/>
+              </a:spcBef>
+              <a:buFont typeface="Arial" panose="020B0604020202020204" pitchFamily="34" charset="0"/>
+              <a:buChar char="•"/>
+              <a:defRPr sz="1800" kern="1200">
+                <a:solidFill>
+                  <a:schemeClr val="tx1"/>
+                </a:solidFill>
+                <a:latin typeface="+mn-lt"/>
+                <a:ea typeface="+mn-ea"/>
+                <a:cs typeface="+mn-cs"/>
+              </a:defRPr>
+            </a:lvl9pPr>
+          </a:lstStyle>
+          <a:p>
+            <a:r>
+              <a:rPr lang="en-GB" dirty="0"/>
+              <a:t>Extend analysis to female competitors – do the same trends and distributions hold?</a:t>
+            </a:r>
+          </a:p>
+          <a:p>
+            <a:endParaRPr lang="en-GB" dirty="0"/>
+          </a:p>
+          <a:p>
+            <a:r>
+              <a:rPr lang="en-GB" dirty="0"/>
+              <a:t>Investigate raw vs equipment, and drug tested vs untested</a:t>
+            </a:r>
+          </a:p>
+          <a:p>
+            <a:endParaRPr lang="en-GB" dirty="0"/>
+          </a:p>
+          <a:p>
+            <a:r>
+              <a:rPr lang="en-GB" dirty="0"/>
+              <a:t>Percentile-based performance trends to see changes at elite-level</a:t>
+            </a:r>
+          </a:p>
+          <a:p>
+            <a:endParaRPr lang="en-GB" dirty="0"/>
+          </a:p>
+        </p:txBody>
+      </p:sp>
+    </p:spTree>
+    <p:extLst>
+      <p:ext uri="{BB962C8B-B14F-4D97-AF65-F5344CB8AC3E}">
+        <p14:creationId xmlns:p14="http://schemas.microsoft.com/office/powerpoint/2010/main" val="2742919428"/>
+      </p:ext>
+    </p:extLst>
+  </p:cSld>
+  <p:clrMapOvr>
+    <a:masterClrMapping/>
+  </p:clrMapOvr>
+</p:sld>
+</file>
+
 <file path=ppt/slides/slide2.xml><?xml version="1.0" encoding="utf-8"?>
 <p:sld xmlns:a="http://schemas.openxmlformats.org/drawingml/2006/main" xmlns:r="http://schemas.openxmlformats.org/officeDocument/2006/relationships" xmlns:p="http://schemas.openxmlformats.org/presentationml/2006/main">
   <p:cSld>
@@ -3714,7 +5580,7 @@
           <p:cNvPr id="2" name="Title 1">
             <a:extLst>
               <a:ext uri="{FF2B5EF4-FFF2-40B4-BE49-F238E27FC236}">
-                <a16:creationId xmlns:a16="http://schemas.microsoft.com/office/drawing/2014/main" id="{FCC13BA0-F068-DCF0-E2EE-4BE68880D79F}"/>
+                <a16:creationId xmlns:a16="http://schemas.microsoft.com/office/drawing/2014/main" id="{8F65423F-7669-24E8-A436-BDA19DE4FAAF}"/>
               </a:ext>
             </a:extLst>
           </p:cNvPr>
@@ -3732,7 +5598,7 @@
           <a:p>
             <a:r>
               <a:rPr lang="en-GB" dirty="0"/>
-              <a:t>Powerlifting</a:t>
+              <a:t>Contents</a:t>
             </a:r>
           </a:p>
         </p:txBody>
@@ -3742,7 +5608,7 @@
           <p:cNvPr id="3" name="Content Placeholder 2">
             <a:extLst>
               <a:ext uri="{FF2B5EF4-FFF2-40B4-BE49-F238E27FC236}">
-                <a16:creationId xmlns:a16="http://schemas.microsoft.com/office/drawing/2014/main" id="{CC9B1DC6-986F-6703-FC41-68CE31F5F707}"/>
+                <a16:creationId xmlns:a16="http://schemas.microsoft.com/office/drawing/2014/main" id="{CE70E1B6-1B00-5419-8583-F7D019DD9E8C}"/>
               </a:ext>
             </a:extLst>
           </p:cNvPr>
@@ -3753,90 +5619,70 @@
             <p:ph idx="1"/>
           </p:nvPr>
         </p:nvSpPr>
-        <p:spPr>
-          <a:xfrm>
-            <a:off x="838200" y="1690688"/>
-            <a:ext cx="4804954" cy="4351338"/>
-          </a:xfrm>
-        </p:spPr>
-        <p:txBody>
-          <a:bodyPr>
-            <a:normAutofit fontScale="92500"/>
-          </a:bodyPr>
+        <p:spPr/>
+        <p:txBody>
+          <a:bodyPr/>
           <a:lstStyle/>
           <a:p>
             <a:r>
               <a:rPr lang="en-GB" dirty="0"/>
-              <a:t>Goal is to achieve the heaviest combined total weight for </a:t>
-            </a:r>
-            <a:r>
-              <a:rPr lang="en-GB" b="1" dirty="0"/>
-              <a:t>squat, bench press, and deadlift</a:t>
+              <a:t>Introduction to Powerlifting</a:t>
+            </a:r>
+          </a:p>
+          <a:p>
+            <a:r>
+              <a:rPr lang="en-GB" dirty="0"/>
+              <a:t>Growth of the sport over recent years</a:t>
+            </a:r>
+          </a:p>
+          <a:p>
+            <a:r>
+              <a:rPr lang="en-GB" dirty="0"/>
+              <a:t>Demographic and Distribution of the data</a:t>
+            </a:r>
+          </a:p>
+          <a:p>
+            <a:r>
+              <a:rPr lang="en-GB" dirty="0"/>
+              <a:t>Performance trends over time</a:t>
+            </a:r>
+          </a:p>
+          <a:p>
+            <a:r>
+              <a:rPr lang="en-GB" dirty="0"/>
+              <a:t>Strength vs Bodyweight</a:t>
+            </a:r>
+          </a:p>
+          <a:p>
+            <a:r>
+              <a:rPr lang="en-GB" dirty="0"/>
+              <a:t>Correlations between each lift</a:t>
+            </a:r>
+          </a:p>
+          <a:p>
+            <a:r>
+              <a:rPr lang="en-GB" dirty="0"/>
+              <a:t>Challenges</a:t>
+            </a:r>
+          </a:p>
+          <a:p>
+            <a:r>
+              <a:rPr lang="en-GB" dirty="0"/>
+              <a:t>Future Work</a:t>
             </a:r>
           </a:p>
           <a:p>
             <a:endParaRPr lang="en-GB" dirty="0"/>
           </a:p>
           <a:p>
-            <a:r>
-              <a:rPr lang="en-GB" dirty="0"/>
-              <a:t>Has seen a surge in popularity in recent years</a:t>
-            </a:r>
-          </a:p>
-          <a:p>
             <a:endParaRPr lang="en-GB" dirty="0"/>
           </a:p>
-          <a:p>
-            <a:r>
-              <a:rPr lang="en-GB" dirty="0"/>
-              <a:t>Drop in participation in 2020 due to COVID-19 and lockdowns</a:t>
-            </a:r>
-          </a:p>
-          <a:p>
-            <a:endParaRPr lang="en-GB" sz="1800" dirty="0"/>
-          </a:p>
-        </p:txBody>
-      </p:sp>
-      <p:pic>
-        <p:nvPicPr>
-          <p:cNvPr id="8" name="Picture 7" descr="A graph with a line and a red dot&#10;&#10;AI-generated content may be incorrect.">
-            <a:extLst>
-              <a:ext uri="{FF2B5EF4-FFF2-40B4-BE49-F238E27FC236}">
-                <a16:creationId xmlns:a16="http://schemas.microsoft.com/office/drawing/2014/main" id="{958F027D-1AF8-3C26-0D27-FF7035A8953F}"/>
-              </a:ext>
-            </a:extLst>
-          </p:cNvPr>
-          <p:cNvPicPr>
-            <a:picLocks noChangeAspect="1"/>
-          </p:cNvPicPr>
-          <p:nvPr/>
-        </p:nvPicPr>
-        <p:blipFill>
-          <a:blip r:embed="rId2">
-            <a:extLst>
-              <a:ext uri="{28A0092B-C50C-407E-A947-70E740481C1C}">
-                <a14:useLocalDpi xmlns:a14="http://schemas.microsoft.com/office/drawing/2010/main" val="0"/>
-              </a:ext>
-            </a:extLst>
-          </a:blip>
-          <a:stretch>
-            <a:fillRect/>
-          </a:stretch>
-        </p:blipFill>
-        <p:spPr>
-          <a:xfrm>
-            <a:off x="6021617" y="1249650"/>
-            <a:ext cx="5769789" cy="4358699"/>
-          </a:xfrm>
-          <a:prstGeom prst="rect">
-            <a:avLst/>
-          </a:prstGeom>
-        </p:spPr>
-      </p:pic>
+        </p:txBody>
+      </p:sp>
     </p:spTree>
     <p:extLst>
       <p:ext uri="{BB962C8B-B14F-4D97-AF65-F5344CB8AC3E}">
-        <p14:creationId xmlns:p14="http://schemas.microsoft.com/office/powerpoint/2010/main" val="1147669296"/>
+        <p14:creationId xmlns:p14="http://schemas.microsoft.com/office/powerpoint/2010/main" val="3155341710"/>
       </p:ext>
     </p:extLst>
   </p:cSld>
@@ -3868,7 +5714,7 @@
           <p:cNvPr id="2" name="Title 1">
             <a:extLst>
               <a:ext uri="{FF2B5EF4-FFF2-40B4-BE49-F238E27FC236}">
-                <a16:creationId xmlns:a16="http://schemas.microsoft.com/office/drawing/2014/main" id="{CD4D3E3E-0BEA-64A5-6B02-0FF06ADAB3AE}"/>
+                <a16:creationId xmlns:a16="http://schemas.microsoft.com/office/drawing/2014/main" id="{5BCF310D-5985-FA41-D37D-AD2CFBF88747}"/>
               </a:ext>
             </a:extLst>
           </p:cNvPr>
@@ -3886,7 +5732,7 @@
           <a:p>
             <a:r>
               <a:rPr lang="en-GB" dirty="0"/>
-              <a:t>Demographic</a:t>
+              <a:t>Introduction to Powerlifting</a:t>
             </a:r>
           </a:p>
         </p:txBody>
@@ -3896,7 +5742,7 @@
           <p:cNvPr id="3" name="Content Placeholder 2">
             <a:extLst>
               <a:ext uri="{FF2B5EF4-FFF2-40B4-BE49-F238E27FC236}">
-                <a16:creationId xmlns:a16="http://schemas.microsoft.com/office/drawing/2014/main" id="{319A8A4B-E4BF-8A91-3DBA-CC6913E6DF4D}"/>
+                <a16:creationId xmlns:a16="http://schemas.microsoft.com/office/drawing/2014/main" id="{7E376710-2B7C-0838-C6DD-11CAA6AC922F}"/>
               </a:ext>
             </a:extLst>
           </p:cNvPr>
@@ -3910,80 +5756,136 @@
         <p:spPr>
           <a:xfrm>
             <a:off x="838200" y="1825625"/>
-            <a:ext cx="4665616" cy="4351338"/>
+            <a:ext cx="10972800" cy="4351338"/>
           </a:xfrm>
         </p:spPr>
         <p:txBody>
-          <a:bodyPr>
-            <a:normAutofit/>
-          </a:bodyPr>
-          <a:lstStyle/>
-          <a:p>
-            <a:r>
-              <a:rPr lang="en-GB" sz="2600" dirty="0"/>
-              <a:t>USA appears to host the most meets</a:t>
-            </a:r>
-          </a:p>
-          <a:p>
-            <a:endParaRPr lang="en-GB" sz="2600" dirty="0"/>
-          </a:p>
-          <a:p>
-            <a:r>
-              <a:rPr lang="en-GB" sz="2600" dirty="0"/>
-              <a:t>Russia, Ukraine, Canada, and England also have large participation</a:t>
-            </a:r>
-          </a:p>
-          <a:p>
-            <a:endParaRPr lang="en-GB" sz="2600" dirty="0"/>
-          </a:p>
-          <a:p>
-            <a:r>
-              <a:rPr lang="en-GB" sz="2600" dirty="0"/>
-              <a:t>Lifter nationality was missing data for 950,000 people – meet country is a better indicator</a:t>
+          <a:bodyPr/>
+          <a:lstStyle/>
+          <a:p>
+            <a:r>
+              <a:rPr lang="en-GB" dirty="0"/>
+              <a:t>Strength sport comprised of three lifts: </a:t>
+            </a:r>
+            <a:r>
+              <a:rPr lang="en-GB" b="1" dirty="0"/>
+              <a:t>Squat, Bench Press, and Deadlift</a:t>
+            </a:r>
+          </a:p>
+          <a:p>
+            <a:endParaRPr lang="en-GB" b="1" dirty="0"/>
+          </a:p>
+          <a:p>
+            <a:r>
+              <a:rPr lang="en-GB" dirty="0"/>
+              <a:t>Competitors are grouped by sex, age, and bodyweight class</a:t>
+            </a:r>
+          </a:p>
+          <a:p>
+            <a:endParaRPr lang="en-GB" dirty="0"/>
+          </a:p>
+          <a:p>
+            <a:r>
+              <a:rPr lang="en-GB" dirty="0"/>
+              <a:t>Performance is ranked by the </a:t>
+            </a:r>
+            <a:r>
+              <a:rPr lang="en-GB" b="1" dirty="0"/>
+              <a:t>total </a:t>
+            </a:r>
+            <a:r>
+              <a:rPr lang="en-GB" dirty="0"/>
+              <a:t>weight lifted across the three lifts</a:t>
             </a:r>
           </a:p>
         </p:txBody>
       </p:sp>
       <p:pic>
         <p:nvPicPr>
-          <p:cNvPr id="6" name="Picture 5" descr="A graph of a number of countries/regions&#10;&#10;AI-generated content may be incorrect.">
-            <a:extLst>
-              <a:ext uri="{FF2B5EF4-FFF2-40B4-BE49-F238E27FC236}">
-                <a16:creationId xmlns:a16="http://schemas.microsoft.com/office/drawing/2014/main" id="{69AA037A-A47D-C8ED-77CB-CEC2E4724F16}"/>
+          <p:cNvPr id="1026" name="Picture 2" descr="Squat Bench Deadlift Logo, HD Png Download , Transparent Png ...">
+            <a:extLst>
+              <a:ext uri="{FF2B5EF4-FFF2-40B4-BE49-F238E27FC236}">
+                <a16:creationId xmlns:a16="http://schemas.microsoft.com/office/drawing/2014/main" id="{2D45F3D4-5101-3A98-0830-F0320FEEAA9D}"/>
               </a:ext>
             </a:extLst>
           </p:cNvPr>
           <p:cNvPicPr>
-            <a:picLocks noChangeAspect="1"/>
+            <a:picLocks noChangeAspect="1" noChangeArrowheads="1"/>
           </p:cNvPicPr>
           <p:nvPr/>
         </p:nvPicPr>
         <p:blipFill>
-          <a:blip r:embed="rId2">
+          <a:blip r:embed="rId3">
             <a:extLst>
               <a:ext uri="{28A0092B-C50C-407E-A947-70E740481C1C}">
                 <a14:useLocalDpi xmlns:a14="http://schemas.microsoft.com/office/drawing/2010/main" val="0"/>
               </a:ext>
             </a:extLst>
           </a:blip>
+          <a:srcRect/>
           <a:stretch>
             <a:fillRect/>
           </a:stretch>
         </p:blipFill>
-        <p:spPr>
+        <p:spPr bwMode="auto">
           <a:xfrm>
-            <a:off x="5692411" y="1255834"/>
-            <a:ext cx="6421212" cy="4346331"/>
+            <a:off x="3743325" y="4371975"/>
+            <a:ext cx="4320268" cy="2419350"/>
           </a:xfrm>
           <a:prstGeom prst="rect">
             <a:avLst/>
           </a:prstGeom>
+          <a:noFill/>
+          <a:extLst>
+            <a:ext uri="{909E8E84-426E-40DD-AFC4-6F175D3DCCD1}">
+              <a14:hiddenFill xmlns:a14="http://schemas.microsoft.com/office/drawing/2010/main">
+                <a:solidFill>
+                  <a:srgbClr val="FFFFFF"/>
+                </a:solidFill>
+              </a14:hiddenFill>
+            </a:ext>
+          </a:extLst>
         </p:spPr>
       </p:pic>
+      <p:sp>
+        <p:nvSpPr>
+          <p:cNvPr id="4" name="TextBox 3">
+            <a:extLst>
+              <a:ext uri="{FF2B5EF4-FFF2-40B4-BE49-F238E27FC236}">
+                <a16:creationId xmlns:a16="http://schemas.microsoft.com/office/drawing/2014/main" id="{F33ABE7D-527C-DF14-327C-14D2EDD7F643}"/>
+              </a:ext>
+            </a:extLst>
+          </p:cNvPr>
+          <p:cNvSpPr txBox="1"/>
+          <p:nvPr/>
+        </p:nvSpPr>
+        <p:spPr>
+          <a:xfrm>
+            <a:off x="104775" y="6253311"/>
+            <a:ext cx="3705225" cy="461665"/>
+          </a:xfrm>
+          <a:prstGeom prst="rect">
+            <a:avLst/>
+          </a:prstGeom>
+          <a:noFill/>
+        </p:spPr>
+        <p:txBody>
+          <a:bodyPr wrap="square" rtlCol="0">
+            <a:spAutoFit/>
+          </a:bodyPr>
+          <a:lstStyle/>
+          <a:p>
+            <a:r>
+              <a:rPr lang="en-GB" sz="1200" dirty="0"/>
+              <a:t>Image: https://uk.pinterest.com/pin/942870871998359457/</a:t>
+            </a:r>
+          </a:p>
+        </p:txBody>
+      </p:sp>
     </p:spTree>
     <p:extLst>
       <p:ext uri="{BB962C8B-B14F-4D97-AF65-F5344CB8AC3E}">
-        <p14:creationId xmlns:p14="http://schemas.microsoft.com/office/powerpoint/2010/main" val="1279047858"/>
+        <p14:creationId xmlns:p14="http://schemas.microsoft.com/office/powerpoint/2010/main" val="1202273033"/>
       </p:ext>
     </p:extLst>
   </p:cSld>
@@ -4015,7 +5917,7 @@
           <p:cNvPr id="2" name="Title 1">
             <a:extLst>
               <a:ext uri="{FF2B5EF4-FFF2-40B4-BE49-F238E27FC236}">
-                <a16:creationId xmlns:a16="http://schemas.microsoft.com/office/drawing/2014/main" id="{BFE9021B-1019-5750-1221-78479D692957}"/>
+                <a16:creationId xmlns:a16="http://schemas.microsoft.com/office/drawing/2014/main" id="{FCC13BA0-F068-DCF0-E2EE-4BE68880D79F}"/>
               </a:ext>
             </a:extLst>
           </p:cNvPr>
@@ -4024,40 +5926,45 @@
           </p:cNvSpPr>
           <p:nvPr>
             <p:ph type="title"/>
-          </p:nvPr>
-        </p:nvSpPr>
-        <p:spPr/>
-        <p:txBody>
-          <a:bodyPr/>
-          <a:lstStyle/>
-          <a:p>
-            <a:r>
-              <a:rPr lang="en-GB" dirty="0"/>
-              <a:t>Performance Change?</a:t>
-            </a:r>
-          </a:p>
-        </p:txBody>
-      </p:sp>
-      <p:sp>
-        <p:nvSpPr>
-          <p:cNvPr id="3" name="Content Placeholder 2">
-            <a:extLst>
-              <a:ext uri="{FF2B5EF4-FFF2-40B4-BE49-F238E27FC236}">
-                <a16:creationId xmlns:a16="http://schemas.microsoft.com/office/drawing/2014/main" id="{D0FFC11D-57F5-5EC0-A365-7638EC1640CC}"/>
-              </a:ext>
-            </a:extLst>
-          </p:cNvPr>
-          <p:cNvSpPr>
-            <a:spLocks noGrp="1"/>
-          </p:cNvSpPr>
-          <p:nvPr>
-            <p:ph idx="1"/>
           </p:nvPr>
         </p:nvSpPr>
         <p:spPr>
           <a:xfrm>
-            <a:off x="838200" y="1825625"/>
-            <a:ext cx="5858692" cy="4351338"/>
+            <a:off x="331535" y="365125"/>
+            <a:ext cx="10515600" cy="1325563"/>
+          </a:xfrm>
+        </p:spPr>
+        <p:txBody>
+          <a:bodyPr/>
+          <a:lstStyle/>
+          <a:p>
+            <a:r>
+              <a:rPr lang="en-GB" dirty="0"/>
+              <a:t>Growing Sport</a:t>
+            </a:r>
+          </a:p>
+        </p:txBody>
+      </p:sp>
+      <p:sp>
+        <p:nvSpPr>
+          <p:cNvPr id="3" name="Content Placeholder 2">
+            <a:extLst>
+              <a:ext uri="{FF2B5EF4-FFF2-40B4-BE49-F238E27FC236}">
+                <a16:creationId xmlns:a16="http://schemas.microsoft.com/office/drawing/2014/main" id="{CC9B1DC6-986F-6703-FC41-68CE31F5F707}"/>
+              </a:ext>
+            </a:extLst>
+          </p:cNvPr>
+          <p:cNvSpPr>
+            <a:spLocks noGrp="1"/>
+          </p:cNvSpPr>
+          <p:nvPr>
+            <p:ph idx="1"/>
+          </p:nvPr>
+        </p:nvSpPr>
+        <p:spPr>
+          <a:xfrm>
+            <a:off x="355783" y="1690688"/>
+            <a:ext cx="4804954" cy="4351338"/>
           </a:xfrm>
         </p:spPr>
         <p:txBody>
@@ -4068,7 +5975,7 @@
           <a:p>
             <a:r>
               <a:rPr lang="en-GB" sz="2600" dirty="0"/>
-              <a:t>Used the mean Total Kg lifted for the 5 most common weight classes</a:t>
+              <a:t>Has seen a surge in popularity in recent years</a:t>
             </a:r>
           </a:p>
           <a:p>
@@ -4077,7 +5984,7 @@
           <a:p>
             <a:r>
               <a:rPr lang="en-GB" sz="2600" dirty="0"/>
-              <a:t>Some decrease around 2010 for 100kg, 90kg, and 82.5kg</a:t>
+              <a:t>Many factors around 2009 could have influenced the sharp increase</a:t>
             </a:r>
           </a:p>
           <a:p>
@@ -4086,17 +5993,20 @@
           <a:p>
             <a:r>
               <a:rPr lang="en-GB" sz="2600" dirty="0"/>
-              <a:t>The 83kg class was only added in 2010 when federations such as the IPF began to use it</a:t>
-            </a:r>
+              <a:t>Drop in participation in 2020 due to COVID-19 and lockdowns</a:t>
+            </a:r>
+          </a:p>
+          <a:p>
+            <a:endParaRPr lang="en-GB" sz="1800" dirty="0"/>
           </a:p>
         </p:txBody>
       </p:sp>
       <p:pic>
         <p:nvPicPr>
-          <p:cNvPr id="5" name="Picture 4" descr="A graph of weight class&#10;&#10;AI-generated content may be incorrect.">
-            <a:extLst>
-              <a:ext uri="{FF2B5EF4-FFF2-40B4-BE49-F238E27FC236}">
-                <a16:creationId xmlns:a16="http://schemas.microsoft.com/office/drawing/2014/main" id="{C202DD01-335C-8349-A8CE-97D040495230}"/>
+          <p:cNvPr id="8" name="Picture 7" descr="A graph with a line and a red dot&#10;&#10;AI-generated content may be incorrect.">
+            <a:extLst>
+              <a:ext uri="{FF2B5EF4-FFF2-40B4-BE49-F238E27FC236}">
+                <a16:creationId xmlns:a16="http://schemas.microsoft.com/office/drawing/2014/main" id="{958F027D-1AF8-3C26-0D27-FF7035A8953F}"/>
               </a:ext>
             </a:extLst>
           </p:cNvPr>
@@ -4106,7 +6016,7 @@
           <p:nvPr/>
         </p:nvPicPr>
         <p:blipFill>
-          <a:blip r:embed="rId2">
+          <a:blip r:embed="rId3">
             <a:extLst>
               <a:ext uri="{28A0092B-C50C-407E-A947-70E740481C1C}">
                 <a14:useLocalDpi xmlns:a14="http://schemas.microsoft.com/office/drawing/2010/main" val="0"/>
@@ -4119,8 +6029,8 @@
         </p:blipFill>
         <p:spPr>
           <a:xfrm>
-            <a:off x="6696892" y="792480"/>
-            <a:ext cx="5105001" cy="4953544"/>
+            <a:off x="5610225" y="1080386"/>
+            <a:ext cx="6431215" cy="4858363"/>
           </a:xfrm>
           <a:prstGeom prst="rect">
             <a:avLst/>
@@ -4130,7 +6040,7 @@
     </p:spTree>
     <p:extLst>
       <p:ext uri="{BB962C8B-B14F-4D97-AF65-F5344CB8AC3E}">
-        <p14:creationId xmlns:p14="http://schemas.microsoft.com/office/powerpoint/2010/main" val="2492349518"/>
+        <p14:creationId xmlns:p14="http://schemas.microsoft.com/office/powerpoint/2010/main" val="1147669296"/>
       </p:ext>
     </p:extLst>
   </p:cSld>
@@ -4162,7 +6072,7 @@
           <p:cNvPr id="2" name="Title 1">
             <a:extLst>
               <a:ext uri="{FF2B5EF4-FFF2-40B4-BE49-F238E27FC236}">
-                <a16:creationId xmlns:a16="http://schemas.microsoft.com/office/drawing/2014/main" id="{041151B9-0AF5-AE4D-AE49-B0D0612CC88A}"/>
+                <a16:creationId xmlns:a16="http://schemas.microsoft.com/office/drawing/2014/main" id="{CD4D3E3E-0BEA-64A5-6B02-0FF06ADAB3AE}"/>
               </a:ext>
             </a:extLst>
           </p:cNvPr>
@@ -4173,14 +6083,19 @@
             <p:ph type="title"/>
           </p:nvPr>
         </p:nvSpPr>
-        <p:spPr/>
+        <p:spPr>
+          <a:xfrm>
+            <a:off x="438150" y="365125"/>
+            <a:ext cx="10515600" cy="1325563"/>
+          </a:xfrm>
+        </p:spPr>
         <p:txBody>
           <a:bodyPr/>
           <a:lstStyle/>
           <a:p>
             <a:r>
               <a:rPr lang="en-GB" dirty="0"/>
-              <a:t>Initial Difficulties</a:t>
+              <a:t>Demographic</a:t>
             </a:r>
           </a:p>
         </p:txBody>
@@ -4190,7 +6105,7 @@
           <p:cNvPr id="3" name="Content Placeholder 2">
             <a:extLst>
               <a:ext uri="{FF2B5EF4-FFF2-40B4-BE49-F238E27FC236}">
-                <a16:creationId xmlns:a16="http://schemas.microsoft.com/office/drawing/2014/main" id="{44BADFF8-53EF-F794-B22B-D4280C9DD842}"/>
+                <a16:creationId xmlns:a16="http://schemas.microsoft.com/office/drawing/2014/main" id="{319A8A4B-E4BF-8A91-3DBA-CC6913E6DF4D}"/>
               </a:ext>
             </a:extLst>
           </p:cNvPr>
@@ -4201,34 +6116,675 @@
             <p:ph idx="1"/>
           </p:nvPr>
         </p:nvSpPr>
-        <p:spPr/>
-        <p:txBody>
-          <a:bodyPr/>
-          <a:lstStyle/>
-          <a:p>
-            <a:r>
-              <a:rPr lang="en-GB" dirty="0"/>
-              <a:t>Downloaded .csv file was 700MB – had to cut out some data before making my initial git repo</a:t>
-            </a:r>
-          </a:p>
-          <a:p>
-            <a:endParaRPr lang="en-GB" dirty="0"/>
-          </a:p>
-          <a:p>
-            <a:r>
-              <a:rPr lang="en-GB" dirty="0"/>
-              <a:t>Had to restart git repo due to accidentally multiplying the saved data inside it</a:t>
-            </a:r>
-          </a:p>
-          <a:p>
-            <a:endParaRPr lang="en-GB" dirty="0"/>
-          </a:p>
-        </p:txBody>
-      </p:sp>
+        <p:spPr>
+          <a:xfrm>
+            <a:off x="438150" y="1690688"/>
+            <a:ext cx="4665616" cy="4351338"/>
+          </a:xfrm>
+        </p:spPr>
+        <p:txBody>
+          <a:bodyPr>
+            <a:normAutofit lnSpcReduction="10000"/>
+          </a:bodyPr>
+          <a:lstStyle/>
+          <a:p>
+            <a:r>
+              <a:rPr lang="en-GB" sz="2600" dirty="0"/>
+              <a:t>USA appears to host the most meets</a:t>
+            </a:r>
+          </a:p>
+          <a:p>
+            <a:endParaRPr lang="en-GB" sz="2600" dirty="0"/>
+          </a:p>
+          <a:p>
+            <a:r>
+              <a:rPr lang="en-GB" sz="2600" dirty="0"/>
+              <a:t>Russia, Ukraine, Canada, and England also have large participation</a:t>
+            </a:r>
+          </a:p>
+          <a:p>
+            <a:endParaRPr lang="en-GB" sz="2600" dirty="0"/>
+          </a:p>
+          <a:p>
+            <a:r>
+              <a:rPr lang="en-GB" sz="2600" dirty="0"/>
+              <a:t>Lifter nationality data was missing for over 650,000 people – meet country is a better indicator</a:t>
+            </a:r>
+          </a:p>
+        </p:txBody>
+      </p:sp>
+      <p:pic>
+        <p:nvPicPr>
+          <p:cNvPr id="6" name="Picture 5" descr="A graph of a number of countries/regions&#10;&#10;AI-generated content may be incorrect.">
+            <a:extLst>
+              <a:ext uri="{FF2B5EF4-FFF2-40B4-BE49-F238E27FC236}">
+                <a16:creationId xmlns:a16="http://schemas.microsoft.com/office/drawing/2014/main" id="{69AA037A-A47D-C8ED-77CB-CEC2E4724F16}"/>
+              </a:ext>
+            </a:extLst>
+          </p:cNvPr>
+          <p:cNvPicPr>
+            <a:picLocks noChangeAspect="1"/>
+          </p:cNvPicPr>
+          <p:nvPr/>
+        </p:nvPicPr>
+        <p:blipFill>
+          <a:blip r:embed="rId3">
+            <a:extLst>
+              <a:ext uri="{28A0092B-C50C-407E-A947-70E740481C1C}">
+                <a14:useLocalDpi xmlns:a14="http://schemas.microsoft.com/office/drawing/2010/main" val="0"/>
+              </a:ext>
+            </a:extLst>
+          </a:blip>
+          <a:stretch>
+            <a:fillRect/>
+          </a:stretch>
+        </p:blipFill>
+        <p:spPr>
+          <a:xfrm>
+            <a:off x="5103766" y="1255834"/>
+            <a:ext cx="7009857" cy="4744768"/>
+          </a:xfrm>
+          <a:prstGeom prst="rect">
+            <a:avLst/>
+          </a:prstGeom>
+        </p:spPr>
+      </p:pic>
     </p:spTree>
     <p:extLst>
       <p:ext uri="{BB962C8B-B14F-4D97-AF65-F5344CB8AC3E}">
-        <p14:creationId xmlns:p14="http://schemas.microsoft.com/office/powerpoint/2010/main" val="1920541853"/>
+        <p14:creationId xmlns:p14="http://schemas.microsoft.com/office/powerpoint/2010/main" val="1279047858"/>
+      </p:ext>
+    </p:extLst>
+  </p:cSld>
+  <p:clrMapOvr>
+    <a:masterClrMapping/>
+  </p:clrMapOvr>
+</p:sld>
+</file>
+
+<file path=ppt/slides/slide6.xml><?xml version="1.0" encoding="utf-8"?>
+<p:sld xmlns:a="http://schemas.openxmlformats.org/drawingml/2006/main" xmlns:r="http://schemas.openxmlformats.org/officeDocument/2006/relationships" xmlns:p="http://schemas.openxmlformats.org/presentationml/2006/main">
+  <p:cSld>
+    <p:spTree>
+      <p:nvGrpSpPr>
+        <p:cNvPr id="1" name=""/>
+        <p:cNvGrpSpPr/>
+        <p:nvPr/>
+      </p:nvGrpSpPr>
+      <p:grpSpPr>
+        <a:xfrm>
+          <a:off x="0" y="0"/>
+          <a:ext cx="0" cy="0"/>
+          <a:chOff x="0" y="0"/>
+          <a:chExt cx="0" cy="0"/>
+        </a:xfrm>
+      </p:grpSpPr>
+      <p:sp>
+        <p:nvSpPr>
+          <p:cNvPr id="2" name="Title 1">
+            <a:extLst>
+              <a:ext uri="{FF2B5EF4-FFF2-40B4-BE49-F238E27FC236}">
+                <a16:creationId xmlns:a16="http://schemas.microsoft.com/office/drawing/2014/main" id="{247F716C-6879-9FAB-3E95-B20C927AD6D0}"/>
+              </a:ext>
+            </a:extLst>
+          </p:cNvPr>
+          <p:cNvSpPr>
+            <a:spLocks noGrp="1"/>
+          </p:cNvSpPr>
+          <p:nvPr>
+            <p:ph type="title"/>
+          </p:nvPr>
+        </p:nvSpPr>
+        <p:spPr>
+          <a:xfrm>
+            <a:off x="352425" y="426084"/>
+            <a:ext cx="10515600" cy="1325563"/>
+          </a:xfrm>
+        </p:spPr>
+        <p:txBody>
+          <a:bodyPr/>
+          <a:lstStyle/>
+          <a:p>
+            <a:r>
+              <a:rPr lang="en-GB" dirty="0"/>
+              <a:t>Distribution of Weight Lifted across Ages</a:t>
+            </a:r>
+          </a:p>
+        </p:txBody>
+      </p:sp>
+      <p:sp>
+        <p:nvSpPr>
+          <p:cNvPr id="3" name="Content Placeholder 2">
+            <a:extLst>
+              <a:ext uri="{FF2B5EF4-FFF2-40B4-BE49-F238E27FC236}">
+                <a16:creationId xmlns:a16="http://schemas.microsoft.com/office/drawing/2014/main" id="{CC521749-2CBB-92A7-FDCD-726C225B8E3E}"/>
+              </a:ext>
+            </a:extLst>
+          </p:cNvPr>
+          <p:cNvSpPr>
+            <a:spLocks noGrp="1"/>
+          </p:cNvSpPr>
+          <p:nvPr>
+            <p:ph idx="1"/>
+          </p:nvPr>
+        </p:nvSpPr>
+        <p:spPr>
+          <a:xfrm>
+            <a:off x="285750" y="1751647"/>
+            <a:ext cx="6366143" cy="4351338"/>
+          </a:xfrm>
+        </p:spPr>
+        <p:txBody>
+          <a:bodyPr>
+            <a:normAutofit/>
+          </a:bodyPr>
+          <a:lstStyle/>
+          <a:p>
+            <a:r>
+              <a:rPr lang="en-GB" sz="2600" dirty="0"/>
+              <a:t>The dataset has a high concentration of lifters aged 18-25 years</a:t>
+            </a:r>
+          </a:p>
+          <a:p>
+            <a:endParaRPr lang="en-GB" sz="2600" dirty="0"/>
+          </a:p>
+          <a:p>
+            <a:r>
+              <a:rPr lang="en-GB" sz="2600" dirty="0"/>
+              <a:t>People of this age tend to total between 400kg – 600kg</a:t>
+            </a:r>
+          </a:p>
+          <a:p>
+            <a:endParaRPr lang="en-GB" sz="2600" dirty="0"/>
+          </a:p>
+          <a:p>
+            <a:r>
+              <a:rPr lang="en-GB" sz="2600" dirty="0"/>
+              <a:t>Peak strength appears to occur around 25-30, and then decrease as age increases</a:t>
+            </a:r>
+          </a:p>
+        </p:txBody>
+      </p:sp>
+      <p:pic>
+        <p:nvPicPr>
+          <p:cNvPr id="5" name="Picture 4" descr="A chart of a diagram&#10;&#10;AI-generated content may be incorrect.">
+            <a:extLst>
+              <a:ext uri="{FF2B5EF4-FFF2-40B4-BE49-F238E27FC236}">
+                <a16:creationId xmlns:a16="http://schemas.microsoft.com/office/drawing/2014/main" id="{E37BCE41-CAB8-B555-B2E0-2571587BCF66}"/>
+              </a:ext>
+            </a:extLst>
+          </p:cNvPr>
+          <p:cNvPicPr>
+            <a:picLocks noChangeAspect="1"/>
+          </p:cNvPicPr>
+          <p:nvPr/>
+        </p:nvPicPr>
+        <p:blipFill>
+          <a:blip r:embed="rId3"/>
+          <a:stretch>
+            <a:fillRect/>
+          </a:stretch>
+        </p:blipFill>
+        <p:spPr>
+          <a:xfrm>
+            <a:off x="6372225" y="1569630"/>
+            <a:ext cx="5661018" cy="4414483"/>
+          </a:xfrm>
+          <a:prstGeom prst="rect">
+            <a:avLst/>
+          </a:prstGeom>
+        </p:spPr>
+      </p:pic>
+    </p:spTree>
+    <p:extLst>
+      <p:ext uri="{BB962C8B-B14F-4D97-AF65-F5344CB8AC3E}">
+        <p14:creationId xmlns:p14="http://schemas.microsoft.com/office/powerpoint/2010/main" val="1328694416"/>
+      </p:ext>
+    </p:extLst>
+  </p:cSld>
+  <p:clrMapOvr>
+    <a:masterClrMapping/>
+  </p:clrMapOvr>
+</p:sld>
+</file>
+
+<file path=ppt/slides/slide7.xml><?xml version="1.0" encoding="utf-8"?>
+<p:sld xmlns:a="http://schemas.openxmlformats.org/drawingml/2006/main" xmlns:r="http://schemas.openxmlformats.org/officeDocument/2006/relationships" xmlns:p="http://schemas.openxmlformats.org/presentationml/2006/main">
+  <p:cSld>
+    <p:spTree>
+      <p:nvGrpSpPr>
+        <p:cNvPr id="1" name=""/>
+        <p:cNvGrpSpPr/>
+        <p:nvPr/>
+      </p:nvGrpSpPr>
+      <p:grpSpPr>
+        <a:xfrm>
+          <a:off x="0" y="0"/>
+          <a:ext cx="0" cy="0"/>
+          <a:chOff x="0" y="0"/>
+          <a:chExt cx="0" cy="0"/>
+        </a:xfrm>
+      </p:grpSpPr>
+      <p:sp>
+        <p:nvSpPr>
+          <p:cNvPr id="2" name="Title 1">
+            <a:extLst>
+              <a:ext uri="{FF2B5EF4-FFF2-40B4-BE49-F238E27FC236}">
+                <a16:creationId xmlns:a16="http://schemas.microsoft.com/office/drawing/2014/main" id="{BFE9021B-1019-5750-1221-78479D692957}"/>
+              </a:ext>
+            </a:extLst>
+          </p:cNvPr>
+          <p:cNvSpPr>
+            <a:spLocks noGrp="1"/>
+          </p:cNvSpPr>
+          <p:nvPr>
+            <p:ph type="title"/>
+          </p:nvPr>
+        </p:nvSpPr>
+        <p:spPr>
+          <a:xfrm>
+            <a:off x="381000" y="355600"/>
+            <a:ext cx="10515600" cy="1325563"/>
+          </a:xfrm>
+        </p:spPr>
+        <p:txBody>
+          <a:bodyPr/>
+          <a:lstStyle/>
+          <a:p>
+            <a:r>
+              <a:rPr lang="en-GB" dirty="0"/>
+              <a:t>Performance Change?</a:t>
+            </a:r>
+          </a:p>
+        </p:txBody>
+      </p:sp>
+      <p:sp>
+        <p:nvSpPr>
+          <p:cNvPr id="3" name="Content Placeholder 2">
+            <a:extLst>
+              <a:ext uri="{FF2B5EF4-FFF2-40B4-BE49-F238E27FC236}">
+                <a16:creationId xmlns:a16="http://schemas.microsoft.com/office/drawing/2014/main" id="{D0FFC11D-57F5-5EC0-A365-7638EC1640CC}"/>
+              </a:ext>
+            </a:extLst>
+          </p:cNvPr>
+          <p:cNvSpPr>
+            <a:spLocks noGrp="1"/>
+          </p:cNvSpPr>
+          <p:nvPr>
+            <p:ph idx="1"/>
+          </p:nvPr>
+        </p:nvSpPr>
+        <p:spPr>
+          <a:xfrm>
+            <a:off x="381000" y="1825625"/>
+            <a:ext cx="5858692" cy="4351338"/>
+          </a:xfrm>
+        </p:spPr>
+        <p:txBody>
+          <a:bodyPr>
+            <a:normAutofit/>
+          </a:bodyPr>
+          <a:lstStyle/>
+          <a:p>
+            <a:r>
+              <a:rPr lang="en-GB" sz="2600" dirty="0"/>
+              <a:t>Used the mean Total Kg lifted for the 5 most common weight classes</a:t>
+            </a:r>
+          </a:p>
+          <a:p>
+            <a:endParaRPr lang="en-GB" sz="2600" dirty="0"/>
+          </a:p>
+          <a:p>
+            <a:r>
+              <a:rPr lang="en-GB" sz="2600" dirty="0"/>
+              <a:t>Some decrease around 2010 for 100kg, 90kg, and 82.5kg</a:t>
+            </a:r>
+          </a:p>
+          <a:p>
+            <a:endParaRPr lang="en-GB" sz="2600" dirty="0"/>
+          </a:p>
+          <a:p>
+            <a:r>
+              <a:rPr lang="en-GB" sz="2600" dirty="0"/>
+              <a:t>The 83kg and 93kg classes were only added in 2010 when federations such as the IPF began to use it</a:t>
+            </a:r>
+          </a:p>
+        </p:txBody>
+      </p:sp>
+      <p:pic>
+        <p:nvPicPr>
+          <p:cNvPr id="6" name="Picture 5" descr="A graph of weight class&#10;&#10;AI-generated content may be incorrect.">
+            <a:extLst>
+              <a:ext uri="{FF2B5EF4-FFF2-40B4-BE49-F238E27FC236}">
+                <a16:creationId xmlns:a16="http://schemas.microsoft.com/office/drawing/2014/main" id="{522CC142-2C14-4653-A98A-B85B9D19D497}"/>
+              </a:ext>
+            </a:extLst>
+          </p:cNvPr>
+          <p:cNvPicPr>
+            <a:picLocks noChangeAspect="1"/>
+          </p:cNvPicPr>
+          <p:nvPr/>
+        </p:nvPicPr>
+        <p:blipFill>
+          <a:blip r:embed="rId3"/>
+          <a:stretch>
+            <a:fillRect/>
+          </a:stretch>
+        </p:blipFill>
+        <p:spPr>
+          <a:xfrm>
+            <a:off x="6280398" y="857024"/>
+            <a:ext cx="5817986" cy="5645376"/>
+          </a:xfrm>
+          <a:prstGeom prst="rect">
+            <a:avLst/>
+          </a:prstGeom>
+        </p:spPr>
+      </p:pic>
+    </p:spTree>
+    <p:extLst>
+      <p:ext uri="{BB962C8B-B14F-4D97-AF65-F5344CB8AC3E}">
+        <p14:creationId xmlns:p14="http://schemas.microsoft.com/office/powerpoint/2010/main" val="2492349518"/>
+      </p:ext>
+    </p:extLst>
+  </p:cSld>
+  <p:clrMapOvr>
+    <a:masterClrMapping/>
+  </p:clrMapOvr>
+</p:sld>
+</file>
+
+<file path=ppt/slides/slide8.xml><?xml version="1.0" encoding="utf-8"?>
+<p:sld xmlns:a="http://schemas.openxmlformats.org/drawingml/2006/main" xmlns:r="http://schemas.openxmlformats.org/officeDocument/2006/relationships" xmlns:p="http://schemas.openxmlformats.org/presentationml/2006/main">
+  <p:cSld>
+    <p:spTree>
+      <p:nvGrpSpPr>
+        <p:cNvPr id="1" name=""/>
+        <p:cNvGrpSpPr/>
+        <p:nvPr/>
+      </p:nvGrpSpPr>
+      <p:grpSpPr>
+        <a:xfrm>
+          <a:off x="0" y="0"/>
+          <a:ext cx="0" cy="0"/>
+          <a:chOff x="0" y="0"/>
+          <a:chExt cx="0" cy="0"/>
+        </a:xfrm>
+      </p:grpSpPr>
+      <p:sp>
+        <p:nvSpPr>
+          <p:cNvPr id="2" name="Title 1">
+            <a:extLst>
+              <a:ext uri="{FF2B5EF4-FFF2-40B4-BE49-F238E27FC236}">
+                <a16:creationId xmlns:a16="http://schemas.microsoft.com/office/drawing/2014/main" id="{647ADBE4-BA12-3A4C-B94D-77906D51BE18}"/>
+              </a:ext>
+            </a:extLst>
+          </p:cNvPr>
+          <p:cNvSpPr>
+            <a:spLocks noGrp="1"/>
+          </p:cNvSpPr>
+          <p:nvPr>
+            <p:ph type="title"/>
+          </p:nvPr>
+        </p:nvSpPr>
+        <p:spPr>
+          <a:xfrm>
+            <a:off x="352425" y="365125"/>
+            <a:ext cx="10515600" cy="1325563"/>
+          </a:xfrm>
+        </p:spPr>
+        <p:txBody>
+          <a:bodyPr/>
+          <a:lstStyle/>
+          <a:p>
+            <a:r>
+              <a:rPr lang="en-GB" dirty="0"/>
+              <a:t>Strength vs Bodyweight</a:t>
+            </a:r>
+          </a:p>
+        </p:txBody>
+      </p:sp>
+      <p:sp>
+        <p:nvSpPr>
+          <p:cNvPr id="3" name="Content Placeholder 2">
+            <a:extLst>
+              <a:ext uri="{FF2B5EF4-FFF2-40B4-BE49-F238E27FC236}">
+                <a16:creationId xmlns:a16="http://schemas.microsoft.com/office/drawing/2014/main" id="{6E84F41B-15DC-156E-7429-ACE3FCA1CE41}"/>
+              </a:ext>
+            </a:extLst>
+          </p:cNvPr>
+          <p:cNvSpPr>
+            <a:spLocks noGrp="1"/>
+          </p:cNvSpPr>
+          <p:nvPr>
+            <p:ph idx="1"/>
+          </p:nvPr>
+        </p:nvSpPr>
+        <p:spPr>
+          <a:xfrm>
+            <a:off x="352425" y="1825625"/>
+            <a:ext cx="5603781" cy="4351338"/>
+          </a:xfrm>
+        </p:spPr>
+        <p:txBody>
+          <a:bodyPr>
+            <a:normAutofit/>
+          </a:bodyPr>
+          <a:lstStyle/>
+          <a:p>
+            <a:r>
+              <a:rPr lang="en-GB" sz="2600" dirty="0"/>
+              <a:t>Mean total lifted generally increases with bodyweight</a:t>
+            </a:r>
+          </a:p>
+          <a:p>
+            <a:endParaRPr lang="en-GB" sz="2600" dirty="0"/>
+          </a:p>
+          <a:p>
+            <a:r>
+              <a:rPr lang="en-GB" sz="2600" dirty="0"/>
+              <a:t>Sigmoidal model has higher R</a:t>
+            </a:r>
+            <a:r>
+              <a:rPr lang="en-GB" sz="2600" baseline="30000" dirty="0"/>
+              <a:t>2</a:t>
+            </a:r>
+            <a:r>
+              <a:rPr lang="en-GB" sz="2600" dirty="0"/>
+              <a:t> than linear, suggesting the relationship is non-linear</a:t>
+            </a:r>
+          </a:p>
+          <a:p>
+            <a:endParaRPr lang="en-GB" sz="2600" dirty="0"/>
+          </a:p>
+          <a:p>
+            <a:r>
+              <a:rPr lang="en-GB" sz="2600" dirty="0"/>
+              <a:t>The plateau could suggest a number of biomechanical constraints</a:t>
+            </a:r>
+          </a:p>
+        </p:txBody>
+      </p:sp>
+      <p:pic>
+        <p:nvPicPr>
+          <p:cNvPr id="5" name="Picture 4" descr="A graph of a number of numbers and a line&#10;&#10;AI-generated content may be incorrect.">
+            <a:extLst>
+              <a:ext uri="{FF2B5EF4-FFF2-40B4-BE49-F238E27FC236}">
+                <a16:creationId xmlns:a16="http://schemas.microsoft.com/office/drawing/2014/main" id="{BAA7181E-07D1-BDCE-EE47-DFF8256F4124}"/>
+              </a:ext>
+            </a:extLst>
+          </p:cNvPr>
+          <p:cNvPicPr>
+            <a:picLocks noChangeAspect="1"/>
+          </p:cNvPicPr>
+          <p:nvPr/>
+        </p:nvPicPr>
+        <p:blipFill>
+          <a:blip r:embed="rId3"/>
+          <a:stretch>
+            <a:fillRect/>
+          </a:stretch>
+        </p:blipFill>
+        <p:spPr>
+          <a:xfrm>
+            <a:off x="5772150" y="1027906"/>
+            <a:ext cx="6419850" cy="5055860"/>
+          </a:xfrm>
+          <a:prstGeom prst="rect">
+            <a:avLst/>
+          </a:prstGeom>
+        </p:spPr>
+      </p:pic>
+    </p:spTree>
+    <p:extLst>
+      <p:ext uri="{BB962C8B-B14F-4D97-AF65-F5344CB8AC3E}">
+        <p14:creationId xmlns:p14="http://schemas.microsoft.com/office/powerpoint/2010/main" val="2059410698"/>
+      </p:ext>
+    </p:extLst>
+  </p:cSld>
+  <p:clrMapOvr>
+    <a:masterClrMapping/>
+  </p:clrMapOvr>
+</p:sld>
+</file>
+
+<file path=ppt/slides/slide9.xml><?xml version="1.0" encoding="utf-8"?>
+<p:sld xmlns:a="http://schemas.openxmlformats.org/drawingml/2006/main" xmlns:r="http://schemas.openxmlformats.org/officeDocument/2006/relationships" xmlns:p="http://schemas.openxmlformats.org/presentationml/2006/main">
+  <p:cSld>
+    <p:spTree>
+      <p:nvGrpSpPr>
+        <p:cNvPr id="1" name=""/>
+        <p:cNvGrpSpPr/>
+        <p:nvPr/>
+      </p:nvGrpSpPr>
+      <p:grpSpPr>
+        <a:xfrm>
+          <a:off x="0" y="0"/>
+          <a:ext cx="0" cy="0"/>
+          <a:chOff x="0" y="0"/>
+          <a:chExt cx="0" cy="0"/>
+        </a:xfrm>
+      </p:grpSpPr>
+      <p:sp>
+        <p:nvSpPr>
+          <p:cNvPr id="2" name="Title 1">
+            <a:extLst>
+              <a:ext uri="{FF2B5EF4-FFF2-40B4-BE49-F238E27FC236}">
+                <a16:creationId xmlns:a16="http://schemas.microsoft.com/office/drawing/2014/main" id="{A23DC9E9-62B9-C8D6-76C9-7EF0CD0037CA}"/>
+              </a:ext>
+            </a:extLst>
+          </p:cNvPr>
+          <p:cNvSpPr>
+            <a:spLocks noGrp="1"/>
+          </p:cNvSpPr>
+          <p:nvPr>
+            <p:ph type="title"/>
+          </p:nvPr>
+        </p:nvSpPr>
+        <p:spPr>
+          <a:xfrm>
+            <a:off x="333375" y="409621"/>
+            <a:ext cx="10515600" cy="1325563"/>
+          </a:xfrm>
+        </p:spPr>
+        <p:txBody>
+          <a:bodyPr/>
+          <a:lstStyle/>
+          <a:p>
+            <a:r>
+              <a:rPr lang="en-GB" dirty="0"/>
+              <a:t>Correlations between Lifts</a:t>
+            </a:r>
+          </a:p>
+        </p:txBody>
+      </p:sp>
+      <p:sp>
+        <p:nvSpPr>
+          <p:cNvPr id="3" name="Content Placeholder 2">
+            <a:extLst>
+              <a:ext uri="{FF2B5EF4-FFF2-40B4-BE49-F238E27FC236}">
+                <a16:creationId xmlns:a16="http://schemas.microsoft.com/office/drawing/2014/main" id="{F488EEA8-9823-7C7E-0EEC-815FB8756F68}"/>
+              </a:ext>
+            </a:extLst>
+          </p:cNvPr>
+          <p:cNvSpPr>
+            <a:spLocks noGrp="1"/>
+          </p:cNvSpPr>
+          <p:nvPr>
+            <p:ph idx="1"/>
+          </p:nvPr>
+        </p:nvSpPr>
+        <p:spPr>
+          <a:xfrm>
+            <a:off x="333375" y="1825625"/>
+            <a:ext cx="6080693" cy="4351338"/>
+          </a:xfrm>
+        </p:spPr>
+        <p:txBody>
+          <a:bodyPr>
+            <a:normAutofit/>
+          </a:bodyPr>
+          <a:lstStyle/>
+          <a:p>
+            <a:r>
+              <a:rPr lang="en-GB" sz="2600" dirty="0"/>
+              <a:t>Example shown is for 100kg weight class</a:t>
+            </a:r>
+          </a:p>
+          <a:p>
+            <a:endParaRPr lang="en-GB" sz="2600" dirty="0"/>
+          </a:p>
+          <a:p>
+            <a:r>
+              <a:rPr lang="en-GB" sz="2600" dirty="0"/>
+              <a:t>Bench press and deadlift have the weakest correlation</a:t>
+            </a:r>
+          </a:p>
+          <a:p>
+            <a:endParaRPr lang="en-GB" sz="2600" dirty="0"/>
+          </a:p>
+          <a:p>
+            <a:r>
+              <a:rPr lang="en-GB" sz="2600" dirty="0"/>
+              <a:t>Leverages and range of motion could contribute to this – for example, arm length</a:t>
+            </a:r>
+          </a:p>
+        </p:txBody>
+      </p:sp>
+      <p:pic>
+        <p:nvPicPr>
+          <p:cNvPr id="7" name="Picture 6" descr="A diagram of a heatmap&#10;&#10;AI-generated content may be incorrect.">
+            <a:extLst>
+              <a:ext uri="{FF2B5EF4-FFF2-40B4-BE49-F238E27FC236}">
+                <a16:creationId xmlns:a16="http://schemas.microsoft.com/office/drawing/2014/main" id="{DC2DD4B6-89F7-E345-488B-0B1D658152C6}"/>
+              </a:ext>
+            </a:extLst>
+          </p:cNvPr>
+          <p:cNvPicPr>
+            <a:picLocks noChangeAspect="1"/>
+          </p:cNvPicPr>
+          <p:nvPr/>
+        </p:nvPicPr>
+        <p:blipFill>
+          <a:blip r:embed="rId3"/>
+          <a:stretch>
+            <a:fillRect/>
+          </a:stretch>
+        </p:blipFill>
+        <p:spPr>
+          <a:xfrm>
+            <a:off x="6276974" y="1431832"/>
+            <a:ext cx="5848689" cy="4816568"/>
+          </a:xfrm>
+          <a:prstGeom prst="rect">
+            <a:avLst/>
+          </a:prstGeom>
+        </p:spPr>
+      </p:pic>
+    </p:spTree>
+    <p:extLst>
+      <p:ext uri="{BB962C8B-B14F-4D97-AF65-F5344CB8AC3E}">
+        <p14:creationId xmlns:p14="http://schemas.microsoft.com/office/powerpoint/2010/main" val="3444334917"/>
       </p:ext>
     </p:extLst>
   </p:cSld>
@@ -4531,4 +7087,299 @@
     </a:ext>
   </a:extLst>
 </a:theme>
+</file>
+
+<file path=ppt/theme/theme2.xml><?xml version="1.0" encoding="utf-8"?>
+<a:theme xmlns:a="http://schemas.openxmlformats.org/drawingml/2006/main" name="Office Theme">
+  <a:themeElements>
+    <a:clrScheme name="Office">
+      <a:dk1>
+        <a:sysClr val="windowText" lastClr="000000"/>
+      </a:dk1>
+      <a:lt1>
+        <a:sysClr val="window" lastClr="FFFFFF"/>
+      </a:lt1>
+      <a:dk2>
+        <a:srgbClr val="44546A"/>
+      </a:dk2>
+      <a:lt2>
+        <a:srgbClr val="E7E6E6"/>
+      </a:lt2>
+      <a:accent1>
+        <a:srgbClr val="4472C4"/>
+      </a:accent1>
+      <a:accent2>
+        <a:srgbClr val="ED7D31"/>
+      </a:accent2>
+      <a:accent3>
+        <a:srgbClr val="A5A5A5"/>
+      </a:accent3>
+      <a:accent4>
+        <a:srgbClr val="FFC000"/>
+      </a:accent4>
+      <a:accent5>
+        <a:srgbClr val="5B9BD5"/>
+      </a:accent5>
+      <a:accent6>
+        <a:srgbClr val="70AD47"/>
+      </a:accent6>
+      <a:hlink>
+        <a:srgbClr val="0563C1"/>
+      </a:hlink>
+      <a:folHlink>
+        <a:srgbClr val="954F72"/>
+      </a:folHlink>
+    </a:clrScheme>
+    <a:fontScheme name="Office">
+      <a:majorFont>
+        <a:latin typeface="Calibri Light" panose="020F0302020204030204"/>
+        <a:ea typeface=""/>
+        <a:cs typeface=""/>
+        <a:font script="Jpan" typeface="游ゴシック Light"/>
+        <a:font script="Hang" typeface="맑은 고딕"/>
+        <a:font script="Hans" typeface="等线 Light"/>
+        <a:font script="Hant" typeface="新細明體"/>
+        <a:font script="Arab" typeface="Times New Roman"/>
+        <a:font script="Hebr" typeface="Times New Roman"/>
+        <a:font script="Thai" typeface="Angsana New"/>
+        <a:font script="Ethi" typeface="Nyala"/>
+        <a:font script="Beng" typeface="Vrinda"/>
+        <a:font script="Gujr" typeface="Shruti"/>
+        <a:font script="Khmr" typeface="MoolBoran"/>
+        <a:font script="Knda" typeface="Tunga"/>
+        <a:font script="Guru" typeface="Raavi"/>
+        <a:font script="Cans" typeface="Euphemia"/>
+        <a:font script="Cher" typeface="Plantagenet Cherokee"/>
+        <a:font script="Yiii" typeface="Microsoft Yi Baiti"/>
+        <a:font script="Tibt" typeface="Microsoft Himalaya"/>
+        <a:font script="Thaa" typeface="MV Boli"/>
+        <a:font script="Deva" typeface="Mangal"/>
+        <a:font script="Telu" typeface="Gautami"/>
+        <a:font script="Taml" typeface="Latha"/>
+        <a:font script="Syrc" typeface="Estrangelo Edessa"/>
+        <a:font script="Orya" typeface="Kalinga"/>
+        <a:font script="Mlym" typeface="Kartika"/>
+        <a:font script="Laoo" typeface="DokChampa"/>
+        <a:font script="Sinh" typeface="Iskoola Pota"/>
+        <a:font script="Mong" typeface="Mongolian Baiti"/>
+        <a:font script="Viet" typeface="Times New Roman"/>
+        <a:font script="Uigh" typeface="Microsoft Uighur"/>
+        <a:font script="Geor" typeface="Sylfaen"/>
+        <a:font script="Armn" typeface="Arial"/>
+        <a:font script="Bugi" typeface="Leelawadee UI"/>
+        <a:font script="Bopo" typeface="Microsoft JhengHei"/>
+        <a:font script="Java" typeface="Javanese Text"/>
+        <a:font script="Lisu" typeface="Segoe UI"/>
+        <a:font script="Mymr" typeface="Myanmar Text"/>
+        <a:font script="Nkoo" typeface="Ebrima"/>
+        <a:font script="Olck" typeface="Nirmala UI"/>
+        <a:font script="Osma" typeface="Ebrima"/>
+        <a:font script="Phag" typeface="Phagspa"/>
+        <a:font script="Syrn" typeface="Estrangelo Edessa"/>
+        <a:font script="Syrj" typeface="Estrangelo Edessa"/>
+        <a:font script="Syre" typeface="Estrangelo Edessa"/>
+        <a:font script="Sora" typeface="Nirmala UI"/>
+        <a:font script="Tale" typeface="Microsoft Tai Le"/>
+        <a:font script="Talu" typeface="Microsoft New Tai Lue"/>
+        <a:font script="Tfng" typeface="Ebrima"/>
+      </a:majorFont>
+      <a:minorFont>
+        <a:latin typeface="Calibri" panose="020F0502020204030204"/>
+        <a:ea typeface=""/>
+        <a:cs typeface=""/>
+        <a:font script="Jpan" typeface="游ゴシック"/>
+        <a:font script="Hang" typeface="맑은 고딕"/>
+        <a:font script="Hans" typeface="等线"/>
+        <a:font script="Hant" typeface="新細明體"/>
+        <a:font script="Arab" typeface="Arial"/>
+        <a:font script="Hebr" typeface="Arial"/>
+        <a:font script="Thai" typeface="Cordia New"/>
+        <a:font script="Ethi" typeface="Nyala"/>
+        <a:font script="Beng" typeface="Vrinda"/>
+        <a:font script="Gujr" typeface="Shruti"/>
+        <a:font script="Khmr" typeface="DaunPenh"/>
+        <a:font script="Knda" typeface="Tunga"/>
+        <a:font script="Guru" typeface="Raavi"/>
+        <a:font script="Cans" typeface="Euphemia"/>
+        <a:font script="Cher" typeface="Plantagenet Cherokee"/>
+        <a:font script="Yiii" typeface="Microsoft Yi Baiti"/>
+        <a:font script="Tibt" typeface="Microsoft Himalaya"/>
+        <a:font script="Thaa" typeface="MV Boli"/>
+        <a:font script="Deva" typeface="Mangal"/>
+        <a:font script="Telu" typeface="Gautami"/>
+        <a:font script="Taml" typeface="Latha"/>
+        <a:font script="Syrc" typeface="Estrangelo Edessa"/>
+        <a:font script="Orya" typeface="Kalinga"/>
+        <a:font script="Mlym" typeface="Kartika"/>
+        <a:font script="Laoo" typeface="DokChampa"/>
+        <a:font script="Sinh" typeface="Iskoola Pota"/>
+        <a:font script="Mong" typeface="Mongolian Baiti"/>
+        <a:font script="Viet" typeface="Arial"/>
+        <a:font script="Uigh" typeface="Microsoft Uighur"/>
+        <a:font script="Geor" typeface="Sylfaen"/>
+        <a:font script="Armn" typeface="Arial"/>
+        <a:font script="Bugi" typeface="Leelawadee UI"/>
+        <a:font script="Bopo" typeface="Microsoft JhengHei"/>
+        <a:font script="Java" typeface="Javanese Text"/>
+        <a:font script="Lisu" typeface="Segoe UI"/>
+        <a:font script="Mymr" typeface="Myanmar Text"/>
+        <a:font script="Nkoo" typeface="Ebrima"/>
+        <a:font script="Olck" typeface="Nirmala UI"/>
+        <a:font script="Osma" typeface="Ebrima"/>
+        <a:font script="Phag" typeface="Phagspa"/>
+        <a:font script="Syrn" typeface="Estrangelo Edessa"/>
+        <a:font script="Syrj" typeface="Estrangelo Edessa"/>
+        <a:font script="Syre" typeface="Estrangelo Edessa"/>
+        <a:font script="Sora" typeface="Nirmala UI"/>
+        <a:font script="Tale" typeface="Microsoft Tai Le"/>
+        <a:font script="Talu" typeface="Microsoft New Tai Lue"/>
+        <a:font script="Tfng" typeface="Ebrima"/>
+      </a:minorFont>
+    </a:fontScheme>
+    <a:fmtScheme name="Office">
+      <a:fillStyleLst>
+        <a:solidFill>
+          <a:schemeClr val="phClr"/>
+        </a:solidFill>
+        <a:gradFill rotWithShape="1">
+          <a:gsLst>
+            <a:gs pos="0">
+              <a:schemeClr val="phClr">
+                <a:lumMod val="110000"/>
+                <a:satMod val="105000"/>
+                <a:tint val="67000"/>
+              </a:schemeClr>
+            </a:gs>
+            <a:gs pos="50000">
+              <a:schemeClr val="phClr">
+                <a:lumMod val="105000"/>
+                <a:satMod val="103000"/>
+                <a:tint val="73000"/>
+              </a:schemeClr>
+            </a:gs>
+            <a:gs pos="100000">
+              <a:schemeClr val="phClr">
+                <a:lumMod val="105000"/>
+                <a:satMod val="109000"/>
+                <a:tint val="81000"/>
+              </a:schemeClr>
+            </a:gs>
+          </a:gsLst>
+          <a:lin ang="5400000" scaled="0"/>
+        </a:gradFill>
+        <a:gradFill rotWithShape="1">
+          <a:gsLst>
+            <a:gs pos="0">
+              <a:schemeClr val="phClr">
+                <a:satMod val="103000"/>
+                <a:lumMod val="102000"/>
+                <a:tint val="94000"/>
+              </a:schemeClr>
+            </a:gs>
+            <a:gs pos="50000">
+              <a:schemeClr val="phClr">
+                <a:satMod val="110000"/>
+                <a:lumMod val="100000"/>
+                <a:shade val="100000"/>
+              </a:schemeClr>
+            </a:gs>
+            <a:gs pos="100000">
+              <a:schemeClr val="phClr">
+                <a:lumMod val="99000"/>
+                <a:satMod val="120000"/>
+                <a:shade val="78000"/>
+              </a:schemeClr>
+            </a:gs>
+          </a:gsLst>
+          <a:lin ang="5400000" scaled="0"/>
+        </a:gradFill>
+      </a:fillStyleLst>
+      <a:lnStyleLst>
+        <a:ln w="6350" cap="flat" cmpd="sng" algn="ctr">
+          <a:solidFill>
+            <a:schemeClr val="phClr"/>
+          </a:solidFill>
+          <a:prstDash val="solid"/>
+          <a:miter lim="800000"/>
+        </a:ln>
+        <a:ln w="12700" cap="flat" cmpd="sng" algn="ctr">
+          <a:solidFill>
+            <a:schemeClr val="phClr"/>
+          </a:solidFill>
+          <a:prstDash val="solid"/>
+          <a:miter lim="800000"/>
+        </a:ln>
+        <a:ln w="19050" cap="flat" cmpd="sng" algn="ctr">
+          <a:solidFill>
+            <a:schemeClr val="phClr"/>
+          </a:solidFill>
+          <a:prstDash val="solid"/>
+          <a:miter lim="800000"/>
+        </a:ln>
+      </a:lnStyleLst>
+      <a:effectStyleLst>
+        <a:effectStyle>
+          <a:effectLst/>
+        </a:effectStyle>
+        <a:effectStyle>
+          <a:effectLst/>
+        </a:effectStyle>
+        <a:effectStyle>
+          <a:effectLst>
+            <a:outerShdw blurRad="57150" dist="19050" dir="5400000" algn="ctr" rotWithShape="0">
+              <a:srgbClr val="000000">
+                <a:alpha val="63000"/>
+              </a:srgbClr>
+            </a:outerShdw>
+          </a:effectLst>
+        </a:effectStyle>
+      </a:effectStyleLst>
+      <a:bgFillStyleLst>
+        <a:solidFill>
+          <a:schemeClr val="phClr"/>
+        </a:solidFill>
+        <a:solidFill>
+          <a:schemeClr val="phClr">
+            <a:tint val="95000"/>
+            <a:satMod val="170000"/>
+          </a:schemeClr>
+        </a:solidFill>
+        <a:gradFill rotWithShape="1">
+          <a:gsLst>
+            <a:gs pos="0">
+              <a:schemeClr val="phClr">
+                <a:tint val="93000"/>
+                <a:satMod val="150000"/>
+                <a:shade val="98000"/>
+                <a:lumMod val="102000"/>
+              </a:schemeClr>
+            </a:gs>
+            <a:gs pos="50000">
+              <a:schemeClr val="phClr">
+                <a:tint val="98000"/>
+                <a:satMod val="130000"/>
+                <a:shade val="90000"/>
+                <a:lumMod val="103000"/>
+              </a:schemeClr>
+            </a:gs>
+            <a:gs pos="100000">
+              <a:schemeClr val="phClr">
+                <a:shade val="63000"/>
+                <a:satMod val="120000"/>
+              </a:schemeClr>
+            </a:gs>
+          </a:gsLst>
+          <a:lin ang="5400000" scaled="0"/>
+        </a:gradFill>
+      </a:bgFillStyleLst>
+    </a:fmtScheme>
+  </a:themeElements>
+  <a:objectDefaults/>
+  <a:extraClrSchemeLst/>
+  <a:extLst>
+    <a:ext uri="{05A4C25C-085E-4340-85A3-A5531E510DB2}">
+      <thm15:themeFamily xmlns:thm15="http://schemas.microsoft.com/office/thememl/2012/main" name="Office Theme" id="{62F939B6-93AF-4DB8-9C6B-D6C7DFDC589F}" vid="{4A3C46E8-61CC-4603-A589-7422A47A8E4A}"/>
+    </a:ext>
+  </a:extLst>
+</a:theme>
 </file>
</xml_diff>